<commit_message>
redac + ajout variables dans sel in silico (les 2 et rdt)
</commit_message>
<xml_diff>
--- a/schéma données.pptx
+++ b/schéma données.pptx
@@ -2,19 +2,18 @@
 <file path=ppt/presentation.xml><?xml version="1.0" encoding="utf-8"?>
 <p:presentation xmlns:a="http://schemas.openxmlformats.org/drawingml/2006/main" xmlns:r="http://schemas.openxmlformats.org/officeDocument/2006/relationships" xmlns:p="http://schemas.openxmlformats.org/presentationml/2006/main" saveSubsetFonts="1">
   <p:sldMasterIdLst>
-    <p:sldMasterId id="2147483648" r:id="rId1"/>
+    <p:sldMasterId id="2147483660" r:id="rId1"/>
   </p:sldMasterIdLst>
   <p:sldIdLst>
-    <p:sldId id="256" r:id="rId2"/>
-    <p:sldId id="257" r:id="rId3"/>
+    <p:sldId id="257" r:id="rId2"/>
   </p:sldIdLst>
-  <p:sldSz cx="12192000" cy="6858000"/>
+  <p:sldSz cx="12192000" cy="12192000"/>
   <p:notesSz cx="6858000" cy="9144000"/>
   <p:defaultTextStyle>
     <a:defPPr>
-      <a:defRPr lang="fr-FR"/>
+      <a:defRPr lang="en-US"/>
     </a:defPPr>
-    <a:lvl1pPr marL="0" algn="l" defTabSz="914400" rtl="0" eaLnBrk="1" latinLnBrk="0" hangingPunct="1">
+    <a:lvl1pPr marL="0" algn="l" defTabSz="457200" rtl="0" eaLnBrk="1" latinLnBrk="0" hangingPunct="1">
       <a:defRPr sz="1800" kern="1200">
         <a:solidFill>
           <a:schemeClr val="tx1"/>
@@ -24,7 +23,7 @@
         <a:cs typeface="+mn-cs"/>
       </a:defRPr>
     </a:lvl1pPr>
-    <a:lvl2pPr marL="457200" algn="l" defTabSz="914400" rtl="0" eaLnBrk="1" latinLnBrk="0" hangingPunct="1">
+    <a:lvl2pPr marL="457200" algn="l" defTabSz="457200" rtl="0" eaLnBrk="1" latinLnBrk="0" hangingPunct="1">
       <a:defRPr sz="1800" kern="1200">
         <a:solidFill>
           <a:schemeClr val="tx1"/>
@@ -34,7 +33,7 @@
         <a:cs typeface="+mn-cs"/>
       </a:defRPr>
     </a:lvl2pPr>
-    <a:lvl3pPr marL="914400" algn="l" defTabSz="914400" rtl="0" eaLnBrk="1" latinLnBrk="0" hangingPunct="1">
+    <a:lvl3pPr marL="914400" algn="l" defTabSz="457200" rtl="0" eaLnBrk="1" latinLnBrk="0" hangingPunct="1">
       <a:defRPr sz="1800" kern="1200">
         <a:solidFill>
           <a:schemeClr val="tx1"/>
@@ -44,7 +43,7 @@
         <a:cs typeface="+mn-cs"/>
       </a:defRPr>
     </a:lvl3pPr>
-    <a:lvl4pPr marL="1371600" algn="l" defTabSz="914400" rtl="0" eaLnBrk="1" latinLnBrk="0" hangingPunct="1">
+    <a:lvl4pPr marL="1371600" algn="l" defTabSz="457200" rtl="0" eaLnBrk="1" latinLnBrk="0" hangingPunct="1">
       <a:defRPr sz="1800" kern="1200">
         <a:solidFill>
           <a:schemeClr val="tx1"/>
@@ -54,7 +53,7 @@
         <a:cs typeface="+mn-cs"/>
       </a:defRPr>
     </a:lvl4pPr>
-    <a:lvl5pPr marL="1828800" algn="l" defTabSz="914400" rtl="0" eaLnBrk="1" latinLnBrk="0" hangingPunct="1">
+    <a:lvl5pPr marL="1828800" algn="l" defTabSz="457200" rtl="0" eaLnBrk="1" latinLnBrk="0" hangingPunct="1">
       <a:defRPr sz="1800" kern="1200">
         <a:solidFill>
           <a:schemeClr val="tx1"/>
@@ -64,7 +63,7 @@
         <a:cs typeface="+mn-cs"/>
       </a:defRPr>
     </a:lvl5pPr>
-    <a:lvl6pPr marL="2286000" algn="l" defTabSz="914400" rtl="0" eaLnBrk="1" latinLnBrk="0" hangingPunct="1">
+    <a:lvl6pPr marL="2286000" algn="l" defTabSz="457200" rtl="0" eaLnBrk="1" latinLnBrk="0" hangingPunct="1">
       <a:defRPr sz="1800" kern="1200">
         <a:solidFill>
           <a:schemeClr val="tx1"/>
@@ -74,7 +73,7 @@
         <a:cs typeface="+mn-cs"/>
       </a:defRPr>
     </a:lvl6pPr>
-    <a:lvl7pPr marL="2743200" algn="l" defTabSz="914400" rtl="0" eaLnBrk="1" latinLnBrk="0" hangingPunct="1">
+    <a:lvl7pPr marL="2743200" algn="l" defTabSz="457200" rtl="0" eaLnBrk="1" latinLnBrk="0" hangingPunct="1">
       <a:defRPr sz="1800" kern="1200">
         <a:solidFill>
           <a:schemeClr val="tx1"/>
@@ -84,7 +83,7 @@
         <a:cs typeface="+mn-cs"/>
       </a:defRPr>
     </a:lvl7pPr>
-    <a:lvl8pPr marL="3200400" algn="l" defTabSz="914400" rtl="0" eaLnBrk="1" latinLnBrk="0" hangingPunct="1">
+    <a:lvl8pPr marL="3200400" algn="l" defTabSz="457200" rtl="0" eaLnBrk="1" latinLnBrk="0" hangingPunct="1">
       <a:defRPr sz="1800" kern="1200">
         <a:solidFill>
           <a:schemeClr val="tx1"/>
@@ -94,7 +93,7 @@
         <a:cs typeface="+mn-cs"/>
       </a:defRPr>
     </a:lvl8pPr>
-    <a:lvl9pPr marL="3657600" algn="l" defTabSz="914400" rtl="0" eaLnBrk="1" latinLnBrk="0" hangingPunct="1">
+    <a:lvl9pPr marL="3657600" algn="l" defTabSz="457200" rtl="0" eaLnBrk="1" latinLnBrk="0" hangingPunct="1">
       <a:defRPr sz="1800" kern="1200">
         <a:solidFill>
           <a:schemeClr val="tx1"/>
@@ -105,6 +104,11 @@
       </a:defRPr>
     </a:lvl9pPr>
   </p:defaultTextStyle>
+  <p:extLst>
+    <p:ext uri="{EFAFB233-063F-42B5-8137-9DF3F51BA10A}">
+      <p15:sldGuideLst xmlns:p15="http://schemas.microsoft.com/office/powerpoint/2012/main"/>
+    </p:ext>
+  </p:extLst>
 </p:presentation>
 </file>
 
@@ -127,7 +131,7 @@
       </p:grpSpPr>
       <p:sp>
         <p:nvSpPr>
-          <p:cNvPr id="2" name="Titre 1"/>
+          <p:cNvPr id="2" name="Title 1"/>
           <p:cNvSpPr>
             <a:spLocks noGrp="1"/>
           </p:cNvSpPr>
@@ -137,15 +141,15 @@
         </p:nvSpPr>
         <p:spPr>
           <a:xfrm>
-            <a:off x="1524000" y="1122363"/>
-            <a:ext cx="9144000" cy="2387600"/>
+            <a:off x="914400" y="1995312"/>
+            <a:ext cx="10363200" cy="4244622"/>
           </a:xfrm>
         </p:spPr>
         <p:txBody>
           <a:bodyPr anchor="b"/>
           <a:lstStyle>
             <a:lvl1pPr algn="ctr">
-              <a:defRPr sz="6000"/>
+              <a:defRPr sz="8000"/>
             </a:lvl1pPr>
           </a:lstStyle>
           <a:p>
@@ -153,13 +157,13 @@
               <a:rPr lang="fr-FR" smtClean="0"/>
               <a:t>Modifiez le style du titre</a:t>
             </a:r>
-            <a:endParaRPr lang="fr-FR"/>
-          </a:p>
-        </p:txBody>
-      </p:sp>
-      <p:sp>
-        <p:nvSpPr>
-          <p:cNvPr id="3" name="Sous-titre 2"/>
+            <a:endParaRPr lang="en-US" dirty="0"/>
+          </a:p>
+        </p:txBody>
+      </p:sp>
+      <p:sp>
+        <p:nvSpPr>
+          <p:cNvPr id="3" name="Subtitle 2"/>
           <p:cNvSpPr>
             <a:spLocks noGrp="1"/>
           </p:cNvSpPr>
@@ -169,8 +173,8 @@
         </p:nvSpPr>
         <p:spPr>
           <a:xfrm>
-            <a:off x="1524000" y="3602038"/>
-            <a:ext cx="9144000" cy="1655762"/>
+            <a:off x="1524000" y="6403623"/>
+            <a:ext cx="9144000" cy="2943577"/>
           </a:xfrm>
         </p:spPr>
         <p:txBody>
@@ -178,39 +182,39 @@
           <a:lstStyle>
             <a:lvl1pPr marL="0" indent="0" algn="ctr">
               <a:buNone/>
+              <a:defRPr sz="3200"/>
+            </a:lvl1pPr>
+            <a:lvl2pPr marL="609585" indent="0" algn="ctr">
+              <a:buNone/>
+              <a:defRPr sz="2667"/>
+            </a:lvl2pPr>
+            <a:lvl3pPr marL="1219170" indent="0" algn="ctr">
+              <a:buNone/>
               <a:defRPr sz="2400"/>
-            </a:lvl1pPr>
-            <a:lvl2pPr marL="457200" indent="0" algn="ctr">
-              <a:buNone/>
-              <a:defRPr sz="2000"/>
-            </a:lvl2pPr>
-            <a:lvl3pPr marL="914400" indent="0" algn="ctr">
-              <a:buNone/>
-              <a:defRPr sz="1800"/>
             </a:lvl3pPr>
-            <a:lvl4pPr marL="1371600" indent="0" algn="ctr">
-              <a:buNone/>
-              <a:defRPr sz="1600"/>
+            <a:lvl4pPr marL="1828754" indent="0" algn="ctr">
+              <a:buNone/>
+              <a:defRPr sz="2133"/>
             </a:lvl4pPr>
-            <a:lvl5pPr marL="1828800" indent="0" algn="ctr">
-              <a:buNone/>
-              <a:defRPr sz="1600"/>
+            <a:lvl5pPr marL="2438339" indent="0" algn="ctr">
+              <a:buNone/>
+              <a:defRPr sz="2133"/>
             </a:lvl5pPr>
-            <a:lvl6pPr marL="2286000" indent="0" algn="ctr">
-              <a:buNone/>
-              <a:defRPr sz="1600"/>
+            <a:lvl6pPr marL="3047924" indent="0" algn="ctr">
+              <a:buNone/>
+              <a:defRPr sz="2133"/>
             </a:lvl6pPr>
-            <a:lvl7pPr marL="2743200" indent="0" algn="ctr">
-              <a:buNone/>
-              <a:defRPr sz="1600"/>
+            <a:lvl7pPr marL="3657509" indent="0" algn="ctr">
+              <a:buNone/>
+              <a:defRPr sz="2133"/>
             </a:lvl7pPr>
-            <a:lvl8pPr marL="3200400" indent="0" algn="ctr">
-              <a:buNone/>
-              <a:defRPr sz="1600"/>
+            <a:lvl8pPr marL="4267093" indent="0" algn="ctr">
+              <a:buNone/>
+              <a:defRPr sz="2133"/>
             </a:lvl8pPr>
-            <a:lvl9pPr marL="3657600" indent="0" algn="ctr">
-              <a:buNone/>
-              <a:defRPr sz="1600"/>
+            <a:lvl9pPr marL="4876678" indent="0" algn="ctr">
+              <a:buNone/>
+              <a:defRPr sz="2133"/>
             </a:lvl9pPr>
           </a:lstStyle>
           <a:p>
@@ -218,13 +222,13 @@
               <a:rPr lang="fr-FR" smtClean="0"/>
               <a:t>Modifier le style des sous-titres du masque</a:t>
             </a:r>
-            <a:endParaRPr lang="fr-FR"/>
-          </a:p>
-        </p:txBody>
-      </p:sp>
-      <p:sp>
-        <p:nvSpPr>
-          <p:cNvPr id="4" name="Espace réservé de la date 3"/>
+            <a:endParaRPr lang="en-US" dirty="0"/>
+          </a:p>
+        </p:txBody>
+      </p:sp>
+      <p:sp>
+        <p:nvSpPr>
+          <p:cNvPr id="4" name="Date Placeholder 3"/>
           <p:cNvSpPr>
             <a:spLocks noGrp="1"/>
           </p:cNvSpPr>
@@ -239,7 +243,7 @@
           <a:p>
             <a:fld id="{C506BA6A-110B-4565-B24C-94066013DFC6}" type="datetimeFigureOut">
               <a:rPr lang="fr-FR" smtClean="0"/>
-              <a:t>09/08/2023</a:t>
+              <a:t>10/08/2023</a:t>
             </a:fld>
             <a:endParaRPr lang="fr-FR"/>
           </a:p>
@@ -247,7 +251,7 @@
       </p:sp>
       <p:sp>
         <p:nvSpPr>
-          <p:cNvPr id="5" name="Espace réservé du pied de page 4"/>
+          <p:cNvPr id="5" name="Footer Placeholder 4"/>
           <p:cNvSpPr>
             <a:spLocks noGrp="1"/>
           </p:cNvSpPr>
@@ -266,7 +270,7 @@
       </p:sp>
       <p:sp>
         <p:nvSpPr>
-          <p:cNvPr id="6" name="Espace réservé du numéro de diapositive 5"/>
+          <p:cNvPr id="6" name="Slide Number Placeholder 5"/>
           <p:cNvSpPr>
             <a:spLocks noGrp="1"/>
           </p:cNvSpPr>
@@ -290,7 +294,7 @@
     </p:spTree>
     <p:extLst>
       <p:ext uri="{BB962C8B-B14F-4D97-AF65-F5344CB8AC3E}">
-        <p14:creationId xmlns:p14="http://schemas.microsoft.com/office/powerpoint/2010/main" val="1602179864"/>
+        <p14:creationId xmlns:p14="http://schemas.microsoft.com/office/powerpoint/2010/main" val="2002581125"/>
       </p:ext>
     </p:extLst>
   </p:cSld>
@@ -319,7 +323,7 @@
       </p:grpSpPr>
       <p:sp>
         <p:nvSpPr>
-          <p:cNvPr id="2" name="Titre 1"/>
+          <p:cNvPr id="2" name="Title 1"/>
           <p:cNvSpPr>
             <a:spLocks noGrp="1"/>
           </p:cNvSpPr>
@@ -336,13 +340,13 @@
               <a:rPr lang="fr-FR" smtClean="0"/>
               <a:t>Modifiez le style du titre</a:t>
             </a:r>
-            <a:endParaRPr lang="fr-FR"/>
-          </a:p>
-        </p:txBody>
-      </p:sp>
-      <p:sp>
-        <p:nvSpPr>
-          <p:cNvPr id="3" name="Espace réservé du texte vertical 2"/>
+            <a:endParaRPr lang="en-US" dirty="0"/>
+          </a:p>
+        </p:txBody>
+      </p:sp>
+      <p:sp>
+        <p:nvSpPr>
+          <p:cNvPr id="3" name="Vertical Text Placeholder 2"/>
           <p:cNvSpPr>
             <a:spLocks noGrp="1"/>
           </p:cNvSpPr>
@@ -388,13 +392,13 @@
               <a:rPr lang="fr-FR" smtClean="0"/>
               <a:t>Cinquième niveau</a:t>
             </a:r>
-            <a:endParaRPr lang="fr-FR"/>
-          </a:p>
-        </p:txBody>
-      </p:sp>
-      <p:sp>
-        <p:nvSpPr>
-          <p:cNvPr id="4" name="Espace réservé de la date 3"/>
+            <a:endParaRPr lang="en-US" dirty="0"/>
+          </a:p>
+        </p:txBody>
+      </p:sp>
+      <p:sp>
+        <p:nvSpPr>
+          <p:cNvPr id="4" name="Date Placeholder 3"/>
           <p:cNvSpPr>
             <a:spLocks noGrp="1"/>
           </p:cNvSpPr>
@@ -409,7 +413,7 @@
           <a:p>
             <a:fld id="{C506BA6A-110B-4565-B24C-94066013DFC6}" type="datetimeFigureOut">
               <a:rPr lang="fr-FR" smtClean="0"/>
-              <a:t>09/08/2023</a:t>
+              <a:t>10/08/2023</a:t>
             </a:fld>
             <a:endParaRPr lang="fr-FR"/>
           </a:p>
@@ -417,7 +421,7 @@
       </p:sp>
       <p:sp>
         <p:nvSpPr>
-          <p:cNvPr id="5" name="Espace réservé du pied de page 4"/>
+          <p:cNvPr id="5" name="Footer Placeholder 4"/>
           <p:cNvSpPr>
             <a:spLocks noGrp="1"/>
           </p:cNvSpPr>
@@ -436,7 +440,7 @@
       </p:sp>
       <p:sp>
         <p:nvSpPr>
-          <p:cNvPr id="6" name="Espace réservé du numéro de diapositive 5"/>
+          <p:cNvPr id="6" name="Slide Number Placeholder 5"/>
           <p:cNvSpPr>
             <a:spLocks noGrp="1"/>
           </p:cNvSpPr>
@@ -460,7 +464,7 @@
     </p:spTree>
     <p:extLst>
       <p:ext uri="{BB962C8B-B14F-4D97-AF65-F5344CB8AC3E}">
-        <p14:creationId xmlns:p14="http://schemas.microsoft.com/office/powerpoint/2010/main" val="4062063308"/>
+        <p14:creationId xmlns:p14="http://schemas.microsoft.com/office/powerpoint/2010/main" val="326078636"/>
       </p:ext>
     </p:extLst>
   </p:cSld>
@@ -489,7 +493,7 @@
       </p:grpSpPr>
       <p:sp>
         <p:nvSpPr>
-          <p:cNvPr id="2" name="Titre vertical 1"/>
+          <p:cNvPr id="2" name="Vertical Title 1"/>
           <p:cNvSpPr>
             <a:spLocks noGrp="1"/>
           </p:cNvSpPr>
@@ -499,8 +503,8 @@
         </p:nvSpPr>
         <p:spPr>
           <a:xfrm>
-            <a:off x="8724900" y="365125"/>
-            <a:ext cx="2628900" cy="5811838"/>
+            <a:off x="8724901" y="649111"/>
+            <a:ext cx="2628900" cy="10332156"/>
           </a:xfrm>
         </p:spPr>
         <p:txBody>
@@ -511,13 +515,13 @@
               <a:rPr lang="fr-FR" smtClean="0"/>
               <a:t>Modifiez le style du titre</a:t>
             </a:r>
-            <a:endParaRPr lang="fr-FR"/>
-          </a:p>
-        </p:txBody>
-      </p:sp>
-      <p:sp>
-        <p:nvSpPr>
-          <p:cNvPr id="3" name="Espace réservé du texte vertical 2"/>
+            <a:endParaRPr lang="en-US" dirty="0"/>
+          </a:p>
+        </p:txBody>
+      </p:sp>
+      <p:sp>
+        <p:nvSpPr>
+          <p:cNvPr id="3" name="Vertical Text Placeholder 2"/>
           <p:cNvSpPr>
             <a:spLocks noGrp="1"/>
           </p:cNvSpPr>
@@ -527,8 +531,8 @@
         </p:nvSpPr>
         <p:spPr>
           <a:xfrm>
-            <a:off x="838200" y="365125"/>
-            <a:ext cx="7734300" cy="5811838"/>
+            <a:off x="838201" y="649111"/>
+            <a:ext cx="7734300" cy="10332156"/>
           </a:xfrm>
         </p:spPr>
         <p:txBody>
@@ -568,13 +572,13 @@
               <a:rPr lang="fr-FR" smtClean="0"/>
               <a:t>Cinquième niveau</a:t>
             </a:r>
-            <a:endParaRPr lang="fr-FR"/>
-          </a:p>
-        </p:txBody>
-      </p:sp>
-      <p:sp>
-        <p:nvSpPr>
-          <p:cNvPr id="4" name="Espace réservé de la date 3"/>
+            <a:endParaRPr lang="en-US" dirty="0"/>
+          </a:p>
+        </p:txBody>
+      </p:sp>
+      <p:sp>
+        <p:nvSpPr>
+          <p:cNvPr id="4" name="Date Placeholder 3"/>
           <p:cNvSpPr>
             <a:spLocks noGrp="1"/>
           </p:cNvSpPr>
@@ -589,7 +593,7 @@
           <a:p>
             <a:fld id="{C506BA6A-110B-4565-B24C-94066013DFC6}" type="datetimeFigureOut">
               <a:rPr lang="fr-FR" smtClean="0"/>
-              <a:t>09/08/2023</a:t>
+              <a:t>10/08/2023</a:t>
             </a:fld>
             <a:endParaRPr lang="fr-FR"/>
           </a:p>
@@ -597,7 +601,7 @@
       </p:sp>
       <p:sp>
         <p:nvSpPr>
-          <p:cNvPr id="5" name="Espace réservé du pied de page 4"/>
+          <p:cNvPr id="5" name="Footer Placeholder 4"/>
           <p:cNvSpPr>
             <a:spLocks noGrp="1"/>
           </p:cNvSpPr>
@@ -616,7 +620,7 @@
       </p:sp>
       <p:sp>
         <p:nvSpPr>
-          <p:cNvPr id="6" name="Espace réservé du numéro de diapositive 5"/>
+          <p:cNvPr id="6" name="Slide Number Placeholder 5"/>
           <p:cNvSpPr>
             <a:spLocks noGrp="1"/>
           </p:cNvSpPr>
@@ -640,7 +644,7 @@
     </p:spTree>
     <p:extLst>
       <p:ext uri="{BB962C8B-B14F-4D97-AF65-F5344CB8AC3E}">
-        <p14:creationId xmlns:p14="http://schemas.microsoft.com/office/powerpoint/2010/main" val="3789344472"/>
+        <p14:creationId xmlns:p14="http://schemas.microsoft.com/office/powerpoint/2010/main" val="1889407181"/>
       </p:ext>
     </p:extLst>
   </p:cSld>
@@ -669,7 +673,7 @@
       </p:grpSpPr>
       <p:sp>
         <p:nvSpPr>
-          <p:cNvPr id="2" name="Titre 1"/>
+          <p:cNvPr id="2" name="Title 1"/>
           <p:cNvSpPr>
             <a:spLocks noGrp="1"/>
           </p:cNvSpPr>
@@ -686,13 +690,13 @@
               <a:rPr lang="fr-FR" smtClean="0"/>
               <a:t>Modifiez le style du titre</a:t>
             </a:r>
-            <a:endParaRPr lang="fr-FR"/>
-          </a:p>
-        </p:txBody>
-      </p:sp>
-      <p:sp>
-        <p:nvSpPr>
-          <p:cNvPr id="3" name="Espace réservé du contenu 2"/>
+            <a:endParaRPr lang="en-US" dirty="0"/>
+          </a:p>
+        </p:txBody>
+      </p:sp>
+      <p:sp>
+        <p:nvSpPr>
+          <p:cNvPr id="3" name="Content Placeholder 2"/>
           <p:cNvSpPr>
             <a:spLocks noGrp="1"/>
           </p:cNvSpPr>
@@ -738,13 +742,13 @@
               <a:rPr lang="fr-FR" smtClean="0"/>
               <a:t>Cinquième niveau</a:t>
             </a:r>
-            <a:endParaRPr lang="fr-FR"/>
-          </a:p>
-        </p:txBody>
-      </p:sp>
-      <p:sp>
-        <p:nvSpPr>
-          <p:cNvPr id="4" name="Espace réservé de la date 3"/>
+            <a:endParaRPr lang="en-US" dirty="0"/>
+          </a:p>
+        </p:txBody>
+      </p:sp>
+      <p:sp>
+        <p:nvSpPr>
+          <p:cNvPr id="4" name="Date Placeholder 3"/>
           <p:cNvSpPr>
             <a:spLocks noGrp="1"/>
           </p:cNvSpPr>
@@ -759,7 +763,7 @@
           <a:p>
             <a:fld id="{C506BA6A-110B-4565-B24C-94066013DFC6}" type="datetimeFigureOut">
               <a:rPr lang="fr-FR" smtClean="0"/>
-              <a:t>09/08/2023</a:t>
+              <a:t>10/08/2023</a:t>
             </a:fld>
             <a:endParaRPr lang="fr-FR"/>
           </a:p>
@@ -767,7 +771,7 @@
       </p:sp>
       <p:sp>
         <p:nvSpPr>
-          <p:cNvPr id="5" name="Espace réservé du pied de page 4"/>
+          <p:cNvPr id="5" name="Footer Placeholder 4"/>
           <p:cNvSpPr>
             <a:spLocks noGrp="1"/>
           </p:cNvSpPr>
@@ -786,7 +790,7 @@
       </p:sp>
       <p:sp>
         <p:nvSpPr>
-          <p:cNvPr id="6" name="Espace réservé du numéro de diapositive 5"/>
+          <p:cNvPr id="6" name="Slide Number Placeholder 5"/>
           <p:cNvSpPr>
             <a:spLocks noGrp="1"/>
           </p:cNvSpPr>
@@ -810,7 +814,7 @@
     </p:spTree>
     <p:extLst>
       <p:ext uri="{BB962C8B-B14F-4D97-AF65-F5344CB8AC3E}">
-        <p14:creationId xmlns:p14="http://schemas.microsoft.com/office/powerpoint/2010/main" val="2944318978"/>
+        <p14:creationId xmlns:p14="http://schemas.microsoft.com/office/powerpoint/2010/main" val="1507433188"/>
       </p:ext>
     </p:extLst>
   </p:cSld>
@@ -839,7 +843,7 @@
       </p:grpSpPr>
       <p:sp>
         <p:nvSpPr>
-          <p:cNvPr id="2" name="Titre 1"/>
+          <p:cNvPr id="2" name="Title 1"/>
           <p:cNvSpPr>
             <a:spLocks noGrp="1"/>
           </p:cNvSpPr>
@@ -849,15 +853,15 @@
         </p:nvSpPr>
         <p:spPr>
           <a:xfrm>
-            <a:off x="831850" y="1709738"/>
-            <a:ext cx="10515600" cy="2852737"/>
+            <a:off x="831851" y="3039537"/>
+            <a:ext cx="10515600" cy="5071532"/>
           </a:xfrm>
         </p:spPr>
         <p:txBody>
           <a:bodyPr anchor="b"/>
           <a:lstStyle>
             <a:lvl1pPr>
-              <a:defRPr sz="6000"/>
+              <a:defRPr sz="8000"/>
             </a:lvl1pPr>
           </a:lstStyle>
           <a:p>
@@ -865,13 +869,13 @@
               <a:rPr lang="fr-FR" smtClean="0"/>
               <a:t>Modifiez le style du titre</a:t>
             </a:r>
-            <a:endParaRPr lang="fr-FR"/>
-          </a:p>
-        </p:txBody>
-      </p:sp>
-      <p:sp>
-        <p:nvSpPr>
-          <p:cNvPr id="3" name="Espace réservé du texte 2"/>
+            <a:endParaRPr lang="en-US" dirty="0"/>
+          </a:p>
+        </p:txBody>
+      </p:sp>
+      <p:sp>
+        <p:nvSpPr>
+          <p:cNvPr id="3" name="Text Placeholder 2"/>
           <p:cNvSpPr>
             <a:spLocks noGrp="1"/>
           </p:cNvSpPr>
@@ -881,14 +885,32 @@
         </p:nvSpPr>
         <p:spPr>
           <a:xfrm>
-            <a:off x="831850" y="4589463"/>
-            <a:ext cx="10515600" cy="1500187"/>
+            <a:off x="831851" y="8159048"/>
+            <a:ext cx="10515600" cy="2666999"/>
           </a:xfrm>
         </p:spPr>
         <p:txBody>
           <a:bodyPr/>
           <a:lstStyle>
             <a:lvl1pPr marL="0" indent="0">
+              <a:buNone/>
+              <a:defRPr sz="3200">
+                <a:solidFill>
+                  <a:schemeClr val="tx1"/>
+                </a:solidFill>
+              </a:defRPr>
+            </a:lvl1pPr>
+            <a:lvl2pPr marL="609585" indent="0">
+              <a:buNone/>
+              <a:defRPr sz="2667">
+                <a:solidFill>
+                  <a:schemeClr val="tx1">
+                    <a:tint val="75000"/>
+                  </a:schemeClr>
+                </a:solidFill>
+              </a:defRPr>
+            </a:lvl2pPr>
+            <a:lvl3pPr marL="1219170" indent="0">
               <a:buNone/>
               <a:defRPr sz="2400">
                 <a:solidFill>
@@ -897,30 +919,10 @@
                   </a:schemeClr>
                 </a:solidFill>
               </a:defRPr>
-            </a:lvl1pPr>
-            <a:lvl2pPr marL="457200" indent="0">
-              <a:buNone/>
-              <a:defRPr sz="2000">
-                <a:solidFill>
-                  <a:schemeClr val="tx1">
-                    <a:tint val="75000"/>
-                  </a:schemeClr>
-                </a:solidFill>
-              </a:defRPr>
-            </a:lvl2pPr>
-            <a:lvl3pPr marL="914400" indent="0">
-              <a:buNone/>
-              <a:defRPr sz="1800">
-                <a:solidFill>
-                  <a:schemeClr val="tx1">
-                    <a:tint val="75000"/>
-                  </a:schemeClr>
-                </a:solidFill>
-              </a:defRPr>
             </a:lvl3pPr>
-            <a:lvl4pPr marL="1371600" indent="0">
-              <a:buNone/>
-              <a:defRPr sz="1600">
+            <a:lvl4pPr marL="1828754" indent="0">
+              <a:buNone/>
+              <a:defRPr sz="2133">
                 <a:solidFill>
                   <a:schemeClr val="tx1">
                     <a:tint val="75000"/>
@@ -928,9 +930,9 @@
                 </a:solidFill>
               </a:defRPr>
             </a:lvl4pPr>
-            <a:lvl5pPr marL="1828800" indent="0">
-              <a:buNone/>
-              <a:defRPr sz="1600">
+            <a:lvl5pPr marL="2438339" indent="0">
+              <a:buNone/>
+              <a:defRPr sz="2133">
                 <a:solidFill>
                   <a:schemeClr val="tx1">
                     <a:tint val="75000"/>
@@ -938,9 +940,9 @@
                 </a:solidFill>
               </a:defRPr>
             </a:lvl5pPr>
-            <a:lvl6pPr marL="2286000" indent="0">
-              <a:buNone/>
-              <a:defRPr sz="1600">
+            <a:lvl6pPr marL="3047924" indent="0">
+              <a:buNone/>
+              <a:defRPr sz="2133">
                 <a:solidFill>
                   <a:schemeClr val="tx1">
                     <a:tint val="75000"/>
@@ -948,9 +950,9 @@
                 </a:solidFill>
               </a:defRPr>
             </a:lvl6pPr>
-            <a:lvl7pPr marL="2743200" indent="0">
-              <a:buNone/>
-              <a:defRPr sz="1600">
+            <a:lvl7pPr marL="3657509" indent="0">
+              <a:buNone/>
+              <a:defRPr sz="2133">
                 <a:solidFill>
                   <a:schemeClr val="tx1">
                     <a:tint val="75000"/>
@@ -958,9 +960,9 @@
                 </a:solidFill>
               </a:defRPr>
             </a:lvl7pPr>
-            <a:lvl8pPr marL="3200400" indent="0">
-              <a:buNone/>
-              <a:defRPr sz="1600">
+            <a:lvl8pPr marL="4267093" indent="0">
+              <a:buNone/>
+              <a:defRPr sz="2133">
                 <a:solidFill>
                   <a:schemeClr val="tx1">
                     <a:tint val="75000"/>
@@ -968,9 +970,9 @@
                 </a:solidFill>
               </a:defRPr>
             </a:lvl8pPr>
-            <a:lvl9pPr marL="3657600" indent="0">
-              <a:buNone/>
-              <a:defRPr sz="1600">
+            <a:lvl9pPr marL="4876678" indent="0">
+              <a:buNone/>
+              <a:defRPr sz="2133">
                 <a:solidFill>
                   <a:schemeClr val="tx1">
                     <a:tint val="75000"/>
@@ -990,7 +992,7 @@
       </p:sp>
       <p:sp>
         <p:nvSpPr>
-          <p:cNvPr id="4" name="Espace réservé de la date 3"/>
+          <p:cNvPr id="4" name="Date Placeholder 3"/>
           <p:cNvSpPr>
             <a:spLocks noGrp="1"/>
           </p:cNvSpPr>
@@ -1005,7 +1007,7 @@
           <a:p>
             <a:fld id="{C506BA6A-110B-4565-B24C-94066013DFC6}" type="datetimeFigureOut">
               <a:rPr lang="fr-FR" smtClean="0"/>
-              <a:t>09/08/2023</a:t>
+              <a:t>10/08/2023</a:t>
             </a:fld>
             <a:endParaRPr lang="fr-FR"/>
           </a:p>
@@ -1013,7 +1015,7 @@
       </p:sp>
       <p:sp>
         <p:nvSpPr>
-          <p:cNvPr id="5" name="Espace réservé du pied de page 4"/>
+          <p:cNvPr id="5" name="Footer Placeholder 4"/>
           <p:cNvSpPr>
             <a:spLocks noGrp="1"/>
           </p:cNvSpPr>
@@ -1032,7 +1034,7 @@
       </p:sp>
       <p:sp>
         <p:nvSpPr>
-          <p:cNvPr id="6" name="Espace réservé du numéro de diapositive 5"/>
+          <p:cNvPr id="6" name="Slide Number Placeholder 5"/>
           <p:cNvSpPr>
             <a:spLocks noGrp="1"/>
           </p:cNvSpPr>
@@ -1056,7 +1058,7 @@
     </p:spTree>
     <p:extLst>
       <p:ext uri="{BB962C8B-B14F-4D97-AF65-F5344CB8AC3E}">
-        <p14:creationId xmlns:p14="http://schemas.microsoft.com/office/powerpoint/2010/main" val="3403878336"/>
+        <p14:creationId xmlns:p14="http://schemas.microsoft.com/office/powerpoint/2010/main" val="3181152102"/>
       </p:ext>
     </p:extLst>
   </p:cSld>
@@ -1085,7 +1087,7 @@
       </p:grpSpPr>
       <p:sp>
         <p:nvSpPr>
-          <p:cNvPr id="2" name="Titre 1"/>
+          <p:cNvPr id="2" name="Title 1"/>
           <p:cNvSpPr>
             <a:spLocks noGrp="1"/>
           </p:cNvSpPr>
@@ -1102,13 +1104,13 @@
               <a:rPr lang="fr-FR" smtClean="0"/>
               <a:t>Modifiez le style du titre</a:t>
             </a:r>
-            <a:endParaRPr lang="fr-FR"/>
-          </a:p>
-        </p:txBody>
-      </p:sp>
-      <p:sp>
-        <p:nvSpPr>
-          <p:cNvPr id="3" name="Espace réservé du contenu 2"/>
+            <a:endParaRPr lang="en-US" dirty="0"/>
+          </a:p>
+        </p:txBody>
+      </p:sp>
+      <p:sp>
+        <p:nvSpPr>
+          <p:cNvPr id="3" name="Content Placeholder 2"/>
           <p:cNvSpPr>
             <a:spLocks noGrp="1"/>
           </p:cNvSpPr>
@@ -1118,8 +1120,8 @@
         </p:nvSpPr>
         <p:spPr>
           <a:xfrm>
-            <a:off x="838200" y="1825625"/>
-            <a:ext cx="5181600" cy="4351338"/>
+            <a:off x="838200" y="3245556"/>
+            <a:ext cx="5181600" cy="7735712"/>
           </a:xfrm>
         </p:spPr>
         <p:txBody>
@@ -1159,13 +1161,13 @@
               <a:rPr lang="fr-FR" smtClean="0"/>
               <a:t>Cinquième niveau</a:t>
             </a:r>
-            <a:endParaRPr lang="fr-FR"/>
-          </a:p>
-        </p:txBody>
-      </p:sp>
-      <p:sp>
-        <p:nvSpPr>
-          <p:cNvPr id="4" name="Espace réservé du contenu 3"/>
+            <a:endParaRPr lang="en-US" dirty="0"/>
+          </a:p>
+        </p:txBody>
+      </p:sp>
+      <p:sp>
+        <p:nvSpPr>
+          <p:cNvPr id="4" name="Content Placeholder 3"/>
           <p:cNvSpPr>
             <a:spLocks noGrp="1"/>
           </p:cNvSpPr>
@@ -1175,8 +1177,8 @@
         </p:nvSpPr>
         <p:spPr>
           <a:xfrm>
-            <a:off x="6172200" y="1825625"/>
-            <a:ext cx="5181600" cy="4351338"/>
+            <a:off x="6172200" y="3245556"/>
+            <a:ext cx="5181600" cy="7735712"/>
           </a:xfrm>
         </p:spPr>
         <p:txBody>
@@ -1216,13 +1218,13 @@
               <a:rPr lang="fr-FR" smtClean="0"/>
               <a:t>Cinquième niveau</a:t>
             </a:r>
-            <a:endParaRPr lang="fr-FR"/>
-          </a:p>
-        </p:txBody>
-      </p:sp>
-      <p:sp>
-        <p:nvSpPr>
-          <p:cNvPr id="5" name="Espace réservé de la date 4"/>
+            <a:endParaRPr lang="en-US" dirty="0"/>
+          </a:p>
+        </p:txBody>
+      </p:sp>
+      <p:sp>
+        <p:nvSpPr>
+          <p:cNvPr id="5" name="Date Placeholder 4"/>
           <p:cNvSpPr>
             <a:spLocks noGrp="1"/>
           </p:cNvSpPr>
@@ -1237,7 +1239,7 @@
           <a:p>
             <a:fld id="{C506BA6A-110B-4565-B24C-94066013DFC6}" type="datetimeFigureOut">
               <a:rPr lang="fr-FR" smtClean="0"/>
-              <a:t>09/08/2023</a:t>
+              <a:t>10/08/2023</a:t>
             </a:fld>
             <a:endParaRPr lang="fr-FR"/>
           </a:p>
@@ -1245,7 +1247,7 @@
       </p:sp>
       <p:sp>
         <p:nvSpPr>
-          <p:cNvPr id="6" name="Espace réservé du pied de page 5"/>
+          <p:cNvPr id="6" name="Footer Placeholder 5"/>
           <p:cNvSpPr>
             <a:spLocks noGrp="1"/>
           </p:cNvSpPr>
@@ -1264,7 +1266,7 @@
       </p:sp>
       <p:sp>
         <p:nvSpPr>
-          <p:cNvPr id="7" name="Espace réservé du numéro de diapositive 6"/>
+          <p:cNvPr id="7" name="Slide Number Placeholder 6"/>
           <p:cNvSpPr>
             <a:spLocks noGrp="1"/>
           </p:cNvSpPr>
@@ -1288,7 +1290,7 @@
     </p:spTree>
     <p:extLst>
       <p:ext uri="{BB962C8B-B14F-4D97-AF65-F5344CB8AC3E}">
-        <p14:creationId xmlns:p14="http://schemas.microsoft.com/office/powerpoint/2010/main" val="1236499118"/>
+        <p14:creationId xmlns:p14="http://schemas.microsoft.com/office/powerpoint/2010/main" val="3954583330"/>
       </p:ext>
     </p:extLst>
   </p:cSld>
@@ -1317,7 +1319,7 @@
       </p:grpSpPr>
       <p:sp>
         <p:nvSpPr>
-          <p:cNvPr id="2" name="Titre 1"/>
+          <p:cNvPr id="2" name="Title 1"/>
           <p:cNvSpPr>
             <a:spLocks noGrp="1"/>
           </p:cNvSpPr>
@@ -1327,8 +1329,8 @@
         </p:nvSpPr>
         <p:spPr>
           <a:xfrm>
-            <a:off x="839788" y="365125"/>
-            <a:ext cx="10515600" cy="1325563"/>
+            <a:off x="839788" y="649114"/>
+            <a:ext cx="10515600" cy="2356556"/>
           </a:xfrm>
         </p:spPr>
         <p:txBody>
@@ -1339,13 +1341,13 @@
               <a:rPr lang="fr-FR" smtClean="0"/>
               <a:t>Modifiez le style du titre</a:t>
             </a:r>
-            <a:endParaRPr lang="fr-FR"/>
-          </a:p>
-        </p:txBody>
-      </p:sp>
-      <p:sp>
-        <p:nvSpPr>
-          <p:cNvPr id="3" name="Espace réservé du texte 2"/>
+            <a:endParaRPr lang="en-US" dirty="0"/>
+          </a:p>
+        </p:txBody>
+      </p:sp>
+      <p:sp>
+        <p:nvSpPr>
+          <p:cNvPr id="3" name="Text Placeholder 2"/>
           <p:cNvSpPr>
             <a:spLocks noGrp="1"/>
           </p:cNvSpPr>
@@ -1355,8 +1357,8 @@
         </p:nvSpPr>
         <p:spPr>
           <a:xfrm>
-            <a:off x="839788" y="1681163"/>
-            <a:ext cx="5157787" cy="823912"/>
+            <a:off x="839789" y="2988734"/>
+            <a:ext cx="5157787" cy="1464732"/>
           </a:xfrm>
         </p:spPr>
         <p:txBody>
@@ -1364,39 +1366,39 @@
           <a:lstStyle>
             <a:lvl1pPr marL="0" indent="0">
               <a:buNone/>
+              <a:defRPr sz="3200" b="1"/>
+            </a:lvl1pPr>
+            <a:lvl2pPr marL="609585" indent="0">
+              <a:buNone/>
+              <a:defRPr sz="2667" b="1"/>
+            </a:lvl2pPr>
+            <a:lvl3pPr marL="1219170" indent="0">
+              <a:buNone/>
               <a:defRPr sz="2400" b="1"/>
-            </a:lvl1pPr>
-            <a:lvl2pPr marL="457200" indent="0">
-              <a:buNone/>
-              <a:defRPr sz="2000" b="1"/>
-            </a:lvl2pPr>
-            <a:lvl3pPr marL="914400" indent="0">
-              <a:buNone/>
-              <a:defRPr sz="1800" b="1"/>
             </a:lvl3pPr>
-            <a:lvl4pPr marL="1371600" indent="0">
-              <a:buNone/>
-              <a:defRPr sz="1600" b="1"/>
+            <a:lvl4pPr marL="1828754" indent="0">
+              <a:buNone/>
+              <a:defRPr sz="2133" b="1"/>
             </a:lvl4pPr>
-            <a:lvl5pPr marL="1828800" indent="0">
-              <a:buNone/>
-              <a:defRPr sz="1600" b="1"/>
+            <a:lvl5pPr marL="2438339" indent="0">
+              <a:buNone/>
+              <a:defRPr sz="2133" b="1"/>
             </a:lvl5pPr>
-            <a:lvl6pPr marL="2286000" indent="0">
-              <a:buNone/>
-              <a:defRPr sz="1600" b="1"/>
+            <a:lvl6pPr marL="3047924" indent="0">
+              <a:buNone/>
+              <a:defRPr sz="2133" b="1"/>
             </a:lvl6pPr>
-            <a:lvl7pPr marL="2743200" indent="0">
-              <a:buNone/>
-              <a:defRPr sz="1600" b="1"/>
+            <a:lvl7pPr marL="3657509" indent="0">
+              <a:buNone/>
+              <a:defRPr sz="2133" b="1"/>
             </a:lvl7pPr>
-            <a:lvl8pPr marL="3200400" indent="0">
-              <a:buNone/>
-              <a:defRPr sz="1600" b="1"/>
+            <a:lvl8pPr marL="4267093" indent="0">
+              <a:buNone/>
+              <a:defRPr sz="2133" b="1"/>
             </a:lvl8pPr>
-            <a:lvl9pPr marL="3657600" indent="0">
-              <a:buNone/>
-              <a:defRPr sz="1600" b="1"/>
+            <a:lvl9pPr marL="4876678" indent="0">
+              <a:buNone/>
+              <a:defRPr sz="2133" b="1"/>
             </a:lvl9pPr>
           </a:lstStyle>
           <a:p>
@@ -1410,7 +1412,7 @@
       </p:sp>
       <p:sp>
         <p:nvSpPr>
-          <p:cNvPr id="4" name="Espace réservé du contenu 3"/>
+          <p:cNvPr id="4" name="Content Placeholder 3"/>
           <p:cNvSpPr>
             <a:spLocks noGrp="1"/>
           </p:cNvSpPr>
@@ -1420,8 +1422,8 @@
         </p:nvSpPr>
         <p:spPr>
           <a:xfrm>
-            <a:off x="839788" y="2505075"/>
-            <a:ext cx="5157787" cy="3684588"/>
+            <a:off x="839789" y="4453467"/>
+            <a:ext cx="5157787" cy="6550379"/>
           </a:xfrm>
         </p:spPr>
         <p:txBody>
@@ -1461,13 +1463,13 @@
               <a:rPr lang="fr-FR" smtClean="0"/>
               <a:t>Cinquième niveau</a:t>
             </a:r>
-            <a:endParaRPr lang="fr-FR"/>
-          </a:p>
-        </p:txBody>
-      </p:sp>
-      <p:sp>
-        <p:nvSpPr>
-          <p:cNvPr id="5" name="Espace réservé du texte 4"/>
+            <a:endParaRPr lang="en-US" dirty="0"/>
+          </a:p>
+        </p:txBody>
+      </p:sp>
+      <p:sp>
+        <p:nvSpPr>
+          <p:cNvPr id="5" name="Text Placeholder 4"/>
           <p:cNvSpPr>
             <a:spLocks noGrp="1"/>
           </p:cNvSpPr>
@@ -1477,8 +1479,8 @@
         </p:nvSpPr>
         <p:spPr>
           <a:xfrm>
-            <a:off x="6172200" y="1681163"/>
-            <a:ext cx="5183188" cy="823912"/>
+            <a:off x="6172201" y="2988734"/>
+            <a:ext cx="5183188" cy="1464732"/>
           </a:xfrm>
         </p:spPr>
         <p:txBody>
@@ -1486,39 +1488,39 @@
           <a:lstStyle>
             <a:lvl1pPr marL="0" indent="0">
               <a:buNone/>
+              <a:defRPr sz="3200" b="1"/>
+            </a:lvl1pPr>
+            <a:lvl2pPr marL="609585" indent="0">
+              <a:buNone/>
+              <a:defRPr sz="2667" b="1"/>
+            </a:lvl2pPr>
+            <a:lvl3pPr marL="1219170" indent="0">
+              <a:buNone/>
               <a:defRPr sz="2400" b="1"/>
-            </a:lvl1pPr>
-            <a:lvl2pPr marL="457200" indent="0">
-              <a:buNone/>
-              <a:defRPr sz="2000" b="1"/>
-            </a:lvl2pPr>
-            <a:lvl3pPr marL="914400" indent="0">
-              <a:buNone/>
-              <a:defRPr sz="1800" b="1"/>
             </a:lvl3pPr>
-            <a:lvl4pPr marL="1371600" indent="0">
-              <a:buNone/>
-              <a:defRPr sz="1600" b="1"/>
+            <a:lvl4pPr marL="1828754" indent="0">
+              <a:buNone/>
+              <a:defRPr sz="2133" b="1"/>
             </a:lvl4pPr>
-            <a:lvl5pPr marL="1828800" indent="0">
-              <a:buNone/>
-              <a:defRPr sz="1600" b="1"/>
+            <a:lvl5pPr marL="2438339" indent="0">
+              <a:buNone/>
+              <a:defRPr sz="2133" b="1"/>
             </a:lvl5pPr>
-            <a:lvl6pPr marL="2286000" indent="0">
-              <a:buNone/>
-              <a:defRPr sz="1600" b="1"/>
+            <a:lvl6pPr marL="3047924" indent="0">
+              <a:buNone/>
+              <a:defRPr sz="2133" b="1"/>
             </a:lvl6pPr>
-            <a:lvl7pPr marL="2743200" indent="0">
-              <a:buNone/>
-              <a:defRPr sz="1600" b="1"/>
+            <a:lvl7pPr marL="3657509" indent="0">
+              <a:buNone/>
+              <a:defRPr sz="2133" b="1"/>
             </a:lvl7pPr>
-            <a:lvl8pPr marL="3200400" indent="0">
-              <a:buNone/>
-              <a:defRPr sz="1600" b="1"/>
+            <a:lvl8pPr marL="4267093" indent="0">
+              <a:buNone/>
+              <a:defRPr sz="2133" b="1"/>
             </a:lvl8pPr>
-            <a:lvl9pPr marL="3657600" indent="0">
-              <a:buNone/>
-              <a:defRPr sz="1600" b="1"/>
+            <a:lvl9pPr marL="4876678" indent="0">
+              <a:buNone/>
+              <a:defRPr sz="2133" b="1"/>
             </a:lvl9pPr>
           </a:lstStyle>
           <a:p>
@@ -1532,7 +1534,7 @@
       </p:sp>
       <p:sp>
         <p:nvSpPr>
-          <p:cNvPr id="6" name="Espace réservé du contenu 5"/>
+          <p:cNvPr id="6" name="Content Placeholder 5"/>
           <p:cNvSpPr>
             <a:spLocks noGrp="1"/>
           </p:cNvSpPr>
@@ -1542,8 +1544,8 @@
         </p:nvSpPr>
         <p:spPr>
           <a:xfrm>
-            <a:off x="6172200" y="2505075"/>
-            <a:ext cx="5183188" cy="3684588"/>
+            <a:off x="6172201" y="4453467"/>
+            <a:ext cx="5183188" cy="6550379"/>
           </a:xfrm>
         </p:spPr>
         <p:txBody>
@@ -1583,13 +1585,13 @@
               <a:rPr lang="fr-FR" smtClean="0"/>
               <a:t>Cinquième niveau</a:t>
             </a:r>
-            <a:endParaRPr lang="fr-FR"/>
-          </a:p>
-        </p:txBody>
-      </p:sp>
-      <p:sp>
-        <p:nvSpPr>
-          <p:cNvPr id="7" name="Espace réservé de la date 6"/>
+            <a:endParaRPr lang="en-US" dirty="0"/>
+          </a:p>
+        </p:txBody>
+      </p:sp>
+      <p:sp>
+        <p:nvSpPr>
+          <p:cNvPr id="7" name="Date Placeholder 6"/>
           <p:cNvSpPr>
             <a:spLocks noGrp="1"/>
           </p:cNvSpPr>
@@ -1604,7 +1606,7 @@
           <a:p>
             <a:fld id="{C506BA6A-110B-4565-B24C-94066013DFC6}" type="datetimeFigureOut">
               <a:rPr lang="fr-FR" smtClean="0"/>
-              <a:t>09/08/2023</a:t>
+              <a:t>10/08/2023</a:t>
             </a:fld>
             <a:endParaRPr lang="fr-FR"/>
           </a:p>
@@ -1612,7 +1614,7 @@
       </p:sp>
       <p:sp>
         <p:nvSpPr>
-          <p:cNvPr id="8" name="Espace réservé du pied de page 7"/>
+          <p:cNvPr id="8" name="Footer Placeholder 7"/>
           <p:cNvSpPr>
             <a:spLocks noGrp="1"/>
           </p:cNvSpPr>
@@ -1631,7 +1633,7 @@
       </p:sp>
       <p:sp>
         <p:nvSpPr>
-          <p:cNvPr id="9" name="Espace réservé du numéro de diapositive 8"/>
+          <p:cNvPr id="9" name="Slide Number Placeholder 8"/>
           <p:cNvSpPr>
             <a:spLocks noGrp="1"/>
           </p:cNvSpPr>
@@ -1655,7 +1657,7 @@
     </p:spTree>
     <p:extLst>
       <p:ext uri="{BB962C8B-B14F-4D97-AF65-F5344CB8AC3E}">
-        <p14:creationId xmlns:p14="http://schemas.microsoft.com/office/powerpoint/2010/main" val="4082412552"/>
+        <p14:creationId xmlns:p14="http://schemas.microsoft.com/office/powerpoint/2010/main" val="390310861"/>
       </p:ext>
     </p:extLst>
   </p:cSld>
@@ -1684,7 +1686,7 @@
       </p:grpSpPr>
       <p:sp>
         <p:nvSpPr>
-          <p:cNvPr id="2" name="Titre 1"/>
+          <p:cNvPr id="2" name="Title 1"/>
           <p:cNvSpPr>
             <a:spLocks noGrp="1"/>
           </p:cNvSpPr>
@@ -1701,13 +1703,13 @@
               <a:rPr lang="fr-FR" smtClean="0"/>
               <a:t>Modifiez le style du titre</a:t>
             </a:r>
-            <a:endParaRPr lang="fr-FR"/>
-          </a:p>
-        </p:txBody>
-      </p:sp>
-      <p:sp>
-        <p:nvSpPr>
-          <p:cNvPr id="3" name="Espace réservé de la date 2"/>
+            <a:endParaRPr lang="en-US" dirty="0"/>
+          </a:p>
+        </p:txBody>
+      </p:sp>
+      <p:sp>
+        <p:nvSpPr>
+          <p:cNvPr id="3" name="Date Placeholder 2"/>
           <p:cNvSpPr>
             <a:spLocks noGrp="1"/>
           </p:cNvSpPr>
@@ -1722,7 +1724,7 @@
           <a:p>
             <a:fld id="{C506BA6A-110B-4565-B24C-94066013DFC6}" type="datetimeFigureOut">
               <a:rPr lang="fr-FR" smtClean="0"/>
-              <a:t>09/08/2023</a:t>
+              <a:t>10/08/2023</a:t>
             </a:fld>
             <a:endParaRPr lang="fr-FR"/>
           </a:p>
@@ -1730,7 +1732,7 @@
       </p:sp>
       <p:sp>
         <p:nvSpPr>
-          <p:cNvPr id="4" name="Espace réservé du pied de page 3"/>
+          <p:cNvPr id="4" name="Footer Placeholder 3"/>
           <p:cNvSpPr>
             <a:spLocks noGrp="1"/>
           </p:cNvSpPr>
@@ -1749,7 +1751,7 @@
       </p:sp>
       <p:sp>
         <p:nvSpPr>
-          <p:cNvPr id="5" name="Espace réservé du numéro de diapositive 4"/>
+          <p:cNvPr id="5" name="Slide Number Placeholder 4"/>
           <p:cNvSpPr>
             <a:spLocks noGrp="1"/>
           </p:cNvSpPr>
@@ -1773,7 +1775,7 @@
     </p:spTree>
     <p:extLst>
       <p:ext uri="{BB962C8B-B14F-4D97-AF65-F5344CB8AC3E}">
-        <p14:creationId xmlns:p14="http://schemas.microsoft.com/office/powerpoint/2010/main" val="3496443306"/>
+        <p14:creationId xmlns:p14="http://schemas.microsoft.com/office/powerpoint/2010/main" val="480397455"/>
       </p:ext>
     </p:extLst>
   </p:cSld>
@@ -1802,7 +1804,7 @@
       </p:grpSpPr>
       <p:sp>
         <p:nvSpPr>
-          <p:cNvPr id="2" name="Espace réservé de la date 1"/>
+          <p:cNvPr id="2" name="Date Placeholder 1"/>
           <p:cNvSpPr>
             <a:spLocks noGrp="1"/>
           </p:cNvSpPr>
@@ -1817,7 +1819,7 @@
           <a:p>
             <a:fld id="{C506BA6A-110B-4565-B24C-94066013DFC6}" type="datetimeFigureOut">
               <a:rPr lang="fr-FR" smtClean="0"/>
-              <a:t>09/08/2023</a:t>
+              <a:t>10/08/2023</a:t>
             </a:fld>
             <a:endParaRPr lang="fr-FR"/>
           </a:p>
@@ -1825,7 +1827,7 @@
       </p:sp>
       <p:sp>
         <p:nvSpPr>
-          <p:cNvPr id="3" name="Espace réservé du pied de page 2"/>
+          <p:cNvPr id="3" name="Footer Placeholder 2"/>
           <p:cNvSpPr>
             <a:spLocks noGrp="1"/>
           </p:cNvSpPr>
@@ -1844,7 +1846,7 @@
       </p:sp>
       <p:sp>
         <p:nvSpPr>
-          <p:cNvPr id="4" name="Espace réservé du numéro de diapositive 3"/>
+          <p:cNvPr id="4" name="Slide Number Placeholder 3"/>
           <p:cNvSpPr>
             <a:spLocks noGrp="1"/>
           </p:cNvSpPr>
@@ -1868,7 +1870,7 @@
     </p:spTree>
     <p:extLst>
       <p:ext uri="{BB962C8B-B14F-4D97-AF65-F5344CB8AC3E}">
-        <p14:creationId xmlns:p14="http://schemas.microsoft.com/office/powerpoint/2010/main" val="3600610699"/>
+        <p14:creationId xmlns:p14="http://schemas.microsoft.com/office/powerpoint/2010/main" val="1165209314"/>
       </p:ext>
     </p:extLst>
   </p:cSld>
@@ -1897,7 +1899,7 @@
       </p:grpSpPr>
       <p:sp>
         <p:nvSpPr>
-          <p:cNvPr id="2" name="Titre 1"/>
+          <p:cNvPr id="2" name="Title 1"/>
           <p:cNvSpPr>
             <a:spLocks noGrp="1"/>
           </p:cNvSpPr>
@@ -1907,15 +1909,15 @@
         </p:nvSpPr>
         <p:spPr>
           <a:xfrm>
-            <a:off x="839788" y="457200"/>
-            <a:ext cx="3932237" cy="1600200"/>
+            <a:off x="839788" y="812800"/>
+            <a:ext cx="3932237" cy="2844800"/>
           </a:xfrm>
         </p:spPr>
         <p:txBody>
           <a:bodyPr anchor="b"/>
           <a:lstStyle>
             <a:lvl1pPr>
-              <a:defRPr sz="3200"/>
+              <a:defRPr sz="4267"/>
             </a:lvl1pPr>
           </a:lstStyle>
           <a:p>
@@ -1923,13 +1925,13 @@
               <a:rPr lang="fr-FR" smtClean="0"/>
               <a:t>Modifiez le style du titre</a:t>
             </a:r>
-            <a:endParaRPr lang="fr-FR"/>
-          </a:p>
-        </p:txBody>
-      </p:sp>
-      <p:sp>
-        <p:nvSpPr>
-          <p:cNvPr id="3" name="Espace réservé du contenu 2"/>
+            <a:endParaRPr lang="en-US" dirty="0"/>
+          </a:p>
+        </p:txBody>
+      </p:sp>
+      <p:sp>
+        <p:nvSpPr>
+          <p:cNvPr id="3" name="Content Placeholder 2"/>
           <p:cNvSpPr>
             <a:spLocks noGrp="1"/>
           </p:cNvSpPr>
@@ -1939,39 +1941,39 @@
         </p:nvSpPr>
         <p:spPr>
           <a:xfrm>
-            <a:off x="5183188" y="987425"/>
-            <a:ext cx="6172200" cy="4873625"/>
+            <a:off x="5183188" y="1755425"/>
+            <a:ext cx="6172200" cy="8664222"/>
           </a:xfrm>
         </p:spPr>
         <p:txBody>
           <a:bodyPr/>
           <a:lstStyle>
             <a:lvl1pPr>
-              <a:defRPr sz="3200"/>
+              <a:defRPr sz="4267"/>
             </a:lvl1pPr>
             <a:lvl2pPr>
-              <a:defRPr sz="2800"/>
+              <a:defRPr sz="3733"/>
             </a:lvl2pPr>
             <a:lvl3pPr>
-              <a:defRPr sz="2400"/>
+              <a:defRPr sz="3200"/>
             </a:lvl3pPr>
             <a:lvl4pPr>
-              <a:defRPr sz="2000"/>
+              <a:defRPr sz="2667"/>
             </a:lvl4pPr>
             <a:lvl5pPr>
-              <a:defRPr sz="2000"/>
+              <a:defRPr sz="2667"/>
             </a:lvl5pPr>
             <a:lvl6pPr>
-              <a:defRPr sz="2000"/>
+              <a:defRPr sz="2667"/>
             </a:lvl6pPr>
             <a:lvl7pPr>
-              <a:defRPr sz="2000"/>
+              <a:defRPr sz="2667"/>
             </a:lvl7pPr>
             <a:lvl8pPr>
-              <a:defRPr sz="2000"/>
+              <a:defRPr sz="2667"/>
             </a:lvl8pPr>
             <a:lvl9pPr>
-              <a:defRPr sz="2000"/>
+              <a:defRPr sz="2667"/>
             </a:lvl9pPr>
           </a:lstStyle>
           <a:p>
@@ -2008,13 +2010,13 @@
               <a:rPr lang="fr-FR" smtClean="0"/>
               <a:t>Cinquième niveau</a:t>
             </a:r>
-            <a:endParaRPr lang="fr-FR"/>
-          </a:p>
-        </p:txBody>
-      </p:sp>
-      <p:sp>
-        <p:nvSpPr>
-          <p:cNvPr id="4" name="Espace réservé du texte 3"/>
+            <a:endParaRPr lang="en-US" dirty="0"/>
+          </a:p>
+        </p:txBody>
+      </p:sp>
+      <p:sp>
+        <p:nvSpPr>
+          <p:cNvPr id="4" name="Text Placeholder 3"/>
           <p:cNvSpPr>
             <a:spLocks noGrp="1"/>
           </p:cNvSpPr>
@@ -2024,8 +2026,8 @@
         </p:nvSpPr>
         <p:spPr>
           <a:xfrm>
-            <a:off x="839788" y="2057400"/>
-            <a:ext cx="3932237" cy="3811588"/>
+            <a:off x="839788" y="3657600"/>
+            <a:ext cx="3932237" cy="6776156"/>
           </a:xfrm>
         </p:spPr>
         <p:txBody>
@@ -2033,39 +2035,39 @@
           <a:lstStyle>
             <a:lvl1pPr marL="0" indent="0">
               <a:buNone/>
+              <a:defRPr sz="2133"/>
+            </a:lvl1pPr>
+            <a:lvl2pPr marL="609585" indent="0">
+              <a:buNone/>
+              <a:defRPr sz="1867"/>
+            </a:lvl2pPr>
+            <a:lvl3pPr marL="1219170" indent="0">
+              <a:buNone/>
               <a:defRPr sz="1600"/>
-            </a:lvl1pPr>
-            <a:lvl2pPr marL="457200" indent="0">
-              <a:buNone/>
-              <a:defRPr sz="1400"/>
-            </a:lvl2pPr>
-            <a:lvl3pPr marL="914400" indent="0">
-              <a:buNone/>
-              <a:defRPr sz="1200"/>
             </a:lvl3pPr>
-            <a:lvl4pPr marL="1371600" indent="0">
-              <a:buNone/>
-              <a:defRPr sz="1000"/>
+            <a:lvl4pPr marL="1828754" indent="0">
+              <a:buNone/>
+              <a:defRPr sz="1333"/>
             </a:lvl4pPr>
-            <a:lvl5pPr marL="1828800" indent="0">
-              <a:buNone/>
-              <a:defRPr sz="1000"/>
+            <a:lvl5pPr marL="2438339" indent="0">
+              <a:buNone/>
+              <a:defRPr sz="1333"/>
             </a:lvl5pPr>
-            <a:lvl6pPr marL="2286000" indent="0">
-              <a:buNone/>
-              <a:defRPr sz="1000"/>
+            <a:lvl6pPr marL="3047924" indent="0">
+              <a:buNone/>
+              <a:defRPr sz="1333"/>
             </a:lvl6pPr>
-            <a:lvl7pPr marL="2743200" indent="0">
-              <a:buNone/>
-              <a:defRPr sz="1000"/>
+            <a:lvl7pPr marL="3657509" indent="0">
+              <a:buNone/>
+              <a:defRPr sz="1333"/>
             </a:lvl7pPr>
-            <a:lvl8pPr marL="3200400" indent="0">
-              <a:buNone/>
-              <a:defRPr sz="1000"/>
+            <a:lvl8pPr marL="4267093" indent="0">
+              <a:buNone/>
+              <a:defRPr sz="1333"/>
             </a:lvl8pPr>
-            <a:lvl9pPr marL="3657600" indent="0">
-              <a:buNone/>
-              <a:defRPr sz="1000"/>
+            <a:lvl9pPr marL="4876678" indent="0">
+              <a:buNone/>
+              <a:defRPr sz="1333"/>
             </a:lvl9pPr>
           </a:lstStyle>
           <a:p>
@@ -2079,7 +2081,7 @@
       </p:sp>
       <p:sp>
         <p:nvSpPr>
-          <p:cNvPr id="5" name="Espace réservé de la date 4"/>
+          <p:cNvPr id="5" name="Date Placeholder 4"/>
           <p:cNvSpPr>
             <a:spLocks noGrp="1"/>
           </p:cNvSpPr>
@@ -2094,7 +2096,7 @@
           <a:p>
             <a:fld id="{C506BA6A-110B-4565-B24C-94066013DFC6}" type="datetimeFigureOut">
               <a:rPr lang="fr-FR" smtClean="0"/>
-              <a:t>09/08/2023</a:t>
+              <a:t>10/08/2023</a:t>
             </a:fld>
             <a:endParaRPr lang="fr-FR"/>
           </a:p>
@@ -2102,7 +2104,7 @@
       </p:sp>
       <p:sp>
         <p:nvSpPr>
-          <p:cNvPr id="6" name="Espace réservé du pied de page 5"/>
+          <p:cNvPr id="6" name="Footer Placeholder 5"/>
           <p:cNvSpPr>
             <a:spLocks noGrp="1"/>
           </p:cNvSpPr>
@@ -2121,7 +2123,7 @@
       </p:sp>
       <p:sp>
         <p:nvSpPr>
-          <p:cNvPr id="7" name="Espace réservé du numéro de diapositive 6"/>
+          <p:cNvPr id="7" name="Slide Number Placeholder 6"/>
           <p:cNvSpPr>
             <a:spLocks noGrp="1"/>
           </p:cNvSpPr>
@@ -2145,7 +2147,7 @@
     </p:spTree>
     <p:extLst>
       <p:ext uri="{BB962C8B-B14F-4D97-AF65-F5344CB8AC3E}">
-        <p14:creationId xmlns:p14="http://schemas.microsoft.com/office/powerpoint/2010/main" val="3543831648"/>
+        <p14:creationId xmlns:p14="http://schemas.microsoft.com/office/powerpoint/2010/main" val="574707665"/>
       </p:ext>
     </p:extLst>
   </p:cSld>
@@ -2174,7 +2176,7 @@
       </p:grpSpPr>
       <p:sp>
         <p:nvSpPr>
-          <p:cNvPr id="2" name="Titre 1"/>
+          <p:cNvPr id="2" name="Title 1"/>
           <p:cNvSpPr>
             <a:spLocks noGrp="1"/>
           </p:cNvSpPr>
@@ -2184,15 +2186,15 @@
         </p:nvSpPr>
         <p:spPr>
           <a:xfrm>
-            <a:off x="839788" y="457200"/>
-            <a:ext cx="3932237" cy="1600200"/>
+            <a:off x="839788" y="812800"/>
+            <a:ext cx="3932237" cy="2844800"/>
           </a:xfrm>
         </p:spPr>
         <p:txBody>
           <a:bodyPr anchor="b"/>
           <a:lstStyle>
             <a:lvl1pPr>
-              <a:defRPr sz="3200"/>
+              <a:defRPr sz="4267"/>
             </a:lvl1pPr>
           </a:lstStyle>
           <a:p>
@@ -2200,15 +2202,15 @@
               <a:rPr lang="fr-FR" smtClean="0"/>
               <a:t>Modifiez le style du titre</a:t>
             </a:r>
-            <a:endParaRPr lang="fr-FR"/>
-          </a:p>
-        </p:txBody>
-      </p:sp>
-      <p:sp>
-        <p:nvSpPr>
-          <p:cNvPr id="3" name="Espace réservé pour une image  2"/>
-          <p:cNvSpPr>
-            <a:spLocks noGrp="1"/>
+            <a:endParaRPr lang="en-US" dirty="0"/>
+          </a:p>
+        </p:txBody>
+      </p:sp>
+      <p:sp>
+        <p:nvSpPr>
+          <p:cNvPr id="3" name="Picture Placeholder 2"/>
+          <p:cNvSpPr>
+            <a:spLocks noGrp="1" noChangeAspect="1"/>
           </p:cNvSpPr>
           <p:nvPr>
             <p:ph type="pic" idx="1"/>
@@ -2216,8 +2218,73 @@
         </p:nvSpPr>
         <p:spPr>
           <a:xfrm>
-            <a:off x="5183188" y="987425"/>
-            <a:ext cx="6172200" cy="4873625"/>
+            <a:off x="5183188" y="1755425"/>
+            <a:ext cx="6172200" cy="8664222"/>
+          </a:xfrm>
+        </p:spPr>
+        <p:txBody>
+          <a:bodyPr anchor="t"/>
+          <a:lstStyle>
+            <a:lvl1pPr marL="0" indent="0">
+              <a:buNone/>
+              <a:defRPr sz="4267"/>
+            </a:lvl1pPr>
+            <a:lvl2pPr marL="609585" indent="0">
+              <a:buNone/>
+              <a:defRPr sz="3733"/>
+            </a:lvl2pPr>
+            <a:lvl3pPr marL="1219170" indent="0">
+              <a:buNone/>
+              <a:defRPr sz="3200"/>
+            </a:lvl3pPr>
+            <a:lvl4pPr marL="1828754" indent="0">
+              <a:buNone/>
+              <a:defRPr sz="2667"/>
+            </a:lvl4pPr>
+            <a:lvl5pPr marL="2438339" indent="0">
+              <a:buNone/>
+              <a:defRPr sz="2667"/>
+            </a:lvl5pPr>
+            <a:lvl6pPr marL="3047924" indent="0">
+              <a:buNone/>
+              <a:defRPr sz="2667"/>
+            </a:lvl6pPr>
+            <a:lvl7pPr marL="3657509" indent="0">
+              <a:buNone/>
+              <a:defRPr sz="2667"/>
+            </a:lvl7pPr>
+            <a:lvl8pPr marL="4267093" indent="0">
+              <a:buNone/>
+              <a:defRPr sz="2667"/>
+            </a:lvl8pPr>
+            <a:lvl9pPr marL="4876678" indent="0">
+              <a:buNone/>
+              <a:defRPr sz="2667"/>
+            </a:lvl9pPr>
+          </a:lstStyle>
+          <a:p>
+            <a:r>
+              <a:rPr lang="fr-FR" smtClean="0"/>
+              <a:t>Cliquez sur l'icône pour ajouter une image</a:t>
+            </a:r>
+            <a:endParaRPr lang="en-US" dirty="0"/>
+          </a:p>
+        </p:txBody>
+      </p:sp>
+      <p:sp>
+        <p:nvSpPr>
+          <p:cNvPr id="4" name="Text Placeholder 3"/>
+          <p:cNvSpPr>
+            <a:spLocks noGrp="1"/>
+          </p:cNvSpPr>
+          <p:nvPr>
+            <p:ph type="body" sz="half" idx="2"/>
+          </p:nvPr>
+        </p:nvSpPr>
+        <p:spPr>
+          <a:xfrm>
+            <a:off x="839788" y="3657600"/>
+            <a:ext cx="3932237" cy="6776156"/>
           </a:xfrm>
         </p:spPr>
         <p:txBody>
@@ -2225,129 +2292,68 @@
           <a:lstStyle>
             <a:lvl1pPr marL="0" indent="0">
               <a:buNone/>
-              <a:defRPr sz="3200"/>
+              <a:defRPr sz="2133"/>
             </a:lvl1pPr>
-            <a:lvl2pPr marL="457200" indent="0">
-              <a:buNone/>
-              <a:defRPr sz="2800"/>
+            <a:lvl2pPr marL="609585" indent="0">
+              <a:buNone/>
+              <a:defRPr sz="1867"/>
             </a:lvl2pPr>
-            <a:lvl3pPr marL="914400" indent="0">
-              <a:buNone/>
-              <a:defRPr sz="2400"/>
+            <a:lvl3pPr marL="1219170" indent="0">
+              <a:buNone/>
+              <a:defRPr sz="1600"/>
             </a:lvl3pPr>
-            <a:lvl4pPr marL="1371600" indent="0">
-              <a:buNone/>
-              <a:defRPr sz="2000"/>
+            <a:lvl4pPr marL="1828754" indent="0">
+              <a:buNone/>
+              <a:defRPr sz="1333"/>
             </a:lvl4pPr>
-            <a:lvl5pPr marL="1828800" indent="0">
-              <a:buNone/>
-              <a:defRPr sz="2000"/>
+            <a:lvl5pPr marL="2438339" indent="0">
+              <a:buNone/>
+              <a:defRPr sz="1333"/>
             </a:lvl5pPr>
-            <a:lvl6pPr marL="2286000" indent="0">
-              <a:buNone/>
-              <a:defRPr sz="2000"/>
+            <a:lvl6pPr marL="3047924" indent="0">
+              <a:buNone/>
+              <a:defRPr sz="1333"/>
             </a:lvl6pPr>
-            <a:lvl7pPr marL="2743200" indent="0">
-              <a:buNone/>
-              <a:defRPr sz="2000"/>
+            <a:lvl7pPr marL="3657509" indent="0">
+              <a:buNone/>
+              <a:defRPr sz="1333"/>
             </a:lvl7pPr>
-            <a:lvl8pPr marL="3200400" indent="0">
-              <a:buNone/>
-              <a:defRPr sz="2000"/>
+            <a:lvl8pPr marL="4267093" indent="0">
+              <a:buNone/>
+              <a:defRPr sz="1333"/>
             </a:lvl8pPr>
-            <a:lvl9pPr marL="3657600" indent="0">
-              <a:buNone/>
-              <a:defRPr sz="2000"/>
+            <a:lvl9pPr marL="4876678" indent="0">
+              <a:buNone/>
+              <a:defRPr sz="1333"/>
             </a:lvl9pPr>
           </a:lstStyle>
           <a:p>
-            <a:endParaRPr lang="fr-FR"/>
-          </a:p>
-        </p:txBody>
-      </p:sp>
-      <p:sp>
-        <p:nvSpPr>
-          <p:cNvPr id="4" name="Espace réservé du texte 3"/>
-          <p:cNvSpPr>
-            <a:spLocks noGrp="1"/>
-          </p:cNvSpPr>
-          <p:nvPr>
-            <p:ph type="body" sz="half" idx="2"/>
-          </p:nvPr>
-        </p:nvSpPr>
-        <p:spPr>
-          <a:xfrm>
-            <a:off x="839788" y="2057400"/>
-            <a:ext cx="3932237" cy="3811588"/>
-          </a:xfrm>
-        </p:spPr>
+            <a:pPr lvl="0"/>
+            <a:r>
+              <a:rPr lang="fr-FR" smtClean="0"/>
+              <a:t>Modifier les styles du texte du masque</a:t>
+            </a:r>
+          </a:p>
+        </p:txBody>
+      </p:sp>
+      <p:sp>
+        <p:nvSpPr>
+          <p:cNvPr id="5" name="Date Placeholder 4"/>
+          <p:cNvSpPr>
+            <a:spLocks noGrp="1"/>
+          </p:cNvSpPr>
+          <p:nvPr>
+            <p:ph type="dt" sz="half" idx="10"/>
+          </p:nvPr>
+        </p:nvSpPr>
+        <p:spPr/>
         <p:txBody>
           <a:bodyPr/>
-          <a:lstStyle>
-            <a:lvl1pPr marL="0" indent="0">
-              <a:buNone/>
-              <a:defRPr sz="1600"/>
-            </a:lvl1pPr>
-            <a:lvl2pPr marL="457200" indent="0">
-              <a:buNone/>
-              <a:defRPr sz="1400"/>
-            </a:lvl2pPr>
-            <a:lvl3pPr marL="914400" indent="0">
-              <a:buNone/>
-              <a:defRPr sz="1200"/>
-            </a:lvl3pPr>
-            <a:lvl4pPr marL="1371600" indent="0">
-              <a:buNone/>
-              <a:defRPr sz="1000"/>
-            </a:lvl4pPr>
-            <a:lvl5pPr marL="1828800" indent="0">
-              <a:buNone/>
-              <a:defRPr sz="1000"/>
-            </a:lvl5pPr>
-            <a:lvl6pPr marL="2286000" indent="0">
-              <a:buNone/>
-              <a:defRPr sz="1000"/>
-            </a:lvl6pPr>
-            <a:lvl7pPr marL="2743200" indent="0">
-              <a:buNone/>
-              <a:defRPr sz="1000"/>
-            </a:lvl7pPr>
-            <a:lvl8pPr marL="3200400" indent="0">
-              <a:buNone/>
-              <a:defRPr sz="1000"/>
-            </a:lvl8pPr>
-            <a:lvl9pPr marL="3657600" indent="0">
-              <a:buNone/>
-              <a:defRPr sz="1000"/>
-            </a:lvl9pPr>
-          </a:lstStyle>
-          <a:p>
-            <a:pPr lvl="0"/>
-            <a:r>
-              <a:rPr lang="fr-FR" smtClean="0"/>
-              <a:t>Modifier les styles du texte du masque</a:t>
-            </a:r>
-          </a:p>
-        </p:txBody>
-      </p:sp>
-      <p:sp>
-        <p:nvSpPr>
-          <p:cNvPr id="5" name="Espace réservé de la date 4"/>
-          <p:cNvSpPr>
-            <a:spLocks noGrp="1"/>
-          </p:cNvSpPr>
-          <p:nvPr>
-            <p:ph type="dt" sz="half" idx="10"/>
-          </p:nvPr>
-        </p:nvSpPr>
-        <p:spPr/>
-        <p:txBody>
-          <a:bodyPr/>
           <a:lstStyle/>
           <a:p>
             <a:fld id="{C506BA6A-110B-4565-B24C-94066013DFC6}" type="datetimeFigureOut">
               <a:rPr lang="fr-FR" smtClean="0"/>
-              <a:t>09/08/2023</a:t>
+              <a:t>10/08/2023</a:t>
             </a:fld>
             <a:endParaRPr lang="fr-FR"/>
           </a:p>
@@ -2355,7 +2361,7 @@
       </p:sp>
       <p:sp>
         <p:nvSpPr>
-          <p:cNvPr id="6" name="Espace réservé du pied de page 5"/>
+          <p:cNvPr id="6" name="Footer Placeholder 5"/>
           <p:cNvSpPr>
             <a:spLocks noGrp="1"/>
           </p:cNvSpPr>
@@ -2374,7 +2380,7 @@
       </p:sp>
       <p:sp>
         <p:nvSpPr>
-          <p:cNvPr id="7" name="Espace réservé du numéro de diapositive 6"/>
+          <p:cNvPr id="7" name="Slide Number Placeholder 6"/>
           <p:cNvSpPr>
             <a:spLocks noGrp="1"/>
           </p:cNvSpPr>
@@ -2398,7 +2404,7 @@
     </p:spTree>
     <p:extLst>
       <p:ext uri="{BB962C8B-B14F-4D97-AF65-F5344CB8AC3E}">
-        <p14:creationId xmlns:p14="http://schemas.microsoft.com/office/powerpoint/2010/main" val="477124726"/>
+        <p14:creationId xmlns:p14="http://schemas.microsoft.com/office/powerpoint/2010/main" val="3035057985"/>
       </p:ext>
     </p:extLst>
   </p:cSld>
@@ -2432,7 +2438,7 @@
       </p:grpSpPr>
       <p:sp>
         <p:nvSpPr>
-          <p:cNvPr id="2" name="Espace réservé du titre 1"/>
+          <p:cNvPr id="2" name="Title Placeholder 1"/>
           <p:cNvSpPr>
             <a:spLocks noGrp="1"/>
           </p:cNvSpPr>
@@ -2442,8 +2448,8 @@
         </p:nvSpPr>
         <p:spPr>
           <a:xfrm>
-            <a:off x="838200" y="365125"/>
-            <a:ext cx="10515600" cy="1325563"/>
+            <a:off x="838200" y="649114"/>
+            <a:ext cx="10515600" cy="2356556"/>
           </a:xfrm>
           <a:prstGeom prst="rect">
             <a:avLst/>
@@ -2459,13 +2465,13 @@
               <a:rPr lang="fr-FR" smtClean="0"/>
               <a:t>Modifiez le style du titre</a:t>
             </a:r>
-            <a:endParaRPr lang="fr-FR"/>
-          </a:p>
-        </p:txBody>
-      </p:sp>
-      <p:sp>
-        <p:nvSpPr>
-          <p:cNvPr id="3" name="Espace réservé du texte 2"/>
+            <a:endParaRPr lang="en-US" dirty="0"/>
+          </a:p>
+        </p:txBody>
+      </p:sp>
+      <p:sp>
+        <p:nvSpPr>
+          <p:cNvPr id="3" name="Text Placeholder 2"/>
           <p:cNvSpPr>
             <a:spLocks noGrp="1"/>
           </p:cNvSpPr>
@@ -2475,8 +2481,8 @@
         </p:nvSpPr>
         <p:spPr>
           <a:xfrm>
-            <a:off x="838200" y="1825625"/>
-            <a:ext cx="10515600" cy="4351338"/>
+            <a:off x="838200" y="3245556"/>
+            <a:ext cx="10515600" cy="7735712"/>
           </a:xfrm>
           <a:prstGeom prst="rect">
             <a:avLst/>
@@ -2521,13 +2527,13 @@
               <a:rPr lang="fr-FR" smtClean="0"/>
               <a:t>Cinquième niveau</a:t>
             </a:r>
-            <a:endParaRPr lang="fr-FR"/>
-          </a:p>
-        </p:txBody>
-      </p:sp>
-      <p:sp>
-        <p:nvSpPr>
-          <p:cNvPr id="4" name="Espace réservé de la date 3"/>
+            <a:endParaRPr lang="en-US" dirty="0"/>
+          </a:p>
+        </p:txBody>
+      </p:sp>
+      <p:sp>
+        <p:nvSpPr>
+          <p:cNvPr id="4" name="Date Placeholder 3"/>
           <p:cNvSpPr>
             <a:spLocks noGrp="1"/>
           </p:cNvSpPr>
@@ -2537,8 +2543,8 @@
         </p:nvSpPr>
         <p:spPr>
           <a:xfrm>
-            <a:off x="838200" y="6356350"/>
-            <a:ext cx="2743200" cy="365125"/>
+            <a:off x="838200" y="11300181"/>
+            <a:ext cx="2743200" cy="649111"/>
           </a:xfrm>
           <a:prstGeom prst="rect">
             <a:avLst/>
@@ -2548,7 +2554,7 @@
           <a:bodyPr vert="horz" lIns="91440" tIns="45720" rIns="91440" bIns="45720" rtlCol="0" anchor="ctr"/>
           <a:lstStyle>
             <a:lvl1pPr algn="l">
-              <a:defRPr sz="1200">
+              <a:defRPr sz="1600">
                 <a:solidFill>
                   <a:schemeClr val="tx1">
                     <a:tint val="75000"/>
@@ -2560,7 +2566,7 @@
           <a:p>
             <a:fld id="{C506BA6A-110B-4565-B24C-94066013DFC6}" type="datetimeFigureOut">
               <a:rPr lang="fr-FR" smtClean="0"/>
-              <a:t>09/08/2023</a:t>
+              <a:t>10/08/2023</a:t>
             </a:fld>
             <a:endParaRPr lang="fr-FR"/>
           </a:p>
@@ -2568,7 +2574,7 @@
       </p:sp>
       <p:sp>
         <p:nvSpPr>
-          <p:cNvPr id="5" name="Espace réservé du pied de page 4"/>
+          <p:cNvPr id="5" name="Footer Placeholder 4"/>
           <p:cNvSpPr>
             <a:spLocks noGrp="1"/>
           </p:cNvSpPr>
@@ -2578,8 +2584,8 @@
         </p:nvSpPr>
         <p:spPr>
           <a:xfrm>
-            <a:off x="4038600" y="6356350"/>
-            <a:ext cx="4114800" cy="365125"/>
+            <a:off x="4038600" y="11300181"/>
+            <a:ext cx="4114800" cy="649111"/>
           </a:xfrm>
           <a:prstGeom prst="rect">
             <a:avLst/>
@@ -2589,7 +2595,7 @@
           <a:bodyPr vert="horz" lIns="91440" tIns="45720" rIns="91440" bIns="45720" rtlCol="0" anchor="ctr"/>
           <a:lstStyle>
             <a:lvl1pPr algn="ctr">
-              <a:defRPr sz="1200">
+              <a:defRPr sz="1600">
                 <a:solidFill>
                   <a:schemeClr val="tx1">
                     <a:tint val="75000"/>
@@ -2605,7 +2611,7 @@
       </p:sp>
       <p:sp>
         <p:nvSpPr>
-          <p:cNvPr id="6" name="Espace réservé du numéro de diapositive 5"/>
+          <p:cNvPr id="6" name="Slide Number Placeholder 5"/>
           <p:cNvSpPr>
             <a:spLocks noGrp="1"/>
           </p:cNvSpPr>
@@ -2615,8 +2621,8 @@
         </p:nvSpPr>
         <p:spPr>
           <a:xfrm>
-            <a:off x="8610600" y="6356350"/>
-            <a:ext cx="2743200" cy="365125"/>
+            <a:off x="8610600" y="11300181"/>
+            <a:ext cx="2743200" cy="649111"/>
           </a:xfrm>
           <a:prstGeom prst="rect">
             <a:avLst/>
@@ -2626,7 +2632,7 @@
           <a:bodyPr vert="horz" lIns="91440" tIns="45720" rIns="91440" bIns="45720" rtlCol="0" anchor="ctr"/>
           <a:lstStyle>
             <a:lvl1pPr algn="r">
-              <a:defRPr sz="1200">
+              <a:defRPr sz="1600">
                 <a:solidFill>
                   <a:schemeClr val="tx1">
                     <a:tint val="75000"/>
@@ -2647,27 +2653,27 @@
     </p:spTree>
     <p:extLst>
       <p:ext uri="{BB962C8B-B14F-4D97-AF65-F5344CB8AC3E}">
-        <p14:creationId xmlns:p14="http://schemas.microsoft.com/office/powerpoint/2010/main" val="1982477690"/>
+        <p14:creationId xmlns:p14="http://schemas.microsoft.com/office/powerpoint/2010/main" val="2635989403"/>
       </p:ext>
     </p:extLst>
   </p:cSld>
   <p:clrMap bg1="lt1" tx1="dk1" bg2="lt2" tx2="dk2" accent1="accent1" accent2="accent2" accent3="accent3" accent4="accent4" accent5="accent5" accent6="accent6" hlink="hlink" folHlink="folHlink"/>
   <p:sldLayoutIdLst>
-    <p:sldLayoutId id="2147483649" r:id="rId1"/>
-    <p:sldLayoutId id="2147483650" r:id="rId2"/>
-    <p:sldLayoutId id="2147483651" r:id="rId3"/>
-    <p:sldLayoutId id="2147483652" r:id="rId4"/>
-    <p:sldLayoutId id="2147483653" r:id="rId5"/>
-    <p:sldLayoutId id="2147483654" r:id="rId6"/>
-    <p:sldLayoutId id="2147483655" r:id="rId7"/>
-    <p:sldLayoutId id="2147483656" r:id="rId8"/>
-    <p:sldLayoutId id="2147483657" r:id="rId9"/>
-    <p:sldLayoutId id="2147483658" r:id="rId10"/>
-    <p:sldLayoutId id="2147483659" r:id="rId11"/>
+    <p:sldLayoutId id="2147483661" r:id="rId1"/>
+    <p:sldLayoutId id="2147483662" r:id="rId2"/>
+    <p:sldLayoutId id="2147483663" r:id="rId3"/>
+    <p:sldLayoutId id="2147483664" r:id="rId4"/>
+    <p:sldLayoutId id="2147483665" r:id="rId5"/>
+    <p:sldLayoutId id="2147483666" r:id="rId6"/>
+    <p:sldLayoutId id="2147483667" r:id="rId7"/>
+    <p:sldLayoutId id="2147483668" r:id="rId8"/>
+    <p:sldLayoutId id="2147483669" r:id="rId9"/>
+    <p:sldLayoutId id="2147483670" r:id="rId10"/>
+    <p:sldLayoutId id="2147483671" r:id="rId11"/>
   </p:sldLayoutIdLst>
   <p:txStyles>
     <p:titleStyle>
-      <a:lvl1pPr algn="l" defTabSz="914400" rtl="0" eaLnBrk="1" latinLnBrk="0" hangingPunct="1">
+      <a:lvl1pPr algn="l" defTabSz="1219170" rtl="0" eaLnBrk="1" latinLnBrk="0" hangingPunct="1">
         <a:lnSpc>
           <a:spcPct val="90000"/>
         </a:lnSpc>
@@ -2675,7 +2681,7 @@
           <a:spcPct val="0"/>
         </a:spcBef>
         <a:buNone/>
-        <a:defRPr sz="4400" kern="1200">
+        <a:defRPr sz="5867" kern="1200">
           <a:solidFill>
             <a:schemeClr val="tx1"/>
           </a:solidFill>
@@ -2686,16 +2692,16 @@
       </a:lvl1pPr>
     </p:titleStyle>
     <p:bodyStyle>
-      <a:lvl1pPr marL="228600" indent="-228600" algn="l" defTabSz="914400" rtl="0" eaLnBrk="1" latinLnBrk="0" hangingPunct="1">
+      <a:lvl1pPr marL="304792" indent="-304792" algn="l" defTabSz="1219170" rtl="0" eaLnBrk="1" latinLnBrk="0" hangingPunct="1">
         <a:lnSpc>
           <a:spcPct val="90000"/>
         </a:lnSpc>
         <a:spcBef>
-          <a:spcPts val="1000"/>
+          <a:spcPts val="1333"/>
         </a:spcBef>
         <a:buFont typeface="Arial" panose="020B0604020202020204" pitchFamily="34" charset="0"/>
         <a:buChar char="•"/>
-        <a:defRPr sz="2800" kern="1200">
+        <a:defRPr sz="3733" kern="1200">
           <a:solidFill>
             <a:schemeClr val="tx1"/>
           </a:solidFill>
@@ -2704,12 +2710,48 @@
           <a:cs typeface="+mn-cs"/>
         </a:defRPr>
       </a:lvl1pPr>
-      <a:lvl2pPr marL="685800" indent="-228600" algn="l" defTabSz="914400" rtl="0" eaLnBrk="1" latinLnBrk="0" hangingPunct="1">
+      <a:lvl2pPr marL="914377" indent="-304792" algn="l" defTabSz="1219170" rtl="0" eaLnBrk="1" latinLnBrk="0" hangingPunct="1">
         <a:lnSpc>
           <a:spcPct val="90000"/>
         </a:lnSpc>
         <a:spcBef>
-          <a:spcPts val="500"/>
+          <a:spcPts val="667"/>
+        </a:spcBef>
+        <a:buFont typeface="Arial" panose="020B0604020202020204" pitchFamily="34" charset="0"/>
+        <a:buChar char="•"/>
+        <a:defRPr sz="3200" kern="1200">
+          <a:solidFill>
+            <a:schemeClr val="tx1"/>
+          </a:solidFill>
+          <a:latin typeface="+mn-lt"/>
+          <a:ea typeface="+mn-ea"/>
+          <a:cs typeface="+mn-cs"/>
+        </a:defRPr>
+      </a:lvl2pPr>
+      <a:lvl3pPr marL="1523962" indent="-304792" algn="l" defTabSz="1219170" rtl="0" eaLnBrk="1" latinLnBrk="0" hangingPunct="1">
+        <a:lnSpc>
+          <a:spcPct val="90000"/>
+        </a:lnSpc>
+        <a:spcBef>
+          <a:spcPts val="667"/>
+        </a:spcBef>
+        <a:buFont typeface="Arial" panose="020B0604020202020204" pitchFamily="34" charset="0"/>
+        <a:buChar char="•"/>
+        <a:defRPr sz="2667" kern="1200">
+          <a:solidFill>
+            <a:schemeClr val="tx1"/>
+          </a:solidFill>
+          <a:latin typeface="+mn-lt"/>
+          <a:ea typeface="+mn-ea"/>
+          <a:cs typeface="+mn-cs"/>
+        </a:defRPr>
+      </a:lvl3pPr>
+      <a:lvl4pPr marL="2133547" indent="-304792" algn="l" defTabSz="1219170" rtl="0" eaLnBrk="1" latinLnBrk="0" hangingPunct="1">
+        <a:lnSpc>
+          <a:spcPct val="90000"/>
+        </a:lnSpc>
+        <a:spcBef>
+          <a:spcPts val="667"/>
         </a:spcBef>
         <a:buFont typeface="Arial" panose="020B0604020202020204" pitchFamily="34" charset="0"/>
         <a:buChar char="•"/>
@@ -2721,53 +2763,17 @@
           <a:ea typeface="+mn-ea"/>
           <a:cs typeface="+mn-cs"/>
         </a:defRPr>
-      </a:lvl2pPr>
-      <a:lvl3pPr marL="1143000" indent="-228600" algn="l" defTabSz="914400" rtl="0" eaLnBrk="1" latinLnBrk="0" hangingPunct="1">
+      </a:lvl4pPr>
+      <a:lvl5pPr marL="2743131" indent="-304792" algn="l" defTabSz="1219170" rtl="0" eaLnBrk="1" latinLnBrk="0" hangingPunct="1">
         <a:lnSpc>
           <a:spcPct val="90000"/>
         </a:lnSpc>
         <a:spcBef>
-          <a:spcPts val="500"/>
+          <a:spcPts val="667"/>
         </a:spcBef>
         <a:buFont typeface="Arial" panose="020B0604020202020204" pitchFamily="34" charset="0"/>
         <a:buChar char="•"/>
-        <a:defRPr sz="2000" kern="1200">
-          <a:solidFill>
-            <a:schemeClr val="tx1"/>
-          </a:solidFill>
-          <a:latin typeface="+mn-lt"/>
-          <a:ea typeface="+mn-ea"/>
-          <a:cs typeface="+mn-cs"/>
-        </a:defRPr>
-      </a:lvl3pPr>
-      <a:lvl4pPr marL="1600200" indent="-228600" algn="l" defTabSz="914400" rtl="0" eaLnBrk="1" latinLnBrk="0" hangingPunct="1">
-        <a:lnSpc>
-          <a:spcPct val="90000"/>
-        </a:lnSpc>
-        <a:spcBef>
-          <a:spcPts val="500"/>
-        </a:spcBef>
-        <a:buFont typeface="Arial" panose="020B0604020202020204" pitchFamily="34" charset="0"/>
-        <a:buChar char="•"/>
-        <a:defRPr sz="1800" kern="1200">
-          <a:solidFill>
-            <a:schemeClr val="tx1"/>
-          </a:solidFill>
-          <a:latin typeface="+mn-lt"/>
-          <a:ea typeface="+mn-ea"/>
-          <a:cs typeface="+mn-cs"/>
-        </a:defRPr>
-      </a:lvl4pPr>
-      <a:lvl5pPr marL="2057400" indent="-228600" algn="l" defTabSz="914400" rtl="0" eaLnBrk="1" latinLnBrk="0" hangingPunct="1">
-        <a:lnSpc>
-          <a:spcPct val="90000"/>
-        </a:lnSpc>
-        <a:spcBef>
-          <a:spcPts val="500"/>
-        </a:spcBef>
-        <a:buFont typeface="Arial" panose="020B0604020202020204" pitchFamily="34" charset="0"/>
-        <a:buChar char="•"/>
-        <a:defRPr sz="1800" kern="1200">
+        <a:defRPr sz="2400" kern="1200">
           <a:solidFill>
             <a:schemeClr val="tx1"/>
           </a:solidFill>
@@ -2776,16 +2782,16 @@
           <a:cs typeface="+mn-cs"/>
         </a:defRPr>
       </a:lvl5pPr>
-      <a:lvl6pPr marL="2514600" indent="-228600" algn="l" defTabSz="914400" rtl="0" eaLnBrk="1" latinLnBrk="0" hangingPunct="1">
+      <a:lvl6pPr marL="3352716" indent="-304792" algn="l" defTabSz="1219170" rtl="0" eaLnBrk="1" latinLnBrk="0" hangingPunct="1">
         <a:lnSpc>
           <a:spcPct val="90000"/>
         </a:lnSpc>
         <a:spcBef>
-          <a:spcPts val="500"/>
+          <a:spcPts val="667"/>
         </a:spcBef>
         <a:buFont typeface="Arial" panose="020B0604020202020204" pitchFamily="34" charset="0"/>
         <a:buChar char="•"/>
-        <a:defRPr sz="1800" kern="1200">
+        <a:defRPr sz="2400" kern="1200">
           <a:solidFill>
             <a:schemeClr val="tx1"/>
           </a:solidFill>
@@ -2794,16 +2800,16 @@
           <a:cs typeface="+mn-cs"/>
         </a:defRPr>
       </a:lvl6pPr>
-      <a:lvl7pPr marL="2971800" indent="-228600" algn="l" defTabSz="914400" rtl="0" eaLnBrk="1" latinLnBrk="0" hangingPunct="1">
+      <a:lvl7pPr marL="3962301" indent="-304792" algn="l" defTabSz="1219170" rtl="0" eaLnBrk="1" latinLnBrk="0" hangingPunct="1">
         <a:lnSpc>
           <a:spcPct val="90000"/>
         </a:lnSpc>
         <a:spcBef>
-          <a:spcPts val="500"/>
+          <a:spcPts val="667"/>
         </a:spcBef>
         <a:buFont typeface="Arial" panose="020B0604020202020204" pitchFamily="34" charset="0"/>
         <a:buChar char="•"/>
-        <a:defRPr sz="1800" kern="1200">
+        <a:defRPr sz="2400" kern="1200">
           <a:solidFill>
             <a:schemeClr val="tx1"/>
           </a:solidFill>
@@ -2812,16 +2818,16 @@
           <a:cs typeface="+mn-cs"/>
         </a:defRPr>
       </a:lvl7pPr>
-      <a:lvl8pPr marL="3429000" indent="-228600" algn="l" defTabSz="914400" rtl="0" eaLnBrk="1" latinLnBrk="0" hangingPunct="1">
+      <a:lvl8pPr marL="4571886" indent="-304792" algn="l" defTabSz="1219170" rtl="0" eaLnBrk="1" latinLnBrk="0" hangingPunct="1">
         <a:lnSpc>
           <a:spcPct val="90000"/>
         </a:lnSpc>
         <a:spcBef>
-          <a:spcPts val="500"/>
+          <a:spcPts val="667"/>
         </a:spcBef>
         <a:buFont typeface="Arial" panose="020B0604020202020204" pitchFamily="34" charset="0"/>
         <a:buChar char="•"/>
-        <a:defRPr sz="1800" kern="1200">
+        <a:defRPr sz="2400" kern="1200">
           <a:solidFill>
             <a:schemeClr val="tx1"/>
           </a:solidFill>
@@ -2830,16 +2836,16 @@
           <a:cs typeface="+mn-cs"/>
         </a:defRPr>
       </a:lvl8pPr>
-      <a:lvl9pPr marL="3886200" indent="-228600" algn="l" defTabSz="914400" rtl="0" eaLnBrk="1" latinLnBrk="0" hangingPunct="1">
+      <a:lvl9pPr marL="5181470" indent="-304792" algn="l" defTabSz="1219170" rtl="0" eaLnBrk="1" latinLnBrk="0" hangingPunct="1">
         <a:lnSpc>
           <a:spcPct val="90000"/>
         </a:lnSpc>
         <a:spcBef>
-          <a:spcPts val="500"/>
+          <a:spcPts val="667"/>
         </a:spcBef>
         <a:buFont typeface="Arial" panose="020B0604020202020204" pitchFamily="34" charset="0"/>
         <a:buChar char="•"/>
-        <a:defRPr sz="1800" kern="1200">
+        <a:defRPr sz="2400" kern="1200">
           <a:solidFill>
             <a:schemeClr val="tx1"/>
           </a:solidFill>
@@ -2851,10 +2857,10 @@
     </p:bodyStyle>
     <p:otherStyle>
       <a:defPPr>
-        <a:defRPr lang="fr-FR"/>
+        <a:defRPr lang="en-US"/>
       </a:defPPr>
-      <a:lvl1pPr marL="0" algn="l" defTabSz="914400" rtl="0" eaLnBrk="1" latinLnBrk="0" hangingPunct="1">
-        <a:defRPr sz="1800" kern="1200">
+      <a:lvl1pPr marL="0" algn="l" defTabSz="1219170" rtl="0" eaLnBrk="1" latinLnBrk="0" hangingPunct="1">
+        <a:defRPr sz="2400" kern="1200">
           <a:solidFill>
             <a:schemeClr val="tx1"/>
           </a:solidFill>
@@ -2863,8 +2869,8 @@
           <a:cs typeface="+mn-cs"/>
         </a:defRPr>
       </a:lvl1pPr>
-      <a:lvl2pPr marL="457200" algn="l" defTabSz="914400" rtl="0" eaLnBrk="1" latinLnBrk="0" hangingPunct="1">
-        <a:defRPr sz="1800" kern="1200">
+      <a:lvl2pPr marL="609585" algn="l" defTabSz="1219170" rtl="0" eaLnBrk="1" latinLnBrk="0" hangingPunct="1">
+        <a:defRPr sz="2400" kern="1200">
           <a:solidFill>
             <a:schemeClr val="tx1"/>
           </a:solidFill>
@@ -2873,8 +2879,8 @@
           <a:cs typeface="+mn-cs"/>
         </a:defRPr>
       </a:lvl2pPr>
-      <a:lvl3pPr marL="914400" algn="l" defTabSz="914400" rtl="0" eaLnBrk="1" latinLnBrk="0" hangingPunct="1">
-        <a:defRPr sz="1800" kern="1200">
+      <a:lvl3pPr marL="1219170" algn="l" defTabSz="1219170" rtl="0" eaLnBrk="1" latinLnBrk="0" hangingPunct="1">
+        <a:defRPr sz="2400" kern="1200">
           <a:solidFill>
             <a:schemeClr val="tx1"/>
           </a:solidFill>
@@ -2883,8 +2889,8 @@
           <a:cs typeface="+mn-cs"/>
         </a:defRPr>
       </a:lvl3pPr>
-      <a:lvl4pPr marL="1371600" algn="l" defTabSz="914400" rtl="0" eaLnBrk="1" latinLnBrk="0" hangingPunct="1">
-        <a:defRPr sz="1800" kern="1200">
+      <a:lvl4pPr marL="1828754" algn="l" defTabSz="1219170" rtl="0" eaLnBrk="1" latinLnBrk="0" hangingPunct="1">
+        <a:defRPr sz="2400" kern="1200">
           <a:solidFill>
             <a:schemeClr val="tx1"/>
           </a:solidFill>
@@ -2893,8 +2899,8 @@
           <a:cs typeface="+mn-cs"/>
         </a:defRPr>
       </a:lvl4pPr>
-      <a:lvl5pPr marL="1828800" algn="l" defTabSz="914400" rtl="0" eaLnBrk="1" latinLnBrk="0" hangingPunct="1">
-        <a:defRPr sz="1800" kern="1200">
+      <a:lvl5pPr marL="2438339" algn="l" defTabSz="1219170" rtl="0" eaLnBrk="1" latinLnBrk="0" hangingPunct="1">
+        <a:defRPr sz="2400" kern="1200">
           <a:solidFill>
             <a:schemeClr val="tx1"/>
           </a:solidFill>
@@ -2903,8 +2909,8 @@
           <a:cs typeface="+mn-cs"/>
         </a:defRPr>
       </a:lvl5pPr>
-      <a:lvl6pPr marL="2286000" algn="l" defTabSz="914400" rtl="0" eaLnBrk="1" latinLnBrk="0" hangingPunct="1">
-        <a:defRPr sz="1800" kern="1200">
+      <a:lvl6pPr marL="3047924" algn="l" defTabSz="1219170" rtl="0" eaLnBrk="1" latinLnBrk="0" hangingPunct="1">
+        <a:defRPr sz="2400" kern="1200">
           <a:solidFill>
             <a:schemeClr val="tx1"/>
           </a:solidFill>
@@ -2913,8 +2919,8 @@
           <a:cs typeface="+mn-cs"/>
         </a:defRPr>
       </a:lvl6pPr>
-      <a:lvl7pPr marL="2743200" algn="l" defTabSz="914400" rtl="0" eaLnBrk="1" latinLnBrk="0" hangingPunct="1">
-        <a:defRPr sz="1800" kern="1200">
+      <a:lvl7pPr marL="3657509" algn="l" defTabSz="1219170" rtl="0" eaLnBrk="1" latinLnBrk="0" hangingPunct="1">
+        <a:defRPr sz="2400" kern="1200">
           <a:solidFill>
             <a:schemeClr val="tx1"/>
           </a:solidFill>
@@ -2923,8 +2929,8 @@
           <a:cs typeface="+mn-cs"/>
         </a:defRPr>
       </a:lvl7pPr>
-      <a:lvl8pPr marL="3200400" algn="l" defTabSz="914400" rtl="0" eaLnBrk="1" latinLnBrk="0" hangingPunct="1">
-        <a:defRPr sz="1800" kern="1200">
+      <a:lvl8pPr marL="4267093" algn="l" defTabSz="1219170" rtl="0" eaLnBrk="1" latinLnBrk="0" hangingPunct="1">
+        <a:defRPr sz="2400" kern="1200">
           <a:solidFill>
             <a:schemeClr val="tx1"/>
           </a:solidFill>
@@ -2933,8 +2939,8 @@
           <a:cs typeface="+mn-cs"/>
         </a:defRPr>
       </a:lvl8pPr>
-      <a:lvl9pPr marL="3657600" algn="l" defTabSz="914400" rtl="0" eaLnBrk="1" latinLnBrk="0" hangingPunct="1">
-        <a:defRPr sz="1800" kern="1200">
+      <a:lvl9pPr marL="4876678" algn="l" defTabSz="1219170" rtl="0" eaLnBrk="1" latinLnBrk="0" hangingPunct="1">
+        <a:defRPr sz="2400" kern="1200">
           <a:solidFill>
             <a:schemeClr val="tx1"/>
           </a:solidFill>
@@ -2949,509 +2955,6 @@
 </file>
 
 <file path=ppt/slides/slide1.xml><?xml version="1.0" encoding="utf-8"?>
-<p:sld xmlns:a="http://schemas.openxmlformats.org/drawingml/2006/main" xmlns:r="http://schemas.openxmlformats.org/officeDocument/2006/relationships" xmlns:p="http://schemas.openxmlformats.org/presentationml/2006/main">
-  <p:cSld>
-    <p:spTree>
-      <p:nvGrpSpPr>
-        <p:cNvPr id="1" name=""/>
-        <p:cNvGrpSpPr/>
-        <p:nvPr/>
-      </p:nvGrpSpPr>
-      <p:grpSpPr>
-        <a:xfrm>
-          <a:off x="0" y="0"/>
-          <a:ext cx="0" cy="0"/>
-          <a:chOff x="0" y="0"/>
-          <a:chExt cx="0" cy="0"/>
-        </a:xfrm>
-      </p:grpSpPr>
-      <p:pic>
-        <p:nvPicPr>
-          <p:cNvPr id="5" name="Image 4"/>
-          <p:cNvPicPr>
-            <a:picLocks noChangeAspect="1"/>
-          </p:cNvPicPr>
-          <p:nvPr/>
-        </p:nvPicPr>
-        <p:blipFill>
-          <a:blip r:embed="rId2" cstate="print">
-            <a:extLst>
-              <a:ext uri="{28A0092B-C50C-407E-A947-70E740481C1C}">
-                <a14:useLocalDpi xmlns:a14="http://schemas.microsoft.com/office/drawing/2010/main" val="0"/>
-              </a:ext>
-            </a:extLst>
-          </a:blip>
-          <a:stretch>
-            <a:fillRect/>
-          </a:stretch>
-        </p:blipFill>
-        <p:spPr>
-          <a:xfrm>
-            <a:off x="2899154" y="4677093"/>
-            <a:ext cx="1610492" cy="1207869"/>
-          </a:xfrm>
-          <a:prstGeom prst="rect">
-            <a:avLst/>
-          </a:prstGeom>
-        </p:spPr>
-      </p:pic>
-      <p:pic>
-        <p:nvPicPr>
-          <p:cNvPr id="6" name="Image 5"/>
-          <p:cNvPicPr>
-            <a:picLocks noChangeAspect="1"/>
-          </p:cNvPicPr>
-          <p:nvPr/>
-        </p:nvPicPr>
-        <p:blipFill>
-          <a:blip r:embed="rId3">
-            <a:extLst>
-              <a:ext uri="{28A0092B-C50C-407E-A947-70E740481C1C}">
-                <a14:useLocalDpi xmlns:a14="http://schemas.microsoft.com/office/drawing/2010/main" val="0"/>
-              </a:ext>
-            </a:extLst>
-          </a:blip>
-          <a:stretch>
-            <a:fillRect/>
-          </a:stretch>
-        </p:blipFill>
-        <p:spPr>
-          <a:xfrm>
-            <a:off x="4976497" y="4046077"/>
-            <a:ext cx="3023717" cy="2469900"/>
-          </a:xfrm>
-          <a:prstGeom prst="rect">
-            <a:avLst/>
-          </a:prstGeom>
-          <a:ln>
-            <a:solidFill>
-              <a:schemeClr val="tx1"/>
-            </a:solidFill>
-          </a:ln>
-        </p:spPr>
-      </p:pic>
-      <p:sp>
-        <p:nvSpPr>
-          <p:cNvPr id="7" name="ZoneTexte 6"/>
-          <p:cNvSpPr txBox="1"/>
-          <p:nvPr/>
-        </p:nvSpPr>
-        <p:spPr>
-          <a:xfrm>
-            <a:off x="2899154" y="5941814"/>
-            <a:ext cx="1610492" cy="369332"/>
-          </a:xfrm>
-          <a:prstGeom prst="rect">
-            <a:avLst/>
-          </a:prstGeom>
-          <a:noFill/>
-        </p:spPr>
-        <p:txBody>
-          <a:bodyPr wrap="square" rtlCol="0">
-            <a:spAutoFit/>
-          </a:bodyPr>
-          <a:lstStyle/>
-          <a:p>
-            <a:pPr algn="ctr"/>
-            <a:r>
-              <a:rPr lang="fr-FR" dirty="0" smtClean="0"/>
-              <a:t>Tamis</a:t>
-            </a:r>
-            <a:endParaRPr lang="fr-FR" dirty="0"/>
-          </a:p>
-        </p:txBody>
-      </p:sp>
-      <p:sp>
-        <p:nvSpPr>
-          <p:cNvPr id="8" name="ZoneTexte 7"/>
-          <p:cNvSpPr txBox="1"/>
-          <p:nvPr/>
-        </p:nvSpPr>
-        <p:spPr>
-          <a:xfrm>
-            <a:off x="8641080" y="3988365"/>
-            <a:ext cx="3550920" cy="2585323"/>
-          </a:xfrm>
-          <a:prstGeom prst="rect">
-            <a:avLst/>
-          </a:prstGeom>
-          <a:noFill/>
-        </p:spPr>
-        <p:txBody>
-          <a:bodyPr wrap="square" rtlCol="0">
-            <a:spAutoFit/>
-          </a:bodyPr>
-          <a:lstStyle/>
-          <a:p>
-            <a:pPr marL="285750" indent="-285750">
-              <a:buFont typeface="Arial" panose="020B0604020202020204" pitchFamily="34" charset="0"/>
-              <a:buChar char="•"/>
-            </a:pPr>
-            <a:r>
-              <a:rPr lang="fr-FR" dirty="0" smtClean="0"/>
-              <a:t>Récolte des deux rangs centraux de chaque micro parcelle</a:t>
-            </a:r>
-          </a:p>
-          <a:p>
-            <a:pPr marL="285750" indent="-285750">
-              <a:buFont typeface="Arial" panose="020B0604020202020204" pitchFamily="34" charset="0"/>
-              <a:buChar char="•"/>
-            </a:pPr>
-            <a:r>
-              <a:rPr lang="fr-FR" dirty="0" smtClean="0"/>
-              <a:t>Echantillonnage aléatoire de 30 plantes</a:t>
-            </a:r>
-          </a:p>
-          <a:p>
-            <a:pPr marL="285750" indent="-285750">
-              <a:buFont typeface="Arial" panose="020B0604020202020204" pitchFamily="34" charset="0"/>
-              <a:buChar char="•"/>
-            </a:pPr>
-            <a:r>
-              <a:rPr lang="fr-FR" dirty="0" smtClean="0"/>
-              <a:t>Mesures :</a:t>
-            </a:r>
-          </a:p>
-          <a:p>
-            <a:pPr marL="742950" lvl="1" indent="-285750">
-              <a:buFont typeface="Arial" panose="020B0604020202020204" pitchFamily="34" charset="0"/>
-              <a:buChar char="•"/>
-            </a:pPr>
-            <a:r>
-              <a:rPr lang="fr-FR" dirty="0" smtClean="0"/>
-              <a:t>Hauteur</a:t>
-            </a:r>
-          </a:p>
-          <a:p>
-            <a:pPr marL="742950" lvl="1" indent="-285750">
-              <a:buFont typeface="Arial" panose="020B0604020202020204" pitchFamily="34" charset="0"/>
-              <a:buChar char="•"/>
-            </a:pPr>
-            <a:r>
-              <a:rPr lang="fr-FR" dirty="0" smtClean="0"/>
-              <a:t>PMG</a:t>
-            </a:r>
-          </a:p>
-          <a:p>
-            <a:pPr marL="742950" lvl="1" indent="-285750">
-              <a:buFont typeface="Arial" panose="020B0604020202020204" pitchFamily="34" charset="0"/>
-              <a:buChar char="•"/>
-            </a:pPr>
-            <a:r>
-              <a:rPr lang="fr-FR" dirty="0" smtClean="0"/>
-              <a:t>Protéines des grains</a:t>
-            </a:r>
-          </a:p>
-          <a:p>
-            <a:pPr marL="742950" lvl="1" indent="-285750">
-              <a:buFont typeface="Arial" panose="020B0604020202020204" pitchFamily="34" charset="0"/>
-              <a:buChar char="•"/>
-            </a:pPr>
-            <a:r>
-              <a:rPr lang="fr-FR" dirty="0" smtClean="0"/>
-              <a:t>Morphologie des grains</a:t>
-            </a:r>
-            <a:endParaRPr lang="fr-FR" dirty="0"/>
-          </a:p>
-        </p:txBody>
-      </p:sp>
-      <p:pic>
-        <p:nvPicPr>
-          <p:cNvPr id="9" name="Image 8"/>
-          <p:cNvPicPr>
-            <a:picLocks noChangeAspect="1"/>
-          </p:cNvPicPr>
-          <p:nvPr/>
-        </p:nvPicPr>
-        <p:blipFill>
-          <a:blip r:embed="rId4" cstate="print">
-            <a:extLst>
-              <a:ext uri="{28A0092B-C50C-407E-A947-70E740481C1C}">
-                <a14:useLocalDpi xmlns:a14="http://schemas.microsoft.com/office/drawing/2010/main" val="0"/>
-              </a:ext>
-            </a:extLst>
-          </a:blip>
-          <a:stretch>
-            <a:fillRect/>
-          </a:stretch>
-        </p:blipFill>
-        <p:spPr>
-          <a:xfrm>
-            <a:off x="437126" y="4644720"/>
-            <a:ext cx="1696822" cy="1272617"/>
-          </a:xfrm>
-          <a:prstGeom prst="rect">
-            <a:avLst/>
-          </a:prstGeom>
-        </p:spPr>
-      </p:pic>
-      <p:sp>
-        <p:nvSpPr>
-          <p:cNvPr id="10" name="ZoneTexte 9"/>
-          <p:cNvSpPr txBox="1"/>
-          <p:nvPr/>
-        </p:nvSpPr>
-        <p:spPr>
-          <a:xfrm>
-            <a:off x="437126" y="5837274"/>
-            <a:ext cx="1696822" cy="646331"/>
-          </a:xfrm>
-          <a:prstGeom prst="rect">
-            <a:avLst/>
-          </a:prstGeom>
-          <a:noFill/>
-        </p:spPr>
-        <p:txBody>
-          <a:bodyPr wrap="square" rtlCol="0">
-            <a:spAutoFit/>
-          </a:bodyPr>
-          <a:lstStyle/>
-          <a:p>
-            <a:pPr algn="ctr"/>
-            <a:r>
-              <a:rPr lang="fr-FR" dirty="0" smtClean="0"/>
-              <a:t>Grains d’une récolte d’EPO</a:t>
-            </a:r>
-            <a:endParaRPr lang="fr-FR" dirty="0"/>
-          </a:p>
-        </p:txBody>
-      </p:sp>
-      <p:cxnSp>
-        <p:nvCxnSpPr>
-          <p:cNvPr id="12" name="Connecteur droit avec flèche 11"/>
-          <p:cNvCxnSpPr>
-            <a:stCxn id="9" idx="3"/>
-            <a:endCxn id="5" idx="1"/>
-          </p:cNvCxnSpPr>
-          <p:nvPr/>
-        </p:nvCxnSpPr>
-        <p:spPr>
-          <a:xfrm flipV="1">
-            <a:off x="2133948" y="5281028"/>
-            <a:ext cx="765206" cy="1"/>
-          </a:xfrm>
-          <a:prstGeom prst="straightConnector1">
-            <a:avLst/>
-          </a:prstGeom>
-          <a:ln w="28575">
-            <a:solidFill>
-              <a:schemeClr val="tx1"/>
-            </a:solidFill>
-            <a:tailEnd type="triangle"/>
-          </a:ln>
-        </p:spPr>
-        <p:style>
-          <a:lnRef idx="1">
-            <a:schemeClr val="accent1"/>
-          </a:lnRef>
-          <a:fillRef idx="0">
-            <a:schemeClr val="accent1"/>
-          </a:fillRef>
-          <a:effectRef idx="0">
-            <a:schemeClr val="accent1"/>
-          </a:effectRef>
-          <a:fontRef idx="minor">
-            <a:schemeClr val="tx1"/>
-          </a:fontRef>
-        </p:style>
-      </p:cxnSp>
-      <p:cxnSp>
-        <p:nvCxnSpPr>
-          <p:cNvPr id="14" name="Connecteur droit avec flèche 13"/>
-          <p:cNvCxnSpPr>
-            <a:stCxn id="5" idx="3"/>
-            <a:endCxn id="6" idx="1"/>
-          </p:cNvCxnSpPr>
-          <p:nvPr/>
-        </p:nvCxnSpPr>
-        <p:spPr>
-          <a:xfrm flipV="1">
-            <a:off x="4509646" y="5281027"/>
-            <a:ext cx="466851" cy="1"/>
-          </a:xfrm>
-          <a:prstGeom prst="straightConnector1">
-            <a:avLst/>
-          </a:prstGeom>
-          <a:ln w="28575">
-            <a:solidFill>
-              <a:schemeClr val="tx1"/>
-            </a:solidFill>
-            <a:tailEnd type="triangle"/>
-          </a:ln>
-        </p:spPr>
-        <p:style>
-          <a:lnRef idx="1">
-            <a:schemeClr val="accent1"/>
-          </a:lnRef>
-          <a:fillRef idx="0">
-            <a:schemeClr val="accent1"/>
-          </a:fillRef>
-          <a:effectRef idx="0">
-            <a:schemeClr val="accent1"/>
-          </a:effectRef>
-          <a:fontRef idx="minor">
-            <a:schemeClr val="tx1"/>
-          </a:fontRef>
-        </p:style>
-      </p:cxnSp>
-      <p:cxnSp>
-        <p:nvCxnSpPr>
-          <p:cNvPr id="19" name="Connecteur droit avec flèche 18"/>
-          <p:cNvCxnSpPr>
-            <a:stCxn id="6" idx="3"/>
-            <a:endCxn id="8" idx="1"/>
-          </p:cNvCxnSpPr>
-          <p:nvPr/>
-        </p:nvCxnSpPr>
-        <p:spPr>
-          <a:xfrm>
-            <a:off x="8000214" y="5281027"/>
-            <a:ext cx="640866" cy="0"/>
-          </a:xfrm>
-          <a:prstGeom prst="straightConnector1">
-            <a:avLst/>
-          </a:prstGeom>
-          <a:ln w="28575">
-            <a:solidFill>
-              <a:schemeClr val="tx1"/>
-            </a:solidFill>
-            <a:tailEnd type="triangle"/>
-          </a:ln>
-        </p:spPr>
-        <p:style>
-          <a:lnRef idx="1">
-            <a:schemeClr val="accent1"/>
-          </a:lnRef>
-          <a:fillRef idx="0">
-            <a:schemeClr val="accent1"/>
-          </a:fillRef>
-          <a:effectRef idx="0">
-            <a:schemeClr val="accent1"/>
-          </a:effectRef>
-          <a:fontRef idx="minor">
-            <a:schemeClr val="tx1"/>
-          </a:fontRef>
-        </p:style>
-      </p:cxnSp>
-    </p:spTree>
-    <p:extLst>
-      <p:ext uri="{BB962C8B-B14F-4D97-AF65-F5344CB8AC3E}">
-        <p14:creationId xmlns:p14="http://schemas.microsoft.com/office/powerpoint/2010/main" val="635146846"/>
-      </p:ext>
-    </p:extLst>
-  </p:cSld>
-  <p:clrMapOvr>
-    <a:masterClrMapping/>
-  </p:clrMapOvr>
-  <p:timing>
-    <p:tnLst>
-      <p:par>
-        <p:cTn id="1" dur="indefinite" restart="never" nodeType="tmRoot">
-          <p:childTnLst>
-            <p:seq concurrent="1" nextAc="seek">
-              <p:cTn id="2" dur="indefinite" nodeType="mainSeq">
-                <p:childTnLst>
-                  <p:par>
-                    <p:cTn id="3" fill="hold">
-                      <p:stCondLst>
-                        <p:cond delay="indefinite"/>
-                        <p:cond evt="onBegin" delay="0">
-                          <p:tn val="2"/>
-                        </p:cond>
-                      </p:stCondLst>
-                      <p:childTnLst>
-                        <p:par>
-                          <p:cTn id="4" fill="hold">
-                            <p:stCondLst>
-                              <p:cond delay="0"/>
-                            </p:stCondLst>
-                            <p:childTnLst>
-                              <p:par>
-                                <p:cTn id="5" presetID="1" presetClass="entr" presetSubtype="0" fill="hold" nodeType="withEffect">
-                                  <p:stCondLst>
-                                    <p:cond delay="0"/>
-                                  </p:stCondLst>
-                                  <p:childTnLst>
-                                    <p:set>
-                                      <p:cBhvr>
-                                        <p:cTn id="6" dur="1" fill="hold">
-                                          <p:stCondLst>
-                                            <p:cond delay="0"/>
-                                          </p:stCondLst>
-                                        </p:cTn>
-                                        <p:tgtEl>
-                                          <p:spTgt spid="5"/>
-                                        </p:tgtEl>
-                                        <p:attrNameLst>
-                                          <p:attrName>style.visibility</p:attrName>
-                                        </p:attrNameLst>
-                                      </p:cBhvr>
-                                      <p:to>
-                                        <p:strVal val="visible"/>
-                                      </p:to>
-                                    </p:set>
-                                  </p:childTnLst>
-                                </p:cTn>
-                              </p:par>
-                              <p:par>
-                                <p:cTn id="7" presetID="1" presetClass="entr" presetSubtype="0" fill="hold" nodeType="withEffect">
-                                  <p:stCondLst>
-                                    <p:cond delay="0"/>
-                                  </p:stCondLst>
-                                  <p:childTnLst>
-                                    <p:set>
-                                      <p:cBhvr>
-                                        <p:cTn id="8" dur="1" fill="hold">
-                                          <p:stCondLst>
-                                            <p:cond delay="0"/>
-                                          </p:stCondLst>
-                                        </p:cTn>
-                                        <p:tgtEl>
-                                          <p:spTgt spid="9"/>
-                                        </p:tgtEl>
-                                        <p:attrNameLst>
-                                          <p:attrName>style.visibility</p:attrName>
-                                        </p:attrNameLst>
-                                      </p:cBhvr>
-                                      <p:to>
-                                        <p:strVal val="visible"/>
-                                      </p:to>
-                                    </p:set>
-                                  </p:childTnLst>
-                                </p:cTn>
-                              </p:par>
-                            </p:childTnLst>
-                          </p:cTn>
-                        </p:par>
-                      </p:childTnLst>
-                    </p:cTn>
-                  </p:par>
-                </p:childTnLst>
-              </p:cTn>
-              <p:prevCondLst>
-                <p:cond evt="onPrev" delay="0">
-                  <p:tgtEl>
-                    <p:sldTgt/>
-                  </p:tgtEl>
-                </p:cond>
-              </p:prevCondLst>
-              <p:nextCondLst>
-                <p:cond evt="onNext" delay="0">
-                  <p:tgtEl>
-                    <p:sldTgt/>
-                  </p:tgtEl>
-                </p:cond>
-              </p:nextCondLst>
-            </p:seq>
-          </p:childTnLst>
-        </p:cTn>
-      </p:par>
-    </p:tnLst>
-  </p:timing>
-</p:sld>
-</file>
-
-<file path=ppt/slides/slide2.xml><?xml version="1.0" encoding="utf-8"?>
 <p:sld xmlns:a="http://schemas.openxmlformats.org/drawingml/2006/main" xmlns:r="http://schemas.openxmlformats.org/officeDocument/2006/relationships" xmlns:p="http://schemas.openxmlformats.org/presentationml/2006/main">
   <p:cSld>
     <p:spTree>
@@ -3490,7 +2993,7 @@
         </p:blipFill>
         <p:spPr>
           <a:xfrm>
-            <a:off x="370070" y="336303"/>
+            <a:off x="370070" y="5153710"/>
             <a:ext cx="626626" cy="469970"/>
           </a:xfrm>
           <a:prstGeom prst="rect">
@@ -3520,7 +3023,7 @@
         </p:blipFill>
         <p:spPr>
           <a:xfrm>
-            <a:off x="370070" y="806273"/>
+            <a:off x="370070" y="5623680"/>
             <a:ext cx="626626" cy="469970"/>
           </a:xfrm>
           <a:prstGeom prst="rect">
@@ -3550,7 +3053,7 @@
         </p:blipFill>
         <p:spPr>
           <a:xfrm>
-            <a:off x="351782" y="1511228"/>
+            <a:off x="351782" y="6328635"/>
             <a:ext cx="626626" cy="469970"/>
           </a:xfrm>
           <a:prstGeom prst="rect">
@@ -3566,7 +3069,7 @@
         </p:nvSpPr>
         <p:spPr>
           <a:xfrm rot="16200000">
-            <a:off x="417449" y="1209070"/>
+            <a:off x="417449" y="6026477"/>
             <a:ext cx="420624" cy="369332"/>
           </a:xfrm>
           <a:prstGeom prst="rect">
@@ -3582,7 +3085,7 @@
           <a:p>
             <a:pPr algn="ctr"/>
             <a:r>
-              <a:rPr lang="fr-FR" b="1" dirty="0" smtClean="0"/>
+              <a:rPr lang="fr-FR" b="1" dirty="0"/>
               <a:t>…</a:t>
             </a:r>
             <a:endParaRPr lang="fr-FR" b="1" dirty="0"/>
@@ -3597,7 +3100,7 @@
         </p:nvSpPr>
         <p:spPr>
           <a:xfrm>
-            <a:off x="1252728" y="384048"/>
+            <a:off x="1092587" y="5201327"/>
             <a:ext cx="128016" cy="1481328"/>
           </a:xfrm>
           <a:prstGeom prst="rightBrace">
@@ -3640,8 +3143,8 @@
         </p:nvSpPr>
         <p:spPr>
           <a:xfrm>
-            <a:off x="1436997" y="863102"/>
-            <a:ext cx="1883664" cy="523220"/>
+            <a:off x="1281044" y="5683810"/>
+            <a:ext cx="2172164" cy="584775"/>
           </a:xfrm>
           <a:prstGeom prst="rect">
             <a:avLst/>
@@ -3655,16 +3158,16 @@
           <a:lstStyle/>
           <a:p>
             <a:r>
-              <a:rPr lang="fr-FR" sz="1400" dirty="0" smtClean="0"/>
+              <a:rPr lang="fr-FR" sz="1600" b="1" dirty="0"/>
               <a:t>180 génotypes</a:t>
             </a:r>
           </a:p>
           <a:p>
             <a:r>
-              <a:rPr lang="fr-FR" sz="1400" dirty="0" smtClean="0"/>
+              <a:rPr lang="fr-FR" sz="1600" b="1" dirty="0"/>
               <a:t>12 grains par génotype</a:t>
             </a:r>
-            <a:endParaRPr lang="fr-FR" sz="1400" dirty="0"/>
+            <a:endParaRPr lang="fr-FR" sz="1600" b="1" dirty="0"/>
           </a:p>
         </p:txBody>
       </p:sp>
@@ -3676,7 +3179,7 @@
         </p:nvSpPr>
         <p:spPr>
           <a:xfrm>
-            <a:off x="-27694" y="396433"/>
+            <a:off x="-27694" y="5213840"/>
             <a:ext cx="539496" cy="338554"/>
           </a:xfrm>
           <a:prstGeom prst="rect">
@@ -3691,10 +3194,10 @@
           <a:lstStyle/>
           <a:p>
             <a:r>
-              <a:rPr lang="fr-FR" sz="1600" dirty="0" smtClean="0"/>
+              <a:rPr lang="fr-FR" sz="1600" b="1" dirty="0"/>
               <a:t>G1</a:t>
             </a:r>
-            <a:endParaRPr lang="fr-FR" sz="1600" dirty="0"/>
+            <a:endParaRPr lang="fr-FR" sz="1600" b="1" dirty="0"/>
           </a:p>
         </p:txBody>
       </p:sp>
@@ -3706,7 +3209,7 @@
         </p:nvSpPr>
         <p:spPr>
           <a:xfrm>
-            <a:off x="-27825" y="866403"/>
+            <a:off x="-27825" y="5683810"/>
             <a:ext cx="539496" cy="338554"/>
           </a:xfrm>
           <a:prstGeom prst="rect">
@@ -3721,10 +3224,10 @@
           <a:lstStyle/>
           <a:p>
             <a:r>
-              <a:rPr lang="fr-FR" sz="1600" dirty="0" smtClean="0"/>
+              <a:rPr lang="fr-FR" sz="1600" b="1" dirty="0"/>
               <a:t>G2</a:t>
             </a:r>
-            <a:endParaRPr lang="fr-FR" sz="1600" dirty="0"/>
+            <a:endParaRPr lang="fr-FR" sz="1600" b="1" dirty="0"/>
           </a:p>
         </p:txBody>
       </p:sp>
@@ -3736,7 +3239,7 @@
         </p:nvSpPr>
         <p:spPr>
           <a:xfrm>
-            <a:off x="-78856" y="1604048"/>
+            <a:off x="-78856" y="6421455"/>
             <a:ext cx="641557" cy="261610"/>
           </a:xfrm>
           <a:prstGeom prst="rect">
@@ -3751,10 +3254,10 @@
           <a:lstStyle/>
           <a:p>
             <a:r>
-              <a:rPr lang="fr-FR" sz="1100" dirty="0" smtClean="0"/>
+              <a:rPr lang="fr-FR" sz="1100" b="1" dirty="0"/>
               <a:t>G180</a:t>
             </a:r>
-            <a:endParaRPr lang="fr-FR" sz="1100" dirty="0"/>
+            <a:endParaRPr lang="fr-FR" sz="1100" b="1" dirty="0"/>
           </a:p>
         </p:txBody>
       </p:sp>
@@ -3766,7 +3269,7 @@
         </p:nvGrpSpPr>
         <p:grpSpPr>
           <a:xfrm rot="2755314">
-            <a:off x="4449383" y="728156"/>
+            <a:off x="4124620" y="5464289"/>
             <a:ext cx="342474" cy="336387"/>
             <a:chOff x="4873752" y="863102"/>
             <a:chExt cx="740664" cy="953016"/>
@@ -3892,7 +3395,7 @@
         </p:nvSpPr>
         <p:spPr>
           <a:xfrm>
-            <a:off x="3889100" y="201296"/>
+            <a:off x="3564337" y="4937428"/>
             <a:ext cx="1463040" cy="551690"/>
           </a:xfrm>
           <a:prstGeom prst="rect">
@@ -3931,7 +3434,7 @@
           <a:p>
             <a:pPr algn="ctr"/>
             <a:r>
-              <a:rPr lang="fr-FR" dirty="0" smtClean="0"/>
+              <a:rPr lang="fr-FR" dirty="0"/>
               <a:t>Spectromètre</a:t>
             </a:r>
             <a:endParaRPr lang="fr-FR" dirty="0"/>
@@ -3946,7 +3449,7 @@
         </p:nvGrpSpPr>
         <p:grpSpPr>
           <a:xfrm>
-            <a:off x="4271046" y="1183424"/>
+            <a:off x="3946284" y="5919556"/>
             <a:ext cx="697539" cy="292608"/>
             <a:chOff x="3666744" y="2697480"/>
             <a:chExt cx="1234440" cy="585216"/>
@@ -4042,8 +3545,8 @@
         </p:nvSpPr>
         <p:spPr>
           <a:xfrm>
-            <a:off x="3889100" y="1634543"/>
-            <a:ext cx="1463040" cy="461665"/>
+            <a:off x="3397002" y="6306055"/>
+            <a:ext cx="1707250" cy="584775"/>
           </a:xfrm>
           <a:prstGeom prst="rect">
             <a:avLst/>
@@ -4058,10 +3561,10 @@
           <a:p>
             <a:pPr algn="ctr"/>
             <a:r>
-              <a:rPr lang="fr-FR" sz="1200" dirty="0" smtClean="0"/>
+              <a:rPr lang="fr-FR" sz="1600" b="1" dirty="0"/>
               <a:t>NIRS individuelle de chaque grain</a:t>
             </a:r>
-            <a:endParaRPr lang="fr-FR" sz="1200" dirty="0"/>
+            <a:endParaRPr lang="fr-FR" sz="1600" b="1" dirty="0"/>
           </a:p>
         </p:txBody>
       </p:sp>
@@ -4073,7 +3576,7 @@
         </p:nvGrpSpPr>
         <p:grpSpPr>
           <a:xfrm>
-            <a:off x="6004145" y="-7918"/>
+            <a:off x="5362955" y="4803818"/>
             <a:ext cx="1487926" cy="1244888"/>
             <a:chOff x="6172200" y="-39931"/>
             <a:chExt cx="1487926" cy="1244888"/>
@@ -4133,7 +3636,7 @@
             <a:p>
               <a:pPr algn="ctr"/>
               <a:r>
-                <a:rPr lang="fr-FR" dirty="0" smtClean="0"/>
+                <a:rPr lang="fr-FR" dirty="0"/>
                 <a:t>Optomachine</a:t>
               </a:r>
               <a:endParaRPr lang="fr-FR" dirty="0"/>
@@ -4149,8 +3652,8 @@
         </p:nvSpPr>
         <p:spPr>
           <a:xfrm>
-            <a:off x="5861137" y="1604048"/>
-            <a:ext cx="1773936" cy="646331"/>
+            <a:off x="4926518" y="6314585"/>
+            <a:ext cx="2411442" cy="830997"/>
           </a:xfrm>
           <a:prstGeom prst="rect">
             <a:avLst/>
@@ -4165,10 +3668,10 @@
           <a:p>
             <a:pPr algn="ctr"/>
             <a:r>
-              <a:rPr lang="fr-FR" sz="1200" dirty="0" smtClean="0"/>
+              <a:rPr lang="fr-FR" sz="1600" b="1" dirty="0"/>
               <a:t>Mesure morphologiques individuelles de chaque grain</a:t>
             </a:r>
-            <a:endParaRPr lang="fr-FR" sz="1200" dirty="0"/>
+            <a:endParaRPr lang="fr-FR" sz="1600" b="1" dirty="0"/>
           </a:p>
         </p:txBody>
       </p:sp>
@@ -4180,7 +3683,7 @@
         </p:nvGrpSpPr>
         <p:grpSpPr>
           <a:xfrm>
-            <a:off x="6399336" y="1166057"/>
+            <a:off x="5758147" y="5977793"/>
             <a:ext cx="697539" cy="292608"/>
             <a:chOff x="3666744" y="2697480"/>
             <a:chExt cx="1234440" cy="585216"/>
@@ -4276,7 +3779,7 @@
         </p:nvCxnSpPr>
         <p:spPr>
           <a:xfrm flipV="1">
-            <a:off x="3320126" y="1236970"/>
+            <a:off x="3320127" y="6054378"/>
             <a:ext cx="408151" cy="1"/>
           </a:xfrm>
           <a:prstGeom prst="straightConnector1">
@@ -4312,7 +3815,7 @@
         </p:nvCxnSpPr>
         <p:spPr>
           <a:xfrm flipV="1">
-            <a:off x="5538195" y="1236969"/>
+            <a:off x="4897006" y="6048706"/>
             <a:ext cx="408151" cy="1"/>
           </a:xfrm>
           <a:prstGeom prst="straightConnector1">
@@ -4348,8 +3851,8 @@
         </p:nvCxnSpPr>
         <p:spPr>
           <a:xfrm flipV="1">
-            <a:off x="7587539" y="1233403"/>
-            <a:ext cx="408151" cy="1"/>
+            <a:off x="6885531" y="6033668"/>
+            <a:ext cx="481150" cy="1"/>
           </a:xfrm>
           <a:prstGeom prst="straightConnector1">
             <a:avLst/>
@@ -4384,8 +3887,8 @@
         </p:nvSpPr>
         <p:spPr>
           <a:xfrm>
-            <a:off x="10843611" y="250850"/>
-            <a:ext cx="1271855" cy="1384995"/>
+            <a:off x="7126106" y="3995577"/>
+            <a:ext cx="3952680" cy="584775"/>
           </a:xfrm>
           <a:prstGeom prst="rect">
             <a:avLst/>
@@ -4398,11 +3901,12 @@
           </a:bodyPr>
           <a:lstStyle/>
           <a:p>
-            <a:r>
-              <a:rPr lang="fr-FR" sz="1400" dirty="0" smtClean="0"/>
+            <a:pPr algn="ctr"/>
+            <a:r>
+              <a:rPr lang="fr-FR" sz="1600" b="1" dirty="0"/>
               <a:t>Semis de 1248 grains dans 6 bacs (en moyenne 7 grains semés par génotype)</a:t>
             </a:r>
-            <a:endParaRPr lang="fr-FR" sz="1400" dirty="0"/>
+            <a:endParaRPr lang="fr-FR" sz="1600" b="1" dirty="0"/>
           </a:p>
         </p:txBody>
       </p:sp>
@@ -4414,8 +3918,8 @@
         </p:nvSpPr>
         <p:spPr>
           <a:xfrm>
-            <a:off x="232361" y="2558381"/>
-            <a:ext cx="3495916" cy="1600438"/>
+            <a:off x="30268" y="10347141"/>
+            <a:ext cx="4184466" cy="1785104"/>
           </a:xfrm>
           <a:prstGeom prst="rect">
             <a:avLst/>
@@ -4429,7 +3933,7 @@
           <a:lstStyle/>
           <a:p>
             <a:r>
-              <a:rPr lang="fr-FR" dirty="0" smtClean="0"/>
+              <a:rPr lang="fr-FR" sz="2000" b="1" dirty="0"/>
               <a:t>Pour chaque plante dans les bacs :</a:t>
             </a:r>
           </a:p>
@@ -4439,7 +3943,7 @@
               <a:buChar char="•"/>
             </a:pPr>
             <a:r>
-              <a:rPr lang="fr-FR" sz="1600" dirty="0" smtClean="0"/>
+              <a:rPr lang="fr-FR" b="1" dirty="0"/>
               <a:t>Date d’épiaison</a:t>
             </a:r>
           </a:p>
@@ -4449,7 +3953,7 @@
               <a:buChar char="•"/>
             </a:pPr>
             <a:r>
-              <a:rPr lang="fr-FR" sz="1600" dirty="0" smtClean="0"/>
+              <a:rPr lang="fr-FR" b="1" dirty="0"/>
               <a:t>Nombre d’épi par plante</a:t>
             </a:r>
           </a:p>
@@ -4459,7 +3963,7 @@
               <a:buChar char="•"/>
             </a:pPr>
             <a:r>
-              <a:rPr lang="fr-FR" sz="1600" dirty="0" smtClean="0"/>
+              <a:rPr lang="fr-FR" b="1" dirty="0"/>
               <a:t>Hauteur du brin maître</a:t>
             </a:r>
           </a:p>
@@ -4469,7 +3973,7 @@
               <a:buChar char="•"/>
             </a:pPr>
             <a:r>
-              <a:rPr lang="fr-FR" sz="1600" dirty="0" smtClean="0"/>
+              <a:rPr lang="fr-FR" b="1" dirty="0"/>
               <a:t>Teneur azote feuille drapeau</a:t>
             </a:r>
           </a:p>
@@ -4479,10 +3983,10 @@
               <a:buChar char="•"/>
             </a:pPr>
             <a:r>
-              <a:rPr lang="fr-FR" sz="1600" dirty="0" smtClean="0"/>
+              <a:rPr lang="fr-FR" b="1" dirty="0"/>
               <a:t>Poids total d’épi</a:t>
             </a:r>
-            <a:endParaRPr lang="fr-FR" sz="1600" dirty="0"/>
+            <a:endParaRPr lang="fr-FR" b="1" dirty="0"/>
           </a:p>
         </p:txBody>
       </p:sp>
@@ -4494,8 +3998,8 @@
         </p:nvSpPr>
         <p:spPr>
           <a:xfrm>
-            <a:off x="5259932" y="2563225"/>
-            <a:ext cx="4464277" cy="2092881"/>
+            <a:off x="7953383" y="8426305"/>
+            <a:ext cx="4238617" cy="1508105"/>
           </a:xfrm>
           <a:prstGeom prst="rect">
             <a:avLst/>
@@ -4509,8 +4013,8 @@
           <a:lstStyle/>
           <a:p>
             <a:r>
-              <a:rPr lang="fr-FR" dirty="0" smtClean="0"/>
-              <a:t>Après récolte pour les épis des brins maîtres :</a:t>
+              <a:rPr lang="fr-FR" sz="2000" b="1" dirty="0"/>
+              <a:t>Pour chaque épi récolté :</a:t>
             </a:r>
           </a:p>
           <a:p>
@@ -4519,7 +4023,7 @@
               <a:buChar char="•"/>
             </a:pPr>
             <a:r>
-              <a:rPr lang="fr-FR" sz="1600" dirty="0" smtClean="0"/>
+              <a:rPr lang="fr-FR" b="1" dirty="0"/>
               <a:t>Nombre de grain par épi</a:t>
             </a:r>
           </a:p>
@@ -4529,7 +4033,7 @@
               <a:buChar char="•"/>
             </a:pPr>
             <a:r>
-              <a:rPr lang="fr-FR" sz="1600" dirty="0" smtClean="0"/>
+              <a:rPr lang="fr-FR" b="1" dirty="0"/>
               <a:t>PMG</a:t>
             </a:r>
           </a:p>
@@ -4539,7 +4043,7 @@
               <a:buChar char="•"/>
             </a:pPr>
             <a:r>
-              <a:rPr lang="fr-FR" sz="1600" dirty="0" smtClean="0"/>
+              <a:rPr lang="fr-FR" b="1" dirty="0"/>
               <a:t>Taux de protéine moyen dans l’épi</a:t>
             </a:r>
           </a:p>
@@ -4549,25 +4053,16 @@
               <a:buChar char="•"/>
             </a:pPr>
             <a:r>
-              <a:rPr lang="fr-FR" sz="1600" dirty="0" smtClean="0"/>
-              <a:t>Morphologie individuelle de chaque grain</a:t>
-            </a:r>
-          </a:p>
-          <a:p>
-            <a:endParaRPr lang="fr-FR" sz="1600" dirty="0"/>
-          </a:p>
-          <a:p>
-            <a:r>
-              <a:rPr lang="fr-FR" sz="1600" dirty="0" smtClean="0"/>
-              <a:t>Pour 35 plantes par bac, ces mesures sont effectuées sur 2 épis par plante</a:t>
-            </a:r>
-            <a:endParaRPr lang="fr-FR" sz="1600" dirty="0" smtClean="0"/>
+              <a:rPr lang="fr-FR" b="1" dirty="0" smtClean="0"/>
+              <a:t>Taille des grains</a:t>
+            </a:r>
+            <a:endParaRPr lang="fr-FR" b="1" dirty="0"/>
           </a:p>
         </p:txBody>
       </p:sp>
       <p:pic>
         <p:nvPicPr>
-          <p:cNvPr id="60" name="Image 59"/>
+          <p:cNvPr id="35" name="Image 34"/>
           <p:cNvPicPr>
             <a:picLocks noChangeAspect="1"/>
           </p:cNvPicPr>
@@ -4587,8 +4082,8 @@
         </p:blipFill>
         <p:spPr>
           <a:xfrm>
-            <a:off x="8287078" y="160379"/>
-            <a:ext cx="2540516" cy="1905387"/>
+            <a:off x="24914" y="7769085"/>
+            <a:ext cx="3478167" cy="2608626"/>
           </a:xfrm>
           <a:prstGeom prst="rect">
             <a:avLst/>
@@ -4597,22 +4092,26 @@
       </p:pic>
       <p:cxnSp>
         <p:nvCxnSpPr>
-          <p:cNvPr id="80" name="Connecteur droit 79"/>
-          <p:cNvCxnSpPr/>
+          <p:cNvPr id="41" name="Connecteur droit avec flèche 40"/>
+          <p:cNvCxnSpPr>
+            <a:stCxn id="35" idx="3"/>
+            <a:endCxn id="15" idx="1"/>
+          </p:cNvCxnSpPr>
           <p:nvPr/>
         </p:nvCxnSpPr>
         <p:spPr>
-          <a:xfrm>
-            <a:off x="-29981" y="2332675"/>
-            <a:ext cx="12532984" cy="0"/>
-          </a:xfrm>
-          <a:prstGeom prst="line">
+          <a:xfrm flipV="1">
+            <a:off x="3503081" y="8496151"/>
+            <a:ext cx="3666742" cy="577247"/>
+          </a:xfrm>
+          <a:prstGeom prst="straightConnector1">
             <a:avLst/>
           </a:prstGeom>
           <a:ln w="28575">
             <a:solidFill>
               <a:schemeClr val="tx1"/>
             </a:solidFill>
+            <a:tailEnd type="triangle"/>
           </a:ln>
         </p:spPr>
         <p:style>
@@ -4630,6 +4129,699 @@
           </a:fontRef>
         </p:style>
       </p:cxnSp>
+      <p:pic>
+        <p:nvPicPr>
+          <p:cNvPr id="15" name="Image 14"/>
+          <p:cNvPicPr>
+            <a:picLocks noChangeAspect="1"/>
+          </p:cNvPicPr>
+          <p:nvPr/>
+        </p:nvPicPr>
+        <p:blipFill>
+          <a:blip r:embed="rId5" cstate="print">
+            <a:extLst>
+              <a:ext uri="{28A0092B-C50C-407E-A947-70E740481C1C}">
+                <a14:useLocalDpi xmlns:a14="http://schemas.microsoft.com/office/drawing/2010/main" val="0"/>
+              </a:ext>
+            </a:extLst>
+          </a:blip>
+          <a:stretch>
+            <a:fillRect/>
+          </a:stretch>
+        </p:blipFill>
+        <p:spPr>
+          <a:xfrm>
+            <a:off x="7169823" y="7838442"/>
+            <a:ext cx="783560" cy="1315418"/>
+          </a:xfrm>
+          <a:prstGeom prst="rect">
+            <a:avLst/>
+          </a:prstGeom>
+        </p:spPr>
+      </p:pic>
+      <p:pic>
+        <p:nvPicPr>
+          <p:cNvPr id="16" name="Image 15"/>
+          <p:cNvPicPr>
+            <a:picLocks noChangeAspect="1"/>
+          </p:cNvPicPr>
+          <p:nvPr/>
+        </p:nvPicPr>
+        <p:blipFill>
+          <a:blip r:embed="rId6" cstate="print">
+            <a:extLst>
+              <a:ext uri="{28A0092B-C50C-407E-A947-70E740481C1C}">
+                <a14:useLocalDpi xmlns:a14="http://schemas.microsoft.com/office/drawing/2010/main" val="0"/>
+              </a:ext>
+            </a:extLst>
+          </a:blip>
+          <a:stretch>
+            <a:fillRect/>
+          </a:stretch>
+        </p:blipFill>
+        <p:spPr>
+          <a:xfrm>
+            <a:off x="6948175" y="9476595"/>
+            <a:ext cx="1099500" cy="1190266"/>
+          </a:xfrm>
+          <a:prstGeom prst="rect">
+            <a:avLst/>
+          </a:prstGeom>
+        </p:spPr>
+      </p:pic>
+      <p:cxnSp>
+        <p:nvCxnSpPr>
+          <p:cNvPr id="47" name="Connecteur droit avec flèche 46"/>
+          <p:cNvCxnSpPr>
+            <a:stCxn id="35" idx="3"/>
+            <a:endCxn id="16" idx="1"/>
+          </p:cNvCxnSpPr>
+          <p:nvPr/>
+        </p:nvCxnSpPr>
+        <p:spPr>
+          <a:xfrm>
+            <a:off x="3503081" y="9073398"/>
+            <a:ext cx="3445094" cy="998330"/>
+          </a:xfrm>
+          <a:prstGeom prst="straightConnector1">
+            <a:avLst/>
+          </a:prstGeom>
+          <a:ln w="28575">
+            <a:solidFill>
+              <a:schemeClr val="tx1"/>
+            </a:solidFill>
+            <a:tailEnd type="triangle"/>
+          </a:ln>
+        </p:spPr>
+        <p:style>
+          <a:lnRef idx="1">
+            <a:schemeClr val="accent1"/>
+          </a:lnRef>
+          <a:fillRef idx="0">
+            <a:schemeClr val="accent1"/>
+          </a:fillRef>
+          <a:effectRef idx="0">
+            <a:schemeClr val="accent1"/>
+          </a:effectRef>
+          <a:fontRef idx="minor">
+            <a:schemeClr val="tx1"/>
+          </a:fontRef>
+        </p:style>
+      </p:cxnSp>
+      <p:sp>
+        <p:nvSpPr>
+          <p:cNvPr id="32" name="ZoneTexte 31"/>
+          <p:cNvSpPr txBox="1"/>
+          <p:nvPr/>
+        </p:nvSpPr>
+        <p:spPr>
+          <a:xfrm rot="21047790">
+            <a:off x="3505174" y="8429288"/>
+            <a:ext cx="3715564" cy="307777"/>
+          </a:xfrm>
+          <a:prstGeom prst="rect">
+            <a:avLst/>
+          </a:prstGeom>
+          <a:noFill/>
+        </p:spPr>
+        <p:txBody>
+          <a:bodyPr wrap="square" rtlCol="0">
+            <a:spAutoFit/>
+          </a:bodyPr>
+          <a:lstStyle/>
+          <a:p>
+            <a:r>
+              <a:rPr lang="fr-FR" sz="1400" b="1" dirty="0"/>
+              <a:t>Pour toutes les plantes : récolte du brin maître</a:t>
+            </a:r>
+          </a:p>
+        </p:txBody>
+      </p:sp>
+      <p:sp>
+        <p:nvSpPr>
+          <p:cNvPr id="55" name="ZoneTexte 54"/>
+          <p:cNvSpPr txBox="1"/>
+          <p:nvPr/>
+        </p:nvSpPr>
+        <p:spPr>
+          <a:xfrm rot="997081">
+            <a:off x="3567712" y="9635983"/>
+            <a:ext cx="3525588" cy="523220"/>
+          </a:xfrm>
+          <a:prstGeom prst="rect">
+            <a:avLst/>
+          </a:prstGeom>
+          <a:noFill/>
+        </p:spPr>
+        <p:txBody>
+          <a:bodyPr wrap="square" rtlCol="0">
+            <a:spAutoFit/>
+          </a:bodyPr>
+          <a:lstStyle/>
+          <a:p>
+            <a:r>
+              <a:rPr lang="fr-FR" sz="1400" b="1" dirty="0"/>
+              <a:t>Pour 35 plante par bac : récolte du brin maître et d’un thalle secondaire</a:t>
+            </a:r>
+          </a:p>
+        </p:txBody>
+      </p:sp>
+      <p:pic>
+        <p:nvPicPr>
+          <p:cNvPr id="61" name="Image 60"/>
+          <p:cNvPicPr>
+            <a:picLocks noChangeAspect="1"/>
+          </p:cNvPicPr>
+          <p:nvPr/>
+        </p:nvPicPr>
+        <p:blipFill>
+          <a:blip r:embed="rId7" cstate="print">
+            <a:extLst>
+              <a:ext uri="{28A0092B-C50C-407E-A947-70E740481C1C}">
+                <a14:useLocalDpi xmlns:a14="http://schemas.microsoft.com/office/drawing/2010/main" val="0"/>
+              </a:ext>
+            </a:extLst>
+          </a:blip>
+          <a:stretch>
+            <a:fillRect/>
+          </a:stretch>
+        </p:blipFill>
+        <p:spPr>
+          <a:xfrm>
+            <a:off x="2514881" y="1539906"/>
+            <a:ext cx="1610492" cy="1207869"/>
+          </a:xfrm>
+          <a:prstGeom prst="rect">
+            <a:avLst/>
+          </a:prstGeom>
+        </p:spPr>
+      </p:pic>
+      <p:sp>
+        <p:nvSpPr>
+          <p:cNvPr id="62" name="ZoneTexte 61"/>
+          <p:cNvSpPr txBox="1"/>
+          <p:nvPr/>
+        </p:nvSpPr>
+        <p:spPr>
+          <a:xfrm>
+            <a:off x="2500302" y="2807099"/>
+            <a:ext cx="1610492" cy="369332"/>
+          </a:xfrm>
+          <a:prstGeom prst="rect">
+            <a:avLst/>
+          </a:prstGeom>
+          <a:noFill/>
+        </p:spPr>
+        <p:txBody>
+          <a:bodyPr wrap="square" rtlCol="0">
+            <a:spAutoFit/>
+          </a:bodyPr>
+          <a:lstStyle/>
+          <a:p>
+            <a:pPr algn="ctr"/>
+            <a:r>
+              <a:rPr lang="fr-FR" b="1" dirty="0"/>
+              <a:t>Tamis</a:t>
+            </a:r>
+            <a:endParaRPr lang="fr-FR" b="1" dirty="0"/>
+          </a:p>
+        </p:txBody>
+      </p:sp>
+      <p:sp>
+        <p:nvSpPr>
+          <p:cNvPr id="63" name="ZoneTexte 62"/>
+          <p:cNvSpPr txBox="1"/>
+          <p:nvPr/>
+        </p:nvSpPr>
+        <p:spPr>
+          <a:xfrm>
+            <a:off x="8641080" y="851180"/>
+            <a:ext cx="3550920" cy="2585323"/>
+          </a:xfrm>
+          <a:prstGeom prst="rect">
+            <a:avLst/>
+          </a:prstGeom>
+          <a:noFill/>
+        </p:spPr>
+        <p:txBody>
+          <a:bodyPr wrap="square" rtlCol="0">
+            <a:spAutoFit/>
+          </a:bodyPr>
+          <a:lstStyle/>
+          <a:p>
+            <a:pPr marL="285750" indent="-285750">
+              <a:buFont typeface="Arial" panose="020B0604020202020204" pitchFamily="34" charset="0"/>
+              <a:buChar char="•"/>
+            </a:pPr>
+            <a:r>
+              <a:rPr lang="fr-FR" b="1" dirty="0"/>
+              <a:t>Récolte des deux rangs centraux de chaque micro parcelle</a:t>
+            </a:r>
+          </a:p>
+          <a:p>
+            <a:pPr marL="285750" indent="-285750">
+              <a:buFont typeface="Arial" panose="020B0604020202020204" pitchFamily="34" charset="0"/>
+              <a:buChar char="•"/>
+            </a:pPr>
+            <a:r>
+              <a:rPr lang="fr-FR" b="1" dirty="0"/>
+              <a:t>Echantillonnage aléatoire de 30 plantes</a:t>
+            </a:r>
+          </a:p>
+          <a:p>
+            <a:pPr marL="285750" indent="-285750">
+              <a:buFont typeface="Arial" panose="020B0604020202020204" pitchFamily="34" charset="0"/>
+              <a:buChar char="•"/>
+            </a:pPr>
+            <a:r>
+              <a:rPr lang="fr-FR" b="1" dirty="0"/>
+              <a:t>Mesures :</a:t>
+            </a:r>
+          </a:p>
+          <a:p>
+            <a:pPr marL="742950" lvl="1" indent="-285750">
+              <a:buFont typeface="Arial" panose="020B0604020202020204" pitchFamily="34" charset="0"/>
+              <a:buChar char="•"/>
+            </a:pPr>
+            <a:r>
+              <a:rPr lang="fr-FR" b="1" dirty="0"/>
+              <a:t>Hauteur</a:t>
+            </a:r>
+          </a:p>
+          <a:p>
+            <a:pPr marL="742950" lvl="1" indent="-285750">
+              <a:buFont typeface="Arial" panose="020B0604020202020204" pitchFamily="34" charset="0"/>
+              <a:buChar char="•"/>
+            </a:pPr>
+            <a:r>
+              <a:rPr lang="fr-FR" b="1" dirty="0"/>
+              <a:t>PMG</a:t>
+            </a:r>
+          </a:p>
+          <a:p>
+            <a:pPr marL="742950" lvl="1" indent="-285750">
+              <a:buFont typeface="Arial" panose="020B0604020202020204" pitchFamily="34" charset="0"/>
+              <a:buChar char="•"/>
+            </a:pPr>
+            <a:r>
+              <a:rPr lang="fr-FR" b="1" dirty="0"/>
+              <a:t>Protéines des grains</a:t>
+            </a:r>
+          </a:p>
+          <a:p>
+            <a:pPr marL="742950" lvl="1" indent="-285750">
+              <a:buFont typeface="Arial" panose="020B0604020202020204" pitchFamily="34" charset="0"/>
+              <a:buChar char="•"/>
+            </a:pPr>
+            <a:r>
+              <a:rPr lang="fr-FR" b="1" dirty="0" smtClean="0"/>
+              <a:t>Taille des </a:t>
+            </a:r>
+            <a:r>
+              <a:rPr lang="fr-FR" b="1" dirty="0"/>
+              <a:t>grains</a:t>
+            </a:r>
+            <a:endParaRPr lang="fr-FR" b="1" dirty="0"/>
+          </a:p>
+        </p:txBody>
+      </p:sp>
+      <p:pic>
+        <p:nvPicPr>
+          <p:cNvPr id="64" name="Image 63"/>
+          <p:cNvPicPr>
+            <a:picLocks noChangeAspect="1"/>
+          </p:cNvPicPr>
+          <p:nvPr/>
+        </p:nvPicPr>
+        <p:blipFill>
+          <a:blip r:embed="rId8" cstate="print">
+            <a:extLst>
+              <a:ext uri="{28A0092B-C50C-407E-A947-70E740481C1C}">
+                <a14:useLocalDpi xmlns:a14="http://schemas.microsoft.com/office/drawing/2010/main" val="0"/>
+              </a:ext>
+            </a:extLst>
+          </a:blip>
+          <a:stretch>
+            <a:fillRect/>
+          </a:stretch>
+        </p:blipFill>
+        <p:spPr>
+          <a:xfrm>
+            <a:off x="437126" y="1507535"/>
+            <a:ext cx="1696822" cy="1272617"/>
+          </a:xfrm>
+          <a:prstGeom prst="rect">
+            <a:avLst/>
+          </a:prstGeom>
+        </p:spPr>
+      </p:pic>
+      <p:sp>
+        <p:nvSpPr>
+          <p:cNvPr id="65" name="ZoneTexte 64"/>
+          <p:cNvSpPr txBox="1"/>
+          <p:nvPr/>
+        </p:nvSpPr>
+        <p:spPr>
+          <a:xfrm>
+            <a:off x="437126" y="2700089"/>
+            <a:ext cx="1696822" cy="646331"/>
+          </a:xfrm>
+          <a:prstGeom prst="rect">
+            <a:avLst/>
+          </a:prstGeom>
+          <a:noFill/>
+        </p:spPr>
+        <p:txBody>
+          <a:bodyPr wrap="square" rtlCol="0">
+            <a:spAutoFit/>
+          </a:bodyPr>
+          <a:lstStyle/>
+          <a:p>
+            <a:pPr algn="ctr"/>
+            <a:r>
+              <a:rPr lang="fr-FR" b="1" dirty="0"/>
+              <a:t>Grains d’une récolte d’EPO</a:t>
+            </a:r>
+            <a:endParaRPr lang="fr-FR" b="1" dirty="0"/>
+          </a:p>
+        </p:txBody>
+      </p:sp>
+      <p:cxnSp>
+        <p:nvCxnSpPr>
+          <p:cNvPr id="66" name="Connecteur droit avec flèche 65"/>
+          <p:cNvCxnSpPr>
+            <a:stCxn id="64" idx="3"/>
+            <a:endCxn id="61" idx="1"/>
+          </p:cNvCxnSpPr>
+          <p:nvPr/>
+        </p:nvCxnSpPr>
+        <p:spPr>
+          <a:xfrm flipV="1">
+            <a:off x="2133948" y="2143841"/>
+            <a:ext cx="380933" cy="3"/>
+          </a:xfrm>
+          <a:prstGeom prst="straightConnector1">
+            <a:avLst/>
+          </a:prstGeom>
+          <a:ln w="28575">
+            <a:solidFill>
+              <a:schemeClr val="tx1"/>
+            </a:solidFill>
+            <a:tailEnd type="triangle"/>
+          </a:ln>
+        </p:spPr>
+        <p:style>
+          <a:lnRef idx="1">
+            <a:schemeClr val="accent1"/>
+          </a:lnRef>
+          <a:fillRef idx="0">
+            <a:schemeClr val="accent1"/>
+          </a:fillRef>
+          <a:effectRef idx="0">
+            <a:schemeClr val="accent1"/>
+          </a:effectRef>
+          <a:fontRef idx="minor">
+            <a:schemeClr val="tx1"/>
+          </a:fontRef>
+        </p:style>
+      </p:cxnSp>
+      <p:cxnSp>
+        <p:nvCxnSpPr>
+          <p:cNvPr id="67" name="Connecteur droit avec flèche 66"/>
+          <p:cNvCxnSpPr>
+            <a:stCxn id="61" idx="3"/>
+            <a:endCxn id="69" idx="1"/>
+          </p:cNvCxnSpPr>
+          <p:nvPr/>
+        </p:nvCxnSpPr>
+        <p:spPr>
+          <a:xfrm>
+            <a:off x="4125373" y="2143841"/>
+            <a:ext cx="460595" cy="1371"/>
+          </a:xfrm>
+          <a:prstGeom prst="straightConnector1">
+            <a:avLst/>
+          </a:prstGeom>
+          <a:ln w="28575">
+            <a:solidFill>
+              <a:schemeClr val="tx1"/>
+            </a:solidFill>
+            <a:tailEnd type="triangle"/>
+          </a:ln>
+        </p:spPr>
+        <p:style>
+          <a:lnRef idx="1">
+            <a:schemeClr val="accent1"/>
+          </a:lnRef>
+          <a:fillRef idx="0">
+            <a:schemeClr val="accent1"/>
+          </a:fillRef>
+          <a:effectRef idx="0">
+            <a:schemeClr val="accent1"/>
+          </a:effectRef>
+          <a:fontRef idx="minor">
+            <a:schemeClr val="tx1"/>
+          </a:fontRef>
+        </p:style>
+      </p:cxnSp>
+      <p:cxnSp>
+        <p:nvCxnSpPr>
+          <p:cNvPr id="68" name="Connecteur droit avec flèche 67"/>
+          <p:cNvCxnSpPr>
+            <a:stCxn id="69" idx="3"/>
+            <a:endCxn id="63" idx="1"/>
+          </p:cNvCxnSpPr>
+          <p:nvPr/>
+        </p:nvCxnSpPr>
+        <p:spPr>
+          <a:xfrm flipV="1">
+            <a:off x="8325404" y="2143842"/>
+            <a:ext cx="315676" cy="1370"/>
+          </a:xfrm>
+          <a:prstGeom prst="straightConnector1">
+            <a:avLst/>
+          </a:prstGeom>
+          <a:ln w="28575">
+            <a:solidFill>
+              <a:schemeClr val="tx1"/>
+            </a:solidFill>
+            <a:tailEnd type="triangle"/>
+          </a:ln>
+        </p:spPr>
+        <p:style>
+          <a:lnRef idx="1">
+            <a:schemeClr val="accent1"/>
+          </a:lnRef>
+          <a:fillRef idx="0">
+            <a:schemeClr val="accent1"/>
+          </a:fillRef>
+          <a:effectRef idx="0">
+            <a:schemeClr val="accent1"/>
+          </a:effectRef>
+          <a:fontRef idx="minor">
+            <a:schemeClr val="tx1"/>
+          </a:fontRef>
+        </p:style>
+      </p:cxnSp>
+      <p:pic>
+        <p:nvPicPr>
+          <p:cNvPr id="69" name="Image 68"/>
+          <p:cNvPicPr>
+            <a:picLocks noChangeAspect="1"/>
+          </p:cNvPicPr>
+          <p:nvPr/>
+        </p:nvPicPr>
+        <p:blipFill>
+          <a:blip r:embed="rId9">
+            <a:extLst>
+              <a:ext uri="{28A0092B-C50C-407E-A947-70E740481C1C}">
+                <a14:useLocalDpi xmlns:a14="http://schemas.microsoft.com/office/drawing/2010/main" val="0"/>
+              </a:ext>
+            </a:extLst>
+          </a:blip>
+          <a:stretch>
+            <a:fillRect/>
+          </a:stretch>
+        </p:blipFill>
+        <p:spPr>
+          <a:xfrm>
+            <a:off x="4585968" y="703753"/>
+            <a:ext cx="3739436" cy="2882918"/>
+          </a:xfrm>
+          <a:prstGeom prst="rect">
+            <a:avLst/>
+          </a:prstGeom>
+          <a:ln>
+            <a:solidFill>
+              <a:schemeClr val="tx1"/>
+            </a:solidFill>
+          </a:ln>
+        </p:spPr>
+      </p:pic>
+      <p:sp>
+        <p:nvSpPr>
+          <p:cNvPr id="57" name="ZoneTexte 56"/>
+          <p:cNvSpPr txBox="1"/>
+          <p:nvPr/>
+        </p:nvSpPr>
+        <p:spPr>
+          <a:xfrm>
+            <a:off x="80080" y="256674"/>
+            <a:ext cx="3006020" cy="523220"/>
+          </a:xfrm>
+          <a:prstGeom prst="rect">
+            <a:avLst/>
+          </a:prstGeom>
+          <a:noFill/>
+        </p:spPr>
+        <p:txBody>
+          <a:bodyPr wrap="square" rtlCol="0">
+            <a:spAutoFit/>
+          </a:bodyPr>
+          <a:lstStyle/>
+          <a:p>
+            <a:r>
+              <a:rPr lang="fr-FR" sz="2800" dirty="0" smtClean="0"/>
+              <a:t>Au champ</a:t>
+            </a:r>
+            <a:endParaRPr lang="fr-FR" sz="2800" dirty="0"/>
+          </a:p>
+        </p:txBody>
+      </p:sp>
+      <p:cxnSp>
+        <p:nvCxnSpPr>
+          <p:cNvPr id="70" name="Connecteur droit 69"/>
+          <p:cNvCxnSpPr/>
+          <p:nvPr/>
+        </p:nvCxnSpPr>
+        <p:spPr>
+          <a:xfrm>
+            <a:off x="-134253" y="3725092"/>
+            <a:ext cx="12532984" cy="0"/>
+          </a:xfrm>
+          <a:prstGeom prst="line">
+            <a:avLst/>
+          </a:prstGeom>
+          <a:ln w="28575">
+            <a:solidFill>
+              <a:schemeClr val="tx1"/>
+            </a:solidFill>
+          </a:ln>
+        </p:spPr>
+        <p:style>
+          <a:lnRef idx="1">
+            <a:schemeClr val="accent1"/>
+          </a:lnRef>
+          <a:fillRef idx="0">
+            <a:schemeClr val="accent1"/>
+          </a:fillRef>
+          <a:effectRef idx="0">
+            <a:schemeClr val="accent1"/>
+          </a:effectRef>
+          <a:fontRef idx="minor">
+            <a:schemeClr val="tx1"/>
+          </a:fontRef>
+        </p:style>
+      </p:cxnSp>
+      <p:sp>
+        <p:nvSpPr>
+          <p:cNvPr id="71" name="ZoneTexte 70"/>
+          <p:cNvSpPr txBox="1"/>
+          <p:nvPr/>
+        </p:nvSpPr>
+        <p:spPr>
+          <a:xfrm>
+            <a:off x="227324" y="3856245"/>
+            <a:ext cx="3006020" cy="523220"/>
+          </a:xfrm>
+          <a:prstGeom prst="rect">
+            <a:avLst/>
+          </a:prstGeom>
+          <a:noFill/>
+        </p:spPr>
+        <p:txBody>
+          <a:bodyPr wrap="square" rtlCol="0">
+            <a:spAutoFit/>
+          </a:bodyPr>
+          <a:lstStyle/>
+          <a:p>
+            <a:r>
+              <a:rPr lang="fr-FR" sz="2800" dirty="0" smtClean="0"/>
+              <a:t>Dans les bacs</a:t>
+            </a:r>
+            <a:endParaRPr lang="fr-FR" sz="2800" dirty="0"/>
+          </a:p>
+        </p:txBody>
+      </p:sp>
+      <p:cxnSp>
+        <p:nvCxnSpPr>
+          <p:cNvPr id="72" name="Connecteur en arc 71"/>
+          <p:cNvCxnSpPr>
+            <a:stCxn id="96" idx="2"/>
+            <a:endCxn id="35" idx="0"/>
+          </p:cNvCxnSpPr>
+          <p:nvPr/>
+        </p:nvCxnSpPr>
+        <p:spPr>
+          <a:xfrm rot="5400000">
+            <a:off x="5105115" y="3781967"/>
+            <a:ext cx="646002" cy="7328235"/>
+          </a:xfrm>
+          <a:prstGeom prst="curvedConnector3">
+            <a:avLst/>
+          </a:prstGeom>
+          <a:ln w="28575">
+            <a:solidFill>
+              <a:schemeClr val="tx1"/>
+            </a:solidFill>
+            <a:tailEnd type="triangle"/>
+          </a:ln>
+        </p:spPr>
+        <p:style>
+          <a:lnRef idx="1">
+            <a:schemeClr val="accent1"/>
+          </a:lnRef>
+          <a:fillRef idx="0">
+            <a:schemeClr val="accent1"/>
+          </a:fillRef>
+          <a:effectRef idx="0">
+            <a:schemeClr val="accent1"/>
+          </a:effectRef>
+          <a:fontRef idx="minor">
+            <a:schemeClr val="tx1"/>
+          </a:fontRef>
+        </p:style>
+      </p:cxnSp>
+      <p:pic>
+        <p:nvPicPr>
+          <p:cNvPr id="96" name="Image 95"/>
+          <p:cNvPicPr>
+            <a:picLocks noChangeAspect="1"/>
+          </p:cNvPicPr>
+          <p:nvPr/>
+        </p:nvPicPr>
+        <p:blipFill>
+          <a:blip r:embed="rId10" cstate="print">
+            <a:extLst>
+              <a:ext uri="{28A0092B-C50C-407E-A947-70E740481C1C}">
+                <a14:useLocalDpi xmlns:a14="http://schemas.microsoft.com/office/drawing/2010/main" val="0"/>
+              </a:ext>
+            </a:extLst>
+          </a:blip>
+          <a:stretch>
+            <a:fillRect/>
+          </a:stretch>
+        </p:blipFill>
+        <p:spPr>
+          <a:xfrm>
+            <a:off x="7411093" y="4601373"/>
+            <a:ext cx="3362279" cy="2521710"/>
+          </a:xfrm>
+          <a:prstGeom prst="rect">
+            <a:avLst/>
+          </a:prstGeom>
+        </p:spPr>
+      </p:pic>
     </p:spTree>
     <p:extLst>
       <p:ext uri="{BB962C8B-B14F-4D97-AF65-F5344CB8AC3E}">
@@ -4744,6 +4936,60 @@
                                   </p:childTnLst>
                                 </p:cTn>
                               </p:par>
+                              <p:par>
+                                <p:cTn id="11" presetID="1" presetClass="entr" presetSubtype="0" fill="hold" nodeType="withEffect">
+                                  <p:stCondLst>
+                                    <p:cond delay="0"/>
+                                  </p:stCondLst>
+                                  <p:childTnLst>
+                                    <p:set>
+                                      <p:cBhvr>
+                                        <p:cTn id="12" dur="1" fill="hold">
+                                          <p:stCondLst>
+                                            <p:cond delay="0"/>
+                                          </p:stCondLst>
+                                        </p:cTn>
+                                        <p:tgtEl>
+                                          <p:spTgt spid="61"/>
+                                        </p:tgtEl>
+                                        <p:attrNameLst>
+                                          <p:attrName>style.visibility</p:attrName>
+                                        </p:attrNameLst>
+                                      </p:cBhvr>
+                                      <p:to>
+                                        <p:strVal val="visible"/>
+                                      </p:to>
+                                    </p:set>
+                                  </p:childTnLst>
+                                </p:cTn>
+                              </p:par>
+                              <p:par>
+                                <p:cTn id="13" presetID="1" presetClass="entr" presetSubtype="0" fill="hold" nodeType="withEffect">
+                                  <p:stCondLst>
+                                    <p:cond delay="0"/>
+                                  </p:stCondLst>
+                                  <p:childTnLst>
+                                    <p:set>
+                                      <p:cBhvr>
+                                        <p:cTn id="14" dur="1" fill="hold">
+                                          <p:stCondLst>
+                                            <p:cond delay="0"/>
+                                          </p:stCondLst>
+                                        </p:cTn>
+                                        <p:tgtEl>
+                                          <p:spTgt spid="64"/>
+                                        </p:tgtEl>
+                                        <p:attrNameLst>
+                                          <p:attrName>style.visibility</p:attrName>
+                                        </p:attrNameLst>
+                                      </p:cBhvr>
+                                      <p:to>
+                                        <p:strVal val="visible"/>
+                                      </p:to>
+                                    </p:set>
+                                  </p:childTnLst>
+                                </p:cTn>
+                              </p:par>
                             </p:childTnLst>
                           </p:cTn>
                         </p:par>
@@ -4778,7 +5024,7 @@
 <file path=ppt/theme/theme1.xml><?xml version="1.0" encoding="utf-8"?>
 <a:theme xmlns:a="http://schemas.openxmlformats.org/drawingml/2006/main" name="Thème Office">
   <a:themeElements>
-    <a:clrScheme name="Office">
+    <a:clrScheme name="Thème Office">
       <a:dk1>
         <a:sysClr val="windowText" lastClr="000000"/>
       </a:dk1>
@@ -4816,7 +5062,7 @@
         <a:srgbClr val="954F72"/>
       </a:folHlink>
     </a:clrScheme>
-    <a:fontScheme name="Office">
+    <a:fontScheme name="Thème Office">
       <a:majorFont>
         <a:latin typeface="Calibri Light" panose="020F0302020204030204"/>
         <a:ea typeface=""/>
@@ -4888,7 +5134,7 @@
         <a:font script="Geor" typeface="Sylfaen"/>
       </a:minorFont>
     </a:fontScheme>
-    <a:fmtScheme name="Office">
+    <a:fmtScheme name="Thème Office">
       <a:fillStyleLst>
         <a:solidFill>
           <a:schemeClr val="phClr"/>

</xml_diff>

<commit_message>
presque finalisation de la v1
</commit_message>
<xml_diff>
--- a/schéma données.pptx
+++ b/schéma données.pptx
@@ -243,7 +243,7 @@
           <a:p>
             <a:fld id="{C506BA6A-110B-4565-B24C-94066013DFC6}" type="datetimeFigureOut">
               <a:rPr lang="fr-FR" smtClean="0"/>
-              <a:t>10/08/2023</a:t>
+              <a:t>29/08/2023</a:t>
             </a:fld>
             <a:endParaRPr lang="fr-FR"/>
           </a:p>
@@ -413,7 +413,7 @@
           <a:p>
             <a:fld id="{C506BA6A-110B-4565-B24C-94066013DFC6}" type="datetimeFigureOut">
               <a:rPr lang="fr-FR" smtClean="0"/>
-              <a:t>10/08/2023</a:t>
+              <a:t>29/08/2023</a:t>
             </a:fld>
             <a:endParaRPr lang="fr-FR"/>
           </a:p>
@@ -593,7 +593,7 @@
           <a:p>
             <a:fld id="{C506BA6A-110B-4565-B24C-94066013DFC6}" type="datetimeFigureOut">
               <a:rPr lang="fr-FR" smtClean="0"/>
-              <a:t>10/08/2023</a:t>
+              <a:t>29/08/2023</a:t>
             </a:fld>
             <a:endParaRPr lang="fr-FR"/>
           </a:p>
@@ -763,7 +763,7 @@
           <a:p>
             <a:fld id="{C506BA6A-110B-4565-B24C-94066013DFC6}" type="datetimeFigureOut">
               <a:rPr lang="fr-FR" smtClean="0"/>
-              <a:t>10/08/2023</a:t>
+              <a:t>29/08/2023</a:t>
             </a:fld>
             <a:endParaRPr lang="fr-FR"/>
           </a:p>
@@ -1007,7 +1007,7 @@
           <a:p>
             <a:fld id="{C506BA6A-110B-4565-B24C-94066013DFC6}" type="datetimeFigureOut">
               <a:rPr lang="fr-FR" smtClean="0"/>
-              <a:t>10/08/2023</a:t>
+              <a:t>29/08/2023</a:t>
             </a:fld>
             <a:endParaRPr lang="fr-FR"/>
           </a:p>
@@ -1239,7 +1239,7 @@
           <a:p>
             <a:fld id="{C506BA6A-110B-4565-B24C-94066013DFC6}" type="datetimeFigureOut">
               <a:rPr lang="fr-FR" smtClean="0"/>
-              <a:t>10/08/2023</a:t>
+              <a:t>29/08/2023</a:t>
             </a:fld>
             <a:endParaRPr lang="fr-FR"/>
           </a:p>
@@ -1606,7 +1606,7 @@
           <a:p>
             <a:fld id="{C506BA6A-110B-4565-B24C-94066013DFC6}" type="datetimeFigureOut">
               <a:rPr lang="fr-FR" smtClean="0"/>
-              <a:t>10/08/2023</a:t>
+              <a:t>29/08/2023</a:t>
             </a:fld>
             <a:endParaRPr lang="fr-FR"/>
           </a:p>
@@ -1724,7 +1724,7 @@
           <a:p>
             <a:fld id="{C506BA6A-110B-4565-B24C-94066013DFC6}" type="datetimeFigureOut">
               <a:rPr lang="fr-FR" smtClean="0"/>
-              <a:t>10/08/2023</a:t>
+              <a:t>29/08/2023</a:t>
             </a:fld>
             <a:endParaRPr lang="fr-FR"/>
           </a:p>
@@ -1819,7 +1819,7 @@
           <a:p>
             <a:fld id="{C506BA6A-110B-4565-B24C-94066013DFC6}" type="datetimeFigureOut">
               <a:rPr lang="fr-FR" smtClean="0"/>
-              <a:t>10/08/2023</a:t>
+              <a:t>29/08/2023</a:t>
             </a:fld>
             <a:endParaRPr lang="fr-FR"/>
           </a:p>
@@ -2096,7 +2096,7 @@
           <a:p>
             <a:fld id="{C506BA6A-110B-4565-B24C-94066013DFC6}" type="datetimeFigureOut">
               <a:rPr lang="fr-FR" smtClean="0"/>
-              <a:t>10/08/2023</a:t>
+              <a:t>29/08/2023</a:t>
             </a:fld>
             <a:endParaRPr lang="fr-FR"/>
           </a:p>
@@ -2353,7 +2353,7 @@
           <a:p>
             <a:fld id="{C506BA6A-110B-4565-B24C-94066013DFC6}" type="datetimeFigureOut">
               <a:rPr lang="fr-FR" smtClean="0"/>
-              <a:t>10/08/2023</a:t>
+              <a:t>29/08/2023</a:t>
             </a:fld>
             <a:endParaRPr lang="fr-FR"/>
           </a:p>
@@ -2566,7 +2566,7 @@
           <a:p>
             <a:fld id="{C506BA6A-110B-4565-B24C-94066013DFC6}" type="datetimeFigureOut">
               <a:rPr lang="fr-FR" smtClean="0"/>
-              <a:t>10/08/2023</a:t>
+              <a:t>29/08/2023</a:t>
             </a:fld>
             <a:endParaRPr lang="fr-FR"/>
           </a:p>
@@ -2993,7 +2993,7 @@
         </p:blipFill>
         <p:spPr>
           <a:xfrm>
-            <a:off x="370070" y="5153710"/>
+            <a:off x="370070" y="5731222"/>
             <a:ext cx="626626" cy="469970"/>
           </a:xfrm>
           <a:prstGeom prst="rect">
@@ -3023,7 +3023,7 @@
         </p:blipFill>
         <p:spPr>
           <a:xfrm>
-            <a:off x="370070" y="5623680"/>
+            <a:off x="370070" y="6201192"/>
             <a:ext cx="626626" cy="469970"/>
           </a:xfrm>
           <a:prstGeom prst="rect">
@@ -3053,7 +3053,7 @@
         </p:blipFill>
         <p:spPr>
           <a:xfrm>
-            <a:off x="351782" y="6328635"/>
+            <a:off x="351782" y="6906147"/>
             <a:ext cx="626626" cy="469970"/>
           </a:xfrm>
           <a:prstGeom prst="rect">
@@ -3069,7 +3069,7 @@
         </p:nvSpPr>
         <p:spPr>
           <a:xfrm rot="16200000">
-            <a:off x="417449" y="6026477"/>
+            <a:off x="417449" y="6603989"/>
             <a:ext cx="420624" cy="369332"/>
           </a:xfrm>
           <a:prstGeom prst="rect">
@@ -3088,7 +3088,6 @@
               <a:rPr lang="fr-FR" b="1" dirty="0"/>
               <a:t>…</a:t>
             </a:r>
-            <a:endParaRPr lang="fr-FR" b="1" dirty="0"/>
           </a:p>
         </p:txBody>
       </p:sp>
@@ -3100,7 +3099,7 @@
         </p:nvSpPr>
         <p:spPr>
           <a:xfrm>
-            <a:off x="1092587" y="5201327"/>
+            <a:off x="1092587" y="5778839"/>
             <a:ext cx="128016" cy="1481328"/>
           </a:xfrm>
           <a:prstGeom prst="rightBrace">
@@ -3143,8 +3142,8 @@
         </p:nvSpPr>
         <p:spPr>
           <a:xfrm>
-            <a:off x="1281044" y="5683810"/>
-            <a:ext cx="2172164" cy="584775"/>
+            <a:off x="1280036" y="6165380"/>
+            <a:ext cx="2964673" cy="707886"/>
           </a:xfrm>
           <a:prstGeom prst="rect">
             <a:avLst/>
@@ -3158,16 +3157,15 @@
           <a:lstStyle/>
           <a:p>
             <a:r>
-              <a:rPr lang="fr-FR" sz="1600" b="1" dirty="0"/>
+              <a:rPr lang="fr-FR" sz="2000" b="1" dirty="0"/>
               <a:t>180 génotypes</a:t>
             </a:r>
           </a:p>
           <a:p>
             <a:r>
-              <a:rPr lang="fr-FR" sz="1600" b="1" dirty="0"/>
+              <a:rPr lang="fr-FR" sz="2000" b="1" dirty="0"/>
               <a:t>12 grains par génotype</a:t>
             </a:r>
-            <a:endParaRPr lang="fr-FR" sz="1600" b="1" dirty="0"/>
           </a:p>
         </p:txBody>
       </p:sp>
@@ -3179,7 +3177,7 @@
         </p:nvSpPr>
         <p:spPr>
           <a:xfrm>
-            <a:off x="-27694" y="5213840"/>
+            <a:off x="-27694" y="5791352"/>
             <a:ext cx="539496" cy="338554"/>
           </a:xfrm>
           <a:prstGeom prst="rect">
@@ -3197,7 +3195,6 @@
               <a:rPr lang="fr-FR" sz="1600" b="1" dirty="0"/>
               <a:t>G1</a:t>
             </a:r>
-            <a:endParaRPr lang="fr-FR" sz="1600" b="1" dirty="0"/>
           </a:p>
         </p:txBody>
       </p:sp>
@@ -3209,7 +3206,7 @@
         </p:nvSpPr>
         <p:spPr>
           <a:xfrm>
-            <a:off x="-27825" y="5683810"/>
+            <a:off x="-27825" y="6261322"/>
             <a:ext cx="539496" cy="338554"/>
           </a:xfrm>
           <a:prstGeom prst="rect">
@@ -3227,7 +3224,6 @@
               <a:rPr lang="fr-FR" sz="1600" b="1" dirty="0"/>
               <a:t>G2</a:t>
             </a:r>
-            <a:endParaRPr lang="fr-FR" sz="1600" b="1" dirty="0"/>
           </a:p>
         </p:txBody>
       </p:sp>
@@ -3239,7 +3235,7 @@
         </p:nvSpPr>
         <p:spPr>
           <a:xfrm>
-            <a:off x="-78856" y="6421455"/>
+            <a:off x="-78856" y="6998967"/>
             <a:ext cx="641557" cy="261610"/>
           </a:xfrm>
           <a:prstGeom prst="rect">
@@ -3257,7 +3253,6 @@
               <a:rPr lang="fr-FR" sz="1100" b="1" dirty="0"/>
               <a:t>G180</a:t>
             </a:r>
-            <a:endParaRPr lang="fr-FR" sz="1100" b="1" dirty="0"/>
           </a:p>
         </p:txBody>
       </p:sp>
@@ -3269,7 +3264,7 @@
         </p:nvGrpSpPr>
         <p:grpSpPr>
           <a:xfrm rot="2755314">
-            <a:off x="4124620" y="5464289"/>
+            <a:off x="5536324" y="5897423"/>
             <a:ext cx="342474" cy="336387"/>
             <a:chOff x="4873752" y="863102"/>
             <a:chExt cx="740664" cy="953016"/>
@@ -3395,8 +3390,8 @@
         </p:nvSpPr>
         <p:spPr>
           <a:xfrm>
-            <a:off x="3564337" y="4937428"/>
-            <a:ext cx="1463040" cy="551690"/>
+            <a:off x="4780199" y="5180382"/>
+            <a:ext cx="1853114" cy="695963"/>
           </a:xfrm>
           <a:prstGeom prst="rect">
             <a:avLst/>
@@ -3434,10 +3429,9 @@
           <a:p>
             <a:pPr algn="ctr"/>
             <a:r>
-              <a:rPr lang="fr-FR" dirty="0"/>
+              <a:rPr lang="fr-FR" sz="2000" b="1" dirty="0"/>
               <a:t>Spectromètre</a:t>
             </a:r>
-            <a:endParaRPr lang="fr-FR" dirty="0"/>
           </a:p>
         </p:txBody>
       </p:sp>
@@ -3449,7 +3443,7 @@
         </p:nvGrpSpPr>
         <p:grpSpPr>
           <a:xfrm>
-            <a:off x="3946284" y="5919556"/>
+            <a:off x="5357988" y="6352690"/>
             <a:ext cx="697539" cy="292608"/>
             <a:chOff x="3666744" y="2697480"/>
             <a:chExt cx="1234440" cy="585216"/>
@@ -3545,8 +3539,8 @@
         </p:nvSpPr>
         <p:spPr>
           <a:xfrm>
-            <a:off x="3397002" y="6306055"/>
-            <a:ext cx="1707250" cy="584775"/>
+            <a:off x="4461326" y="6657784"/>
+            <a:ext cx="2490861" cy="707886"/>
           </a:xfrm>
           <a:prstGeom prst="rect">
             <a:avLst/>
@@ -3561,10 +3555,9 @@
           <a:p>
             <a:pPr algn="ctr"/>
             <a:r>
-              <a:rPr lang="fr-FR" sz="1600" b="1" dirty="0"/>
+              <a:rPr lang="fr-FR" sz="2000" b="1" dirty="0"/>
               <a:t>NIRS individuelle de chaque grain</a:t>
             </a:r>
-            <a:endParaRPr lang="fr-FR" sz="1600" b="1" dirty="0"/>
           </a:p>
         </p:txBody>
       </p:sp>
@@ -3576,10 +3569,10 @@
         </p:nvGrpSpPr>
         <p:grpSpPr>
           <a:xfrm>
-            <a:off x="5362955" y="4803818"/>
-            <a:ext cx="1487926" cy="1244888"/>
-            <a:chOff x="6172200" y="-39931"/>
-            <a:chExt cx="1487926" cy="1244888"/>
+            <a:off x="7729615" y="5187975"/>
+            <a:ext cx="1695571" cy="1245739"/>
+            <a:chOff x="6068375" y="-40782"/>
+            <a:chExt cx="1695571" cy="1245739"/>
           </a:xfrm>
         </p:grpSpPr>
         <p:pic>
@@ -3620,8 +3613,8 @@
           </p:nvSpPr>
           <p:spPr>
             <a:xfrm>
-              <a:off x="6172200" y="-39931"/>
-              <a:ext cx="1487926" cy="369332"/>
+              <a:off x="6068375" y="-40782"/>
+              <a:ext cx="1695571" cy="400110"/>
             </a:xfrm>
             <a:prstGeom prst="rect">
               <a:avLst/>
@@ -3636,10 +3629,9 @@
             <a:p>
               <a:pPr algn="ctr"/>
               <a:r>
-                <a:rPr lang="fr-FR" dirty="0"/>
+                <a:rPr lang="fr-FR" sz="2000" b="1" dirty="0"/>
                 <a:t>Optomachine</a:t>
               </a:r>
-              <a:endParaRPr lang="fr-FR" dirty="0"/>
             </a:p>
           </p:txBody>
         </p:sp>
@@ -3652,8 +3644,8 @@
         </p:nvSpPr>
         <p:spPr>
           <a:xfrm>
-            <a:off x="4926518" y="6314585"/>
-            <a:ext cx="2411442" cy="830997"/>
+            <a:off x="6673232" y="6664998"/>
+            <a:ext cx="3808338" cy="707886"/>
           </a:xfrm>
           <a:prstGeom prst="rect">
             <a:avLst/>
@@ -3668,10 +3660,9 @@
           <a:p>
             <a:pPr algn="ctr"/>
             <a:r>
-              <a:rPr lang="fr-FR" sz="1600" b="1" dirty="0"/>
+              <a:rPr lang="fr-FR" sz="2000" b="1" dirty="0"/>
               <a:t>Mesure morphologiques individuelles de chaque grain</a:t>
             </a:r>
-            <a:endParaRPr lang="fr-FR" sz="1600" b="1" dirty="0"/>
           </a:p>
         </p:txBody>
       </p:sp>
@@ -3683,7 +3674,7 @@
         </p:nvGrpSpPr>
         <p:grpSpPr>
           <a:xfrm>
-            <a:off x="5758147" y="5977793"/>
+            <a:off x="8228632" y="6362801"/>
             <a:ext cx="697539" cy="292608"/>
             <a:chOff x="3666744" y="2697480"/>
             <a:chExt cx="1234440" cy="585216"/>
@@ -3778,9 +3769,9 @@
           <p:nvPr/>
         </p:nvCxnSpPr>
         <p:spPr>
-          <a:xfrm flipV="1">
-            <a:off x="3320127" y="6054378"/>
-            <a:ext cx="408151" cy="1"/>
+          <a:xfrm>
+            <a:off x="3867607" y="6481842"/>
+            <a:ext cx="1272375" cy="5671"/>
           </a:xfrm>
           <a:prstGeom prst="straightConnector1">
             <a:avLst/>
@@ -3814,9 +3805,9 @@
           <p:nvPr/>
         </p:nvCxnSpPr>
         <p:spPr>
-          <a:xfrm flipV="1">
-            <a:off x="4897006" y="6048706"/>
-            <a:ext cx="408151" cy="1"/>
+          <a:xfrm>
+            <a:off x="6308710" y="6481842"/>
+            <a:ext cx="1579323" cy="17152"/>
           </a:xfrm>
           <a:prstGeom prst="straightConnector1">
             <a:avLst/>
@@ -3843,223 +3834,6 @@
           </a:fontRef>
         </p:style>
       </p:cxnSp>
-      <p:cxnSp>
-        <p:nvCxnSpPr>
-          <p:cNvPr id="49" name="Connecteur droit avec flèche 48"/>
-          <p:cNvCxnSpPr/>
-          <p:nvPr/>
-        </p:nvCxnSpPr>
-        <p:spPr>
-          <a:xfrm flipV="1">
-            <a:off x="6885531" y="6033668"/>
-            <a:ext cx="481150" cy="1"/>
-          </a:xfrm>
-          <a:prstGeom prst="straightConnector1">
-            <a:avLst/>
-          </a:prstGeom>
-          <a:ln w="28575">
-            <a:solidFill>
-              <a:schemeClr val="tx1"/>
-            </a:solidFill>
-            <a:tailEnd type="triangle"/>
-          </a:ln>
-        </p:spPr>
-        <p:style>
-          <a:lnRef idx="1">
-            <a:schemeClr val="accent1"/>
-          </a:lnRef>
-          <a:fillRef idx="0">
-            <a:schemeClr val="accent1"/>
-          </a:fillRef>
-          <a:effectRef idx="0">
-            <a:schemeClr val="accent1"/>
-          </a:effectRef>
-          <a:fontRef idx="minor">
-            <a:schemeClr val="tx1"/>
-          </a:fontRef>
-        </p:style>
-      </p:cxnSp>
-      <p:sp>
-        <p:nvSpPr>
-          <p:cNvPr id="50" name="ZoneTexte 49"/>
-          <p:cNvSpPr txBox="1"/>
-          <p:nvPr/>
-        </p:nvSpPr>
-        <p:spPr>
-          <a:xfrm>
-            <a:off x="7126106" y="3995577"/>
-            <a:ext cx="3952680" cy="584775"/>
-          </a:xfrm>
-          <a:prstGeom prst="rect">
-            <a:avLst/>
-          </a:prstGeom>
-          <a:noFill/>
-        </p:spPr>
-        <p:txBody>
-          <a:bodyPr wrap="square" rtlCol="0">
-            <a:spAutoFit/>
-          </a:bodyPr>
-          <a:lstStyle/>
-          <a:p>
-            <a:pPr algn="ctr"/>
-            <a:r>
-              <a:rPr lang="fr-FR" sz="1600" b="1" dirty="0"/>
-              <a:t>Semis de 1248 grains dans 6 bacs (en moyenne 7 grains semés par génotype)</a:t>
-            </a:r>
-            <a:endParaRPr lang="fr-FR" sz="1600" b="1" dirty="0"/>
-          </a:p>
-        </p:txBody>
-      </p:sp>
-      <p:sp>
-        <p:nvSpPr>
-          <p:cNvPr id="54" name="ZoneTexte 53"/>
-          <p:cNvSpPr txBox="1"/>
-          <p:nvPr/>
-        </p:nvSpPr>
-        <p:spPr>
-          <a:xfrm>
-            <a:off x="30268" y="10347141"/>
-            <a:ext cx="4184466" cy="1785104"/>
-          </a:xfrm>
-          <a:prstGeom prst="rect">
-            <a:avLst/>
-          </a:prstGeom>
-          <a:noFill/>
-        </p:spPr>
-        <p:txBody>
-          <a:bodyPr wrap="square" rtlCol="0">
-            <a:spAutoFit/>
-          </a:bodyPr>
-          <a:lstStyle/>
-          <a:p>
-            <a:r>
-              <a:rPr lang="fr-FR" sz="2000" b="1" dirty="0"/>
-              <a:t>Pour chaque plante dans les bacs :</a:t>
-            </a:r>
-          </a:p>
-          <a:p>
-            <a:pPr marL="742950" lvl="1" indent="-285750">
-              <a:buFont typeface="Arial" panose="020B0604020202020204" pitchFamily="34" charset="0"/>
-              <a:buChar char="•"/>
-            </a:pPr>
-            <a:r>
-              <a:rPr lang="fr-FR" b="1" dirty="0"/>
-              <a:t>Date d’épiaison</a:t>
-            </a:r>
-          </a:p>
-          <a:p>
-            <a:pPr marL="742950" lvl="1" indent="-285750">
-              <a:buFont typeface="Arial" panose="020B0604020202020204" pitchFamily="34" charset="0"/>
-              <a:buChar char="•"/>
-            </a:pPr>
-            <a:r>
-              <a:rPr lang="fr-FR" b="1" dirty="0"/>
-              <a:t>Nombre d’épi par plante</a:t>
-            </a:r>
-          </a:p>
-          <a:p>
-            <a:pPr marL="742950" lvl="1" indent="-285750">
-              <a:buFont typeface="Arial" panose="020B0604020202020204" pitchFamily="34" charset="0"/>
-              <a:buChar char="•"/>
-            </a:pPr>
-            <a:r>
-              <a:rPr lang="fr-FR" b="1" dirty="0"/>
-              <a:t>Hauteur du brin maître</a:t>
-            </a:r>
-          </a:p>
-          <a:p>
-            <a:pPr marL="742950" lvl="1" indent="-285750">
-              <a:buFont typeface="Arial" panose="020B0604020202020204" pitchFamily="34" charset="0"/>
-              <a:buChar char="•"/>
-            </a:pPr>
-            <a:r>
-              <a:rPr lang="fr-FR" b="1" dirty="0"/>
-              <a:t>Teneur azote feuille drapeau</a:t>
-            </a:r>
-          </a:p>
-          <a:p>
-            <a:pPr marL="742950" lvl="1" indent="-285750">
-              <a:buFont typeface="Arial" panose="020B0604020202020204" pitchFamily="34" charset="0"/>
-              <a:buChar char="•"/>
-            </a:pPr>
-            <a:r>
-              <a:rPr lang="fr-FR" b="1" dirty="0"/>
-              <a:t>Poids total d’épi</a:t>
-            </a:r>
-            <a:endParaRPr lang="fr-FR" b="1" dirty="0"/>
-          </a:p>
-        </p:txBody>
-      </p:sp>
-      <p:sp>
-        <p:nvSpPr>
-          <p:cNvPr id="58" name="ZoneTexte 57"/>
-          <p:cNvSpPr txBox="1"/>
-          <p:nvPr/>
-        </p:nvSpPr>
-        <p:spPr>
-          <a:xfrm>
-            <a:off x="7953383" y="8426305"/>
-            <a:ext cx="4238617" cy="1508105"/>
-          </a:xfrm>
-          <a:prstGeom prst="rect">
-            <a:avLst/>
-          </a:prstGeom>
-          <a:noFill/>
-        </p:spPr>
-        <p:txBody>
-          <a:bodyPr wrap="square" rtlCol="0">
-            <a:spAutoFit/>
-          </a:bodyPr>
-          <a:lstStyle/>
-          <a:p>
-            <a:r>
-              <a:rPr lang="fr-FR" sz="2000" b="1" dirty="0"/>
-              <a:t>Pour chaque épi récolté :</a:t>
-            </a:r>
-          </a:p>
-          <a:p>
-            <a:pPr marL="742950" lvl="1" indent="-285750">
-              <a:buFont typeface="Arial" panose="020B0604020202020204" pitchFamily="34" charset="0"/>
-              <a:buChar char="•"/>
-            </a:pPr>
-            <a:r>
-              <a:rPr lang="fr-FR" b="1" dirty="0"/>
-              <a:t>Nombre de grain par épi</a:t>
-            </a:r>
-          </a:p>
-          <a:p>
-            <a:pPr marL="742950" lvl="1" indent="-285750">
-              <a:buFont typeface="Arial" panose="020B0604020202020204" pitchFamily="34" charset="0"/>
-              <a:buChar char="•"/>
-            </a:pPr>
-            <a:r>
-              <a:rPr lang="fr-FR" b="1" dirty="0"/>
-              <a:t>PMG</a:t>
-            </a:r>
-          </a:p>
-          <a:p>
-            <a:pPr marL="742950" lvl="1" indent="-285750">
-              <a:buFont typeface="Arial" panose="020B0604020202020204" pitchFamily="34" charset="0"/>
-              <a:buChar char="•"/>
-            </a:pPr>
-            <a:r>
-              <a:rPr lang="fr-FR" b="1" dirty="0"/>
-              <a:t>Taux de protéine moyen dans l’épi</a:t>
-            </a:r>
-          </a:p>
-          <a:p>
-            <a:pPr marL="742950" lvl="1" indent="-285750">
-              <a:buFont typeface="Arial" panose="020B0604020202020204" pitchFamily="34" charset="0"/>
-              <a:buChar char="•"/>
-            </a:pPr>
-            <a:r>
-              <a:rPr lang="fr-FR" b="1" dirty="0" smtClean="0"/>
-              <a:t>Taille des grains</a:t>
-            </a:r>
-            <a:endParaRPr lang="fr-FR" b="1" dirty="0"/>
-          </a:p>
-        </p:txBody>
-      </p:sp>
       <p:pic>
         <p:nvPicPr>
           <p:cNvPr id="35" name="Image 34"/>
@@ -4082,7 +3856,7 @@
         </p:blipFill>
         <p:spPr>
           <a:xfrm>
-            <a:off x="24914" y="7769085"/>
+            <a:off x="24914" y="8731605"/>
             <a:ext cx="3478167" cy="2608626"/>
           </a:xfrm>
           <a:prstGeom prst="rect">
@@ -4101,7 +3875,7 @@
         </p:nvCxnSpPr>
         <p:spPr>
           <a:xfrm flipV="1">
-            <a:off x="3503081" y="8496151"/>
+            <a:off x="3503081" y="9458671"/>
             <a:ext cx="3666742" cy="577247"/>
           </a:xfrm>
           <a:prstGeom prst="straightConnector1">
@@ -4151,7 +3925,7 @@
         </p:blipFill>
         <p:spPr>
           <a:xfrm>
-            <a:off x="7169823" y="7838442"/>
+            <a:off x="7169823" y="8800962"/>
             <a:ext cx="783560" cy="1315418"/>
           </a:xfrm>
           <a:prstGeom prst="rect">
@@ -4181,7 +3955,7 @@
         </p:blipFill>
         <p:spPr>
           <a:xfrm>
-            <a:off x="6948175" y="9476595"/>
+            <a:off x="6948175" y="10439115"/>
             <a:ext cx="1099500" cy="1190266"/>
           </a:xfrm>
           <a:prstGeom prst="rect">
@@ -4200,7 +3974,7 @@
         </p:nvCxnSpPr>
         <p:spPr>
           <a:xfrm>
-            <a:off x="3503081" y="9073398"/>
+            <a:off x="3503081" y="10035918"/>
             <a:ext cx="3445094" cy="998330"/>
           </a:xfrm>
           <a:prstGeom prst="straightConnector1">
@@ -4236,8 +4010,8 @@
         </p:nvSpPr>
         <p:spPr>
           <a:xfrm rot="21047790">
-            <a:off x="3505174" y="8429288"/>
-            <a:ext cx="3715564" cy="307777"/>
+            <a:off x="3900365" y="8948429"/>
+            <a:ext cx="3715564" cy="707886"/>
           </a:xfrm>
           <a:prstGeom prst="rect">
             <a:avLst/>
@@ -4251,8 +4025,19 @@
           <a:lstStyle/>
           <a:p>
             <a:r>
-              <a:rPr lang="fr-FR" sz="1400" b="1" dirty="0"/>
-              <a:t>Pour toutes les plantes : récolte du brin maître</a:t>
+              <a:rPr lang="fr-FR" sz="2000" b="1" dirty="0"/>
+              <a:t>Pour toutes les plantes : </a:t>
+            </a:r>
+            <a:endParaRPr lang="fr-FR" sz="2000" b="1" dirty="0" smtClean="0"/>
+          </a:p>
+          <a:p>
+            <a:r>
+              <a:rPr lang="fr-FR" sz="2000" b="1" dirty="0" smtClean="0"/>
+              <a:t>récolte </a:t>
+            </a:r>
+            <a:r>
+              <a:rPr lang="fr-FR" sz="2000" b="1" dirty="0"/>
+              <a:t>du brin maître</a:t>
             </a:r>
           </a:p>
         </p:txBody>
@@ -4265,8 +4050,8 @@
         </p:nvSpPr>
         <p:spPr>
           <a:xfrm rot="997081">
-            <a:off x="3567712" y="9635983"/>
-            <a:ext cx="3525588" cy="523220"/>
+            <a:off x="3743084" y="10601989"/>
+            <a:ext cx="2991403" cy="1015663"/>
           </a:xfrm>
           <a:prstGeom prst="rect">
             <a:avLst/>
@@ -4280,7 +4065,7 @@
           <a:lstStyle/>
           <a:p>
             <a:r>
-              <a:rPr lang="fr-FR" sz="1400" b="1" dirty="0"/>
+              <a:rPr lang="fr-FR" sz="2000" b="1" dirty="0"/>
               <a:t>Pour 35 plante par bac : récolte du brin maître et d’un thalle secondaire</a:t>
             </a:r>
           </a:p>
@@ -4308,7 +4093,7 @@
         </p:blipFill>
         <p:spPr>
           <a:xfrm>
-            <a:off x="2514881" y="1539906"/>
+            <a:off x="2514881" y="1812620"/>
             <a:ext cx="1610492" cy="1207869"/>
           </a:xfrm>
           <a:prstGeom prst="rect">
@@ -4324,8 +4109,8 @@
         </p:nvSpPr>
         <p:spPr>
           <a:xfrm>
-            <a:off x="2500302" y="2807099"/>
-            <a:ext cx="1610492" cy="369332"/>
+            <a:off x="2500302" y="3079813"/>
+            <a:ext cx="1610492" cy="523220"/>
           </a:xfrm>
           <a:prstGeom prst="rect">
             <a:avLst/>
@@ -4340,10 +4125,9 @@
           <a:p>
             <a:pPr algn="ctr"/>
             <a:r>
-              <a:rPr lang="fr-FR" b="1" dirty="0"/>
+              <a:rPr lang="fr-FR" sz="2800" b="1" dirty="0"/>
               <a:t>Tamis</a:t>
             </a:r>
-            <a:endParaRPr lang="fr-FR" b="1" dirty="0"/>
           </a:p>
         </p:txBody>
       </p:sp>
@@ -4355,8 +4139,8 @@
         </p:nvSpPr>
         <p:spPr>
           <a:xfrm>
-            <a:off x="8641080" y="851180"/>
-            <a:ext cx="3550920" cy="2585323"/>
+            <a:off x="9707764" y="2006822"/>
+            <a:ext cx="2587854" cy="830997"/>
           </a:xfrm>
           <a:prstGeom prst="rect">
             <a:avLst/>
@@ -4369,79 +4153,15 @@
           </a:bodyPr>
           <a:lstStyle/>
           <a:p>
-            <a:pPr marL="285750" indent="-285750">
-              <a:buFont typeface="Arial" panose="020B0604020202020204" pitchFamily="34" charset="0"/>
-              <a:buChar char="•"/>
-            </a:pPr>
-            <a:r>
-              <a:rPr lang="fr-FR" b="1" dirty="0"/>
-              <a:t>Récolte des deux rangs centraux de chaque micro parcelle</a:t>
-            </a:r>
-          </a:p>
-          <a:p>
-            <a:pPr marL="285750" indent="-285750">
-              <a:buFont typeface="Arial" panose="020B0604020202020204" pitchFamily="34" charset="0"/>
-              <a:buChar char="•"/>
-            </a:pPr>
-            <a:r>
-              <a:rPr lang="fr-FR" b="1" dirty="0"/>
-              <a:t>Echantillonnage aléatoire de 30 plantes</a:t>
-            </a:r>
-          </a:p>
-          <a:p>
-            <a:pPr marL="285750" indent="-285750">
-              <a:buFont typeface="Arial" panose="020B0604020202020204" pitchFamily="34" charset="0"/>
-              <a:buChar char="•"/>
-            </a:pPr>
-            <a:r>
-              <a:rPr lang="fr-FR" b="1" dirty="0"/>
-              <a:t>Mesures :</a:t>
-            </a:r>
-          </a:p>
-          <a:p>
-            <a:pPr marL="742950" lvl="1" indent="-285750">
-              <a:buFont typeface="Arial" panose="020B0604020202020204" pitchFamily="34" charset="0"/>
-              <a:buChar char="•"/>
-            </a:pPr>
-            <a:r>
-              <a:rPr lang="fr-FR" b="1" dirty="0"/>
-              <a:t>Hauteur</a:t>
-            </a:r>
-          </a:p>
-          <a:p>
-            <a:pPr marL="742950" lvl="1" indent="-285750">
-              <a:buFont typeface="Arial" panose="020B0604020202020204" pitchFamily="34" charset="0"/>
-              <a:buChar char="•"/>
-            </a:pPr>
-            <a:r>
-              <a:rPr lang="fr-FR" b="1" dirty="0"/>
-              <a:t>PMG</a:t>
-            </a:r>
-          </a:p>
-          <a:p>
-            <a:pPr marL="742950" lvl="1" indent="-285750">
-              <a:buFont typeface="Arial" panose="020B0604020202020204" pitchFamily="34" charset="0"/>
-              <a:buChar char="•"/>
-            </a:pPr>
-            <a:r>
-              <a:rPr lang="fr-FR" b="1" dirty="0"/>
-              <a:t>Protéines des grains</a:t>
-            </a:r>
-          </a:p>
-          <a:p>
-            <a:pPr marL="742950" lvl="1" indent="-285750">
-              <a:buFont typeface="Arial" panose="020B0604020202020204" pitchFamily="34" charset="0"/>
-              <a:buChar char="•"/>
-            </a:pPr>
-            <a:r>
-              <a:rPr lang="fr-FR" b="1" dirty="0" smtClean="0"/>
-              <a:t>Taille des </a:t>
-            </a:r>
-            <a:r>
-              <a:rPr lang="fr-FR" b="1" dirty="0"/>
-              <a:t>grains</a:t>
-            </a:r>
-            <a:endParaRPr lang="fr-FR" b="1" dirty="0"/>
+            <a:r>
+              <a:rPr lang="fr-FR" sz="2400" b="1" dirty="0" smtClean="0"/>
+              <a:t>Récolte et </a:t>
+            </a:r>
+            <a:r>
+              <a:rPr lang="fr-FR" sz="2400" b="1" dirty="0" err="1" smtClean="0"/>
+              <a:t>phénotypage</a:t>
+            </a:r>
+            <a:endParaRPr lang="fr-FR" sz="2400" b="1" dirty="0"/>
           </a:p>
         </p:txBody>
       </p:sp>
@@ -4467,7 +4187,7 @@
         </p:blipFill>
         <p:spPr>
           <a:xfrm>
-            <a:off x="437126" y="1507535"/>
+            <a:off x="437126" y="1780249"/>
             <a:ext cx="1696822" cy="1272617"/>
           </a:xfrm>
           <a:prstGeom prst="rect">
@@ -4483,8 +4203,8 @@
         </p:nvSpPr>
         <p:spPr>
           <a:xfrm>
-            <a:off x="437126" y="2700089"/>
-            <a:ext cx="1696822" cy="646331"/>
+            <a:off x="320980" y="2828515"/>
+            <a:ext cx="1906625" cy="707886"/>
           </a:xfrm>
           <a:prstGeom prst="rect">
             <a:avLst/>
@@ -4499,10 +4219,9 @@
           <a:p>
             <a:pPr algn="ctr"/>
             <a:r>
-              <a:rPr lang="fr-FR" b="1" dirty="0"/>
+              <a:rPr lang="fr-FR" sz="2000" b="1" dirty="0"/>
               <a:t>Grains d’une récolte d’EPO</a:t>
             </a:r>
-            <a:endParaRPr lang="fr-FR" b="1" dirty="0"/>
           </a:p>
         </p:txBody>
       </p:sp>
@@ -4517,7 +4236,7 @@
         </p:nvCxnSpPr>
         <p:spPr>
           <a:xfrm flipV="1">
-            <a:off x="2133948" y="2143841"/>
+            <a:off x="2133948" y="2416555"/>
             <a:ext cx="380933" cy="3"/>
           </a:xfrm>
           <a:prstGeom prst="straightConnector1">
@@ -4555,9 +4274,9 @@
           <p:nvPr/>
         </p:nvCxnSpPr>
         <p:spPr>
-          <a:xfrm>
-            <a:off x="4125373" y="2143841"/>
-            <a:ext cx="460595" cy="1371"/>
+          <a:xfrm flipV="1">
+            <a:off x="4125373" y="2415763"/>
+            <a:ext cx="460594" cy="792"/>
           </a:xfrm>
           <a:prstGeom prst="straightConnector1">
             <a:avLst/>
@@ -4594,9 +4313,9 @@
           <p:nvPr/>
         </p:nvCxnSpPr>
         <p:spPr>
-          <a:xfrm flipV="1">
-            <a:off x="8325404" y="2143842"/>
-            <a:ext cx="315676" cy="1370"/>
+          <a:xfrm>
+            <a:off x="9027268" y="2415763"/>
+            <a:ext cx="680496" cy="6558"/>
           </a:xfrm>
           <a:prstGeom prst="straightConnector1">
             <a:avLst/>
@@ -4645,8 +4364,8 @@
         </p:blipFill>
         <p:spPr>
           <a:xfrm>
-            <a:off x="4585968" y="703753"/>
-            <a:ext cx="3739436" cy="2882918"/>
+            <a:off x="4585967" y="703752"/>
+            <a:ext cx="4441301" cy="3424021"/>
           </a:xfrm>
           <a:prstGeom prst="rect">
             <a:avLst/>
@@ -4666,8 +4385,8 @@
         </p:nvSpPr>
         <p:spPr>
           <a:xfrm>
-            <a:off x="80080" y="256674"/>
-            <a:ext cx="3006020" cy="523220"/>
+            <a:off x="80079" y="256674"/>
+            <a:ext cx="4563743" cy="523220"/>
           </a:xfrm>
           <a:prstGeom prst="rect">
             <a:avLst/>
@@ -4682,7 +4401,7 @@
           <a:p>
             <a:r>
               <a:rPr lang="fr-FR" sz="2800" dirty="0" smtClean="0"/>
-              <a:t>Au champ</a:t>
+              <a:t>Dispositif de sélection réelle</a:t>
             </a:r>
             <a:endParaRPr lang="fr-FR" sz="2800" dirty="0"/>
           </a:p>
@@ -4696,7 +4415,7 @@
         </p:nvCxnSpPr>
         <p:spPr>
           <a:xfrm>
-            <a:off x="-134253" y="3725092"/>
+            <a:off x="-134253" y="4302604"/>
             <a:ext cx="12532984" cy="0"/>
           </a:xfrm>
           <a:prstGeom prst="line">
@@ -4731,8 +4450,8 @@
         </p:nvSpPr>
         <p:spPr>
           <a:xfrm>
-            <a:off x="227324" y="3856245"/>
-            <a:ext cx="3006020" cy="523220"/>
+            <a:off x="227323" y="4433757"/>
+            <a:ext cx="5135631" cy="523220"/>
           </a:xfrm>
           <a:prstGeom prst="rect">
             <a:avLst/>
@@ -4747,7 +4466,11 @@
           <a:p>
             <a:r>
               <a:rPr lang="fr-FR" sz="2800" dirty="0" smtClean="0"/>
-              <a:t>Dans les bacs</a:t>
+              <a:t>Dispositif de sélection </a:t>
+            </a:r>
+            <a:r>
+              <a:rPr lang="fr-FR" sz="2800" i="1" dirty="0" smtClean="0"/>
+              <a:t>in silico</a:t>
             </a:r>
             <a:endParaRPr lang="fr-FR" sz="2800" dirty="0"/>
           </a:p>
@@ -4757,15 +4480,15 @@
         <p:nvCxnSpPr>
           <p:cNvPr id="72" name="Connecteur en arc 71"/>
           <p:cNvCxnSpPr>
-            <a:stCxn id="96" idx="2"/>
+            <a:stCxn id="42" idx="2"/>
             <a:endCxn id="35" idx="0"/>
           </p:cNvCxnSpPr>
           <p:nvPr/>
         </p:nvCxnSpPr>
         <p:spPr>
           <a:xfrm rot="5400000">
-            <a:off x="5105115" y="3781967"/>
-            <a:ext cx="646002" cy="7328235"/>
+            <a:off x="4491340" y="4645543"/>
+            <a:ext cx="1358721" cy="6813403"/>
           </a:xfrm>
           <a:prstGeom prst="curvedConnector3">
             <a:avLst/>
@@ -4792,36 +4515,219 @@
           </a:fontRef>
         </p:style>
       </p:cxnSp>
-      <p:pic>
-        <p:nvPicPr>
-          <p:cNvPr id="96" name="Image 95"/>
-          <p:cNvPicPr>
-            <a:picLocks noChangeAspect="1"/>
-          </p:cNvPicPr>
+      <p:cxnSp>
+        <p:nvCxnSpPr>
+          <p:cNvPr id="59" name="Connecteur droit avec flèche 58"/>
+          <p:cNvCxnSpPr>
+            <a:stCxn id="15" idx="3"/>
+            <a:endCxn id="19" idx="1"/>
+          </p:cNvCxnSpPr>
           <p:nvPr/>
-        </p:nvPicPr>
-        <p:blipFill>
-          <a:blip r:embed="rId10" cstate="print">
-            <a:extLst>
-              <a:ext uri="{28A0092B-C50C-407E-A947-70E740481C1C}">
-                <a14:useLocalDpi xmlns:a14="http://schemas.microsoft.com/office/drawing/2010/main" val="0"/>
-              </a:ext>
-            </a:extLst>
-          </a:blip>
-          <a:stretch>
-            <a:fillRect/>
-          </a:stretch>
-        </p:blipFill>
-        <p:spPr>
-          <a:xfrm>
-            <a:off x="7411093" y="4601373"/>
-            <a:ext cx="3362279" cy="2521710"/>
+        </p:nvCxnSpPr>
+        <p:spPr>
+          <a:xfrm>
+            <a:off x="7953383" y="9458671"/>
+            <a:ext cx="978758" cy="0"/>
+          </a:xfrm>
+          <a:prstGeom prst="straightConnector1">
+            <a:avLst/>
+          </a:prstGeom>
+          <a:ln w="28575">
+            <a:solidFill>
+              <a:schemeClr val="tx1"/>
+            </a:solidFill>
+            <a:tailEnd type="triangle"/>
+          </a:ln>
+        </p:spPr>
+        <p:style>
+          <a:lnRef idx="1">
+            <a:schemeClr val="accent1"/>
+          </a:lnRef>
+          <a:fillRef idx="0">
+            <a:schemeClr val="accent1"/>
+          </a:fillRef>
+          <a:effectRef idx="0">
+            <a:schemeClr val="accent1"/>
+          </a:effectRef>
+          <a:fontRef idx="minor">
+            <a:schemeClr val="tx1"/>
+          </a:fontRef>
+        </p:style>
+      </p:cxnSp>
+      <p:sp>
+        <p:nvSpPr>
+          <p:cNvPr id="19" name="ZoneTexte 18"/>
+          <p:cNvSpPr txBox="1"/>
+          <p:nvPr/>
+        </p:nvSpPr>
+        <p:spPr>
+          <a:xfrm>
+            <a:off x="8932141" y="8981617"/>
+            <a:ext cx="2690795" cy="954107"/>
           </a:xfrm>
           <a:prstGeom prst="rect">
             <a:avLst/>
           </a:prstGeom>
-        </p:spPr>
-      </p:pic>
+          <a:noFill/>
+        </p:spPr>
+        <p:txBody>
+          <a:bodyPr wrap="square" rtlCol="0">
+            <a:spAutoFit/>
+          </a:bodyPr>
+          <a:lstStyle/>
+          <a:p>
+            <a:r>
+              <a:rPr lang="fr-FR" sz="2800" dirty="0" smtClean="0"/>
+              <a:t>Données pour sélection </a:t>
+            </a:r>
+            <a:r>
+              <a:rPr lang="fr-FR" sz="2800" i="1" dirty="0" smtClean="0"/>
+              <a:t>in silico</a:t>
+            </a:r>
+            <a:endParaRPr lang="fr-FR" sz="2800" dirty="0"/>
+          </a:p>
+        </p:txBody>
+      </p:sp>
+      <p:cxnSp>
+        <p:nvCxnSpPr>
+          <p:cNvPr id="73" name="Connecteur droit avec flèche 72"/>
+          <p:cNvCxnSpPr>
+            <a:stCxn id="16" idx="3"/>
+            <a:endCxn id="74" idx="1"/>
+          </p:cNvCxnSpPr>
+          <p:nvPr/>
+        </p:nvCxnSpPr>
+        <p:spPr>
+          <a:xfrm flipV="1">
+            <a:off x="8047675" y="11031837"/>
+            <a:ext cx="884466" cy="2411"/>
+          </a:xfrm>
+          <a:prstGeom prst="straightConnector1">
+            <a:avLst/>
+          </a:prstGeom>
+          <a:ln w="28575">
+            <a:solidFill>
+              <a:schemeClr val="tx1"/>
+            </a:solidFill>
+            <a:tailEnd type="triangle"/>
+          </a:ln>
+        </p:spPr>
+        <p:style>
+          <a:lnRef idx="1">
+            <a:schemeClr val="accent1"/>
+          </a:lnRef>
+          <a:fillRef idx="0">
+            <a:schemeClr val="accent1"/>
+          </a:fillRef>
+          <a:effectRef idx="0">
+            <a:schemeClr val="accent1"/>
+          </a:effectRef>
+          <a:fontRef idx="minor">
+            <a:schemeClr val="tx1"/>
+          </a:fontRef>
+        </p:style>
+      </p:cxnSp>
+      <p:sp>
+        <p:nvSpPr>
+          <p:cNvPr id="74" name="ZoneTexte 73"/>
+          <p:cNvSpPr txBox="1"/>
+          <p:nvPr/>
+        </p:nvSpPr>
+        <p:spPr>
+          <a:xfrm>
+            <a:off x="8932141" y="10247007"/>
+            <a:ext cx="2330350" cy="1569660"/>
+          </a:xfrm>
+          <a:prstGeom prst="rect">
+            <a:avLst/>
+          </a:prstGeom>
+          <a:noFill/>
+        </p:spPr>
+        <p:txBody>
+          <a:bodyPr wrap="square" rtlCol="0">
+            <a:spAutoFit/>
+          </a:bodyPr>
+          <a:lstStyle/>
+          <a:p>
+            <a:r>
+              <a:rPr lang="fr-FR" sz="2400" dirty="0" smtClean="0"/>
+              <a:t>Données pour estimation des paramètres de variances</a:t>
+            </a:r>
+            <a:endParaRPr lang="fr-FR" sz="2400" dirty="0"/>
+          </a:p>
+        </p:txBody>
+      </p:sp>
+      <p:sp>
+        <p:nvSpPr>
+          <p:cNvPr id="50" name="ZoneTexte 49"/>
+          <p:cNvSpPr txBox="1"/>
+          <p:nvPr/>
+        </p:nvSpPr>
+        <p:spPr>
+          <a:xfrm>
+            <a:off x="2865815" y="7666170"/>
+            <a:ext cx="4423844" cy="707886"/>
+          </a:xfrm>
+          <a:prstGeom prst="rect">
+            <a:avLst/>
+          </a:prstGeom>
+          <a:solidFill>
+            <a:schemeClr val="bg1"/>
+          </a:solidFill>
+          <a:ln>
+            <a:solidFill>
+              <a:schemeClr val="tx1"/>
+            </a:solidFill>
+          </a:ln>
+        </p:spPr>
+        <p:txBody>
+          <a:bodyPr wrap="square" rtlCol="0">
+            <a:spAutoFit/>
+          </a:bodyPr>
+          <a:lstStyle/>
+          <a:p>
+            <a:pPr algn="ctr"/>
+            <a:r>
+              <a:rPr lang="fr-FR" sz="2000" b="1" dirty="0"/>
+              <a:t>Semis de 1248 grains dans 6 bacs (en moyenne 7 grains semés par génotype)</a:t>
+            </a:r>
+          </a:p>
+        </p:txBody>
+      </p:sp>
+      <p:sp>
+        <p:nvSpPr>
+          <p:cNvPr id="84" name="ZoneTexte 83"/>
+          <p:cNvSpPr txBox="1"/>
+          <p:nvPr/>
+        </p:nvSpPr>
+        <p:spPr>
+          <a:xfrm>
+            <a:off x="268284" y="11377091"/>
+            <a:ext cx="3092804" cy="400110"/>
+          </a:xfrm>
+          <a:prstGeom prst="rect">
+            <a:avLst/>
+          </a:prstGeom>
+          <a:noFill/>
+        </p:spPr>
+        <p:txBody>
+          <a:bodyPr wrap="square" rtlCol="0">
+            <a:spAutoFit/>
+          </a:bodyPr>
+          <a:lstStyle/>
+          <a:p>
+            <a:r>
+              <a:rPr lang="fr-FR" sz="2000" b="1" dirty="0" err="1" smtClean="0"/>
+              <a:t>Phénotypage</a:t>
+            </a:r>
+            <a:r>
+              <a:rPr lang="fr-FR" sz="2000" b="1" dirty="0" smtClean="0"/>
+              <a:t> sur plantes</a:t>
+            </a:r>
+            <a:endParaRPr lang="fr-FR" sz="2000" b="1" dirty="0"/>
+          </a:p>
+        </p:txBody>
+      </p:sp>
     </p:spTree>
     <p:extLst>
       <p:ext uri="{BB962C8B-B14F-4D97-AF65-F5344CB8AC3E}">

</xml_diff>